<commit_message>
testing Done!! junit4 used
</commit_message>
<xml_diff>
--- a/Docs/final-ppt-project.pptx
+++ b/Docs/final-ppt-project.pptx
@@ -1,39 +1,39 @@
 
 <file path=ppt/presentation.xml><?xml version="1.0" encoding="utf-8"?>
-<p:presentation xmlns:a="http://schemas.openxmlformats.org/drawingml/2006/main" xmlns:r="http://schemas.openxmlformats.org/officeDocument/2006/relationships" xmlns:mc="http://schemas.openxmlformats.org/markup-compatibility/2006" xmlns:mv="urn:schemas-microsoft-com:mac:vml" xmlns:p="http://schemas.openxmlformats.org/presentationml/2006/main" xmlns:c="http://schemas.openxmlformats.org/drawingml/2006/chart" xmlns:dgm="http://schemas.openxmlformats.org/drawingml/2006/diagram" xmlns:o="urn:schemas-microsoft-com:office:office" xmlns:v="urn:schemas-microsoft-com:vml" xmlns:pvml="urn:schemas-microsoft-com:office:powerpoint" xmlns:com="http://schemas.openxmlformats.org/drawingml/2006/compatibility" xmlns:p14="http://schemas.microsoft.com/office/powerpoint/2010/main" xmlns:p15="http://schemas.microsoft.com/office/powerpoint/2012/main" autoCompressPictures="0" embedTrueTypeFonts="1" strictFirstAndLastChars="0" saveSubsetFonts="1">
+<p:presentation xmlns:a="http://schemas.openxmlformats.org/drawingml/2006/main" xmlns:r="http://schemas.openxmlformats.org/officeDocument/2006/relationships" xmlns:p="http://schemas.openxmlformats.org/presentationml/2006/main" strictFirstAndLastChars="0" embedTrueTypeFonts="1" saveSubsetFonts="1" autoCompressPictures="0">
   <p:sldMasterIdLst>
-    <p:sldMasterId id="2147483659" r:id="rId3"/>
+    <p:sldMasterId id="2147483659" r:id="rId1"/>
   </p:sldMasterIdLst>
   <p:notesMasterIdLst>
-    <p:notesMasterId r:id="rId4"/>
+    <p:notesMasterId r:id="rId7"/>
   </p:notesMasterIdLst>
   <p:sldIdLst>
-    <p:sldId id="256" r:id="rId5"/>
-    <p:sldId id="257" r:id="rId6"/>
-    <p:sldId id="258" r:id="rId7"/>
-    <p:sldId id="259" r:id="rId8"/>
-    <p:sldId id="260" r:id="rId9"/>
+    <p:sldId id="256" r:id="rId2"/>
+    <p:sldId id="257" r:id="rId3"/>
+    <p:sldId id="258" r:id="rId4"/>
+    <p:sldId id="259" r:id="rId5"/>
+    <p:sldId id="260" r:id="rId6"/>
   </p:sldIdLst>
-  <p:sldSz cy="5143500" cx="9144000"/>
+  <p:sldSz cx="9144000" cy="5143500" type="screen16x9"/>
   <p:notesSz cx="6858000" cy="9144000"/>
   <p:embeddedFontLst>
     <p:embeddedFont>
-      <p:font typeface="Raleway"/>
-      <p:regular r:id="rId10"/>
-      <p:bold r:id="rId11"/>
-      <p:italic r:id="rId12"/>
-      <p:boldItalic r:id="rId13"/>
+      <p:font typeface="Raleway" panose="020B0604020202020204" charset="0"/>
+      <p:regular r:id="rId8"/>
+      <p:bold r:id="rId9"/>
+      <p:italic r:id="rId10"/>
+      <p:boldItalic r:id="rId11"/>
     </p:embeddedFont>
     <p:embeddedFont>
-      <p:font typeface="Lato"/>
-      <p:regular r:id="rId14"/>
-      <p:bold r:id="rId15"/>
-      <p:italic r:id="rId16"/>
-      <p:boldItalic r:id="rId17"/>
+      <p:font typeface="Lato" panose="020B0604020202020204" charset="0"/>
+      <p:regular r:id="rId12"/>
+      <p:bold r:id="rId13"/>
+      <p:italic r:id="rId14"/>
+      <p:boldItalic r:id="rId15"/>
     </p:embeddedFont>
   </p:embeddedFontLst>
   <p:defaultTextStyle>
-    <a:defPPr lvl="0" marR="0" rtl="0" algn="l">
+    <a:defPPr marR="0" lvl="0" algn="l" rtl="0">
       <a:lnSpc>
         <a:spcPct val="100000"/>
       </a:lnSpc>
@@ -44,7 +44,7 @@
         <a:spcPts val="0"/>
       </a:spcAft>
     </a:defPPr>
-    <a:lvl1pPr lvl="0" marR="0" rtl="0" algn="l">
+    <a:lvl1pPr marR="0" lvl="0" algn="l" rtl="0">
       <a:lnSpc>
         <a:spcPct val="100000"/>
       </a:lnSpc>
@@ -58,7 +58,7 @@
         <a:srgbClr val="000000"/>
       </a:buClr>
       <a:buFont typeface="Arial"/>
-      <a:defRPr b="0" i="0" sz="1400" u="none" cap="none" strike="noStrike">
+      <a:defRPr sz="1400" b="0" i="0" u="none" strike="noStrike" cap="none">
         <a:solidFill>
           <a:srgbClr val="000000"/>
         </a:solidFill>
@@ -68,7 +68,7 @@
         <a:sym typeface="Arial"/>
       </a:defRPr>
     </a:lvl1pPr>
-    <a:lvl2pPr lvl="1" marR="0" rtl="0" algn="l">
+    <a:lvl2pPr marR="0" lvl="1" algn="l" rtl="0">
       <a:lnSpc>
         <a:spcPct val="100000"/>
       </a:lnSpc>
@@ -82,7 +82,7 @@
         <a:srgbClr val="000000"/>
       </a:buClr>
       <a:buFont typeface="Arial"/>
-      <a:defRPr b="0" i="0" sz="1400" u="none" cap="none" strike="noStrike">
+      <a:defRPr sz="1400" b="0" i="0" u="none" strike="noStrike" cap="none">
         <a:solidFill>
           <a:srgbClr val="000000"/>
         </a:solidFill>
@@ -92,7 +92,7 @@
         <a:sym typeface="Arial"/>
       </a:defRPr>
     </a:lvl2pPr>
-    <a:lvl3pPr lvl="2" marR="0" rtl="0" algn="l">
+    <a:lvl3pPr marR="0" lvl="2" algn="l" rtl="0">
       <a:lnSpc>
         <a:spcPct val="100000"/>
       </a:lnSpc>
@@ -106,7 +106,7 @@
         <a:srgbClr val="000000"/>
       </a:buClr>
       <a:buFont typeface="Arial"/>
-      <a:defRPr b="0" i="0" sz="1400" u="none" cap="none" strike="noStrike">
+      <a:defRPr sz="1400" b="0" i="0" u="none" strike="noStrike" cap="none">
         <a:solidFill>
           <a:srgbClr val="000000"/>
         </a:solidFill>
@@ -116,7 +116,7 @@
         <a:sym typeface="Arial"/>
       </a:defRPr>
     </a:lvl3pPr>
-    <a:lvl4pPr lvl="3" marR="0" rtl="0" algn="l">
+    <a:lvl4pPr marR="0" lvl="3" algn="l" rtl="0">
       <a:lnSpc>
         <a:spcPct val="100000"/>
       </a:lnSpc>
@@ -130,7 +130,7 @@
         <a:srgbClr val="000000"/>
       </a:buClr>
       <a:buFont typeface="Arial"/>
-      <a:defRPr b="0" i="0" sz="1400" u="none" cap="none" strike="noStrike">
+      <a:defRPr sz="1400" b="0" i="0" u="none" strike="noStrike" cap="none">
         <a:solidFill>
           <a:srgbClr val="000000"/>
         </a:solidFill>
@@ -140,7 +140,7 @@
         <a:sym typeface="Arial"/>
       </a:defRPr>
     </a:lvl4pPr>
-    <a:lvl5pPr lvl="4" marR="0" rtl="0" algn="l">
+    <a:lvl5pPr marR="0" lvl="4" algn="l" rtl="0">
       <a:lnSpc>
         <a:spcPct val="100000"/>
       </a:lnSpc>
@@ -154,7 +154,7 @@
         <a:srgbClr val="000000"/>
       </a:buClr>
       <a:buFont typeface="Arial"/>
-      <a:defRPr b="0" i="0" sz="1400" u="none" cap="none" strike="noStrike">
+      <a:defRPr sz="1400" b="0" i="0" u="none" strike="noStrike" cap="none">
         <a:solidFill>
           <a:srgbClr val="000000"/>
         </a:solidFill>
@@ -164,7 +164,7 @@
         <a:sym typeface="Arial"/>
       </a:defRPr>
     </a:lvl5pPr>
-    <a:lvl6pPr lvl="5" marR="0" rtl="0" algn="l">
+    <a:lvl6pPr marR="0" lvl="5" algn="l" rtl="0">
       <a:lnSpc>
         <a:spcPct val="100000"/>
       </a:lnSpc>
@@ -178,7 +178,7 @@
         <a:srgbClr val="000000"/>
       </a:buClr>
       <a:buFont typeface="Arial"/>
-      <a:defRPr b="0" i="0" sz="1400" u="none" cap="none" strike="noStrike">
+      <a:defRPr sz="1400" b="0" i="0" u="none" strike="noStrike" cap="none">
         <a:solidFill>
           <a:srgbClr val="000000"/>
         </a:solidFill>
@@ -188,7 +188,7 @@
         <a:sym typeface="Arial"/>
       </a:defRPr>
     </a:lvl6pPr>
-    <a:lvl7pPr lvl="6" marR="0" rtl="0" algn="l">
+    <a:lvl7pPr marR="0" lvl="6" algn="l" rtl="0">
       <a:lnSpc>
         <a:spcPct val="100000"/>
       </a:lnSpc>
@@ -202,7 +202,7 @@
         <a:srgbClr val="000000"/>
       </a:buClr>
       <a:buFont typeface="Arial"/>
-      <a:defRPr b="0" i="0" sz="1400" u="none" cap="none" strike="noStrike">
+      <a:defRPr sz="1400" b="0" i="0" u="none" strike="noStrike" cap="none">
         <a:solidFill>
           <a:srgbClr val="000000"/>
         </a:solidFill>
@@ -212,7 +212,7 @@
         <a:sym typeface="Arial"/>
       </a:defRPr>
     </a:lvl7pPr>
-    <a:lvl8pPr lvl="7" marR="0" rtl="0" algn="l">
+    <a:lvl8pPr marR="0" lvl="7" algn="l" rtl="0">
       <a:lnSpc>
         <a:spcPct val="100000"/>
       </a:lnSpc>
@@ -226,7 +226,7 @@
         <a:srgbClr val="000000"/>
       </a:buClr>
       <a:buFont typeface="Arial"/>
-      <a:defRPr b="0" i="0" sz="1400" u="none" cap="none" strike="noStrike">
+      <a:defRPr sz="1400" b="0" i="0" u="none" strike="noStrike" cap="none">
         <a:solidFill>
           <a:srgbClr val="000000"/>
         </a:solidFill>
@@ -236,7 +236,7 @@
         <a:sym typeface="Arial"/>
       </a:defRPr>
     </a:lvl8pPr>
-    <a:lvl9pPr lvl="8" marR="0" rtl="0" algn="l">
+    <a:lvl9pPr marR="0" lvl="8" algn="l" rtl="0">
       <a:lnSpc>
         <a:spcPct val="100000"/>
       </a:lnSpc>
@@ -250,7 +250,7 @@
         <a:srgbClr val="000000"/>
       </a:buClr>
       <a:buFont typeface="Arial"/>
-      <a:defRPr b="0" i="0" sz="1400" u="none" cap="none" strike="noStrike">
+      <a:defRPr sz="1400" b="0" i="0" u="none" strike="noStrike" cap="none">
         <a:solidFill>
           <a:srgbClr val="000000"/>
         </a:solidFill>
@@ -264,12 +264,21 @@
 </p:presentation>
 </file>
 
+<file path=ppt/revisionInfo.xml><?xml version="1.0" encoding="utf-8"?>
+<p1510:revInfo xmlns:a="http://schemas.openxmlformats.org/drawingml/2006/main" xmlns:r="http://schemas.openxmlformats.org/officeDocument/2006/relationships" xmlns:p1510="http://schemas.microsoft.com/office/powerpoint/2015/10/main"/>
+</file>
+
 <file path=ppt/notesMasters/notesMaster1.xml><?xml version="1.0" encoding="utf-8"?>
-<p:notesMaster xmlns:a="http://schemas.openxmlformats.org/drawingml/2006/main" xmlns:r="http://schemas.openxmlformats.org/officeDocument/2006/relationships" xmlns:mc="http://schemas.openxmlformats.org/markup-compatibility/2006" xmlns:mv="urn:schemas-microsoft-com:mac:vml" xmlns:p="http://schemas.openxmlformats.org/presentationml/2006/main" xmlns:c="http://schemas.openxmlformats.org/drawingml/2006/chart" xmlns:dgm="http://schemas.openxmlformats.org/drawingml/2006/diagram" xmlns:o="urn:schemas-microsoft-com:office:office" xmlns:v="urn:schemas-microsoft-com:vml" xmlns:pvml="urn:schemas-microsoft-com:office:powerpoint" xmlns:com="http://schemas.openxmlformats.org/drawingml/2006/compatibility" xmlns:p14="http://schemas.microsoft.com/office/powerpoint/2010/main" xmlns:p15="http://schemas.microsoft.com/office/powerpoint/2012/main">
+<p:notesMaster xmlns:a="http://schemas.openxmlformats.org/drawingml/2006/main" xmlns:r="http://schemas.openxmlformats.org/officeDocument/2006/relationships" xmlns:p="http://schemas.openxmlformats.org/presentationml/2006/main">
   <p:cSld>
+    <p:bg>
+      <p:bgRef idx="1001">
+        <a:schemeClr val="bg1"/>
+      </p:bgRef>
+    </p:bg>
     <p:spTree>
       <p:nvGrpSpPr>
-        <p:cNvPr id="2" name="Shape 2"/>
+        <p:cNvPr id="1" name="Shape 2"/>
         <p:cNvGrpSpPr/>
         <p:nvPr/>
       </p:nvGrpSpPr>
@@ -284,9 +293,11 @@
       <p:sp>
         <p:nvSpPr>
           <p:cNvPr id="3" name="Shape 3"/>
-          <p:cNvSpPr/>
+          <p:cNvSpPr>
+            <a:spLocks noGrp="1" noRot="1" noChangeAspect="1"/>
+          </p:cNvSpPr>
           <p:nvPr>
-            <p:ph idx="2" type="sldImg"/>
+            <p:ph type="sldImg" idx="2"/>
           </p:nvPr>
         </p:nvSpPr>
         <p:spPr>
@@ -295,8 +306,13 @@
             <a:ext cx="6096075" cy="3429000"/>
           </a:xfrm>
           <a:custGeom>
+            <a:avLst/>
+            <a:gdLst/>
+            <a:ahLst/>
+            <a:cxnLst/>
+            <a:rect l="0" t="0" r="0" b="0"/>
             <a:pathLst>
-              <a:path extrusionOk="0" h="120000" w="120000">
+              <a:path w="120000" h="120000" extrusionOk="0">
                 <a:moveTo>
                   <a:pt x="0" y="0"/>
                 </a:moveTo>
@@ -314,23 +330,25 @@
             </a:pathLst>
           </a:custGeom>
           <a:noFill/>
-          <a:ln cap="flat" cmpd="sng" w="9525">
+          <a:ln w="9525" cap="flat" cmpd="sng">
             <a:solidFill>
               <a:srgbClr val="000000"/>
             </a:solidFill>
             <a:prstDash val="solid"/>
             <a:round/>
-            <a:headEnd len="sm" w="sm" type="none"/>
-            <a:tailEnd len="sm" w="sm" type="none"/>
+            <a:headEnd type="none" w="sm" len="sm"/>
+            <a:tailEnd type="none" w="sm" len="sm"/>
           </a:ln>
         </p:spPr>
       </p:sp>
       <p:sp>
         <p:nvSpPr>
           <p:cNvPr id="4" name="Shape 4"/>
-          <p:cNvSpPr txBox="1"/>
+          <p:cNvSpPr txBox="1">
+            <a:spLocks noGrp="1"/>
+          </p:cNvSpPr>
           <p:nvPr>
-            <p:ph idx="1" type="body"/>
+            <p:ph type="body" idx="1"/>
           </p:nvPr>
         </p:nvSpPr>
         <p:spPr>
@@ -347,9 +365,9 @@
           </a:ln>
         </p:spPr>
         <p:txBody>
-          <a:bodyPr anchorCtr="0" anchor="t" bIns="91425" lIns="91425" spcFirstLastPara="1" rIns="91425" wrap="square" tIns="91425"/>
+          <a:bodyPr spcFirstLastPara="1" wrap="square" lIns="91425" tIns="91425" rIns="91425" bIns="91425" anchor="t" anchorCtr="0"/>
           <a:lstStyle>
-            <a:lvl1pPr indent="-317500" lvl="0" marL="457200">
+            <a:lvl1pPr marL="457200" lvl="0" indent="-317500">
               <a:spcBef>
                 <a:spcPts val="0"/>
               </a:spcBef>
@@ -360,7 +378,7 @@
               <a:buChar char="●"/>
               <a:defRPr sz="1100"/>
             </a:lvl1pPr>
-            <a:lvl2pPr indent="-317500" lvl="1" marL="914400">
+            <a:lvl2pPr marL="914400" lvl="1" indent="-317500">
               <a:spcBef>
                 <a:spcPts val="0"/>
               </a:spcBef>
@@ -371,7 +389,7 @@
               <a:buChar char="○"/>
               <a:defRPr sz="1100"/>
             </a:lvl2pPr>
-            <a:lvl3pPr indent="-317500" lvl="2" marL="1371600">
+            <a:lvl3pPr marL="1371600" lvl="2" indent="-317500">
               <a:spcBef>
                 <a:spcPts val="0"/>
               </a:spcBef>
@@ -382,7 +400,7 @@
               <a:buChar char="■"/>
               <a:defRPr sz="1100"/>
             </a:lvl3pPr>
-            <a:lvl4pPr indent="-317500" lvl="3" marL="1828800">
+            <a:lvl4pPr marL="1828800" lvl="3" indent="-317500">
               <a:spcBef>
                 <a:spcPts val="0"/>
               </a:spcBef>
@@ -393,7 +411,7 @@
               <a:buChar char="●"/>
               <a:defRPr sz="1100"/>
             </a:lvl4pPr>
-            <a:lvl5pPr indent="-317500" lvl="4" marL="2286000">
+            <a:lvl5pPr marL="2286000" lvl="4" indent="-317500">
               <a:spcBef>
                 <a:spcPts val="0"/>
               </a:spcBef>
@@ -404,7 +422,7 @@
               <a:buChar char="○"/>
               <a:defRPr sz="1100"/>
             </a:lvl5pPr>
-            <a:lvl6pPr indent="-317500" lvl="5" marL="2743200">
+            <a:lvl6pPr marL="2743200" lvl="5" indent="-317500">
               <a:spcBef>
                 <a:spcPts val="0"/>
               </a:spcBef>
@@ -415,7 +433,7 @@
               <a:buChar char="■"/>
               <a:defRPr sz="1100"/>
             </a:lvl6pPr>
-            <a:lvl7pPr indent="-317500" lvl="6" marL="3200400">
+            <a:lvl7pPr marL="3200400" lvl="6" indent="-317500">
               <a:spcBef>
                 <a:spcPts val="0"/>
               </a:spcBef>
@@ -426,7 +444,7 @@
               <a:buChar char="●"/>
               <a:defRPr sz="1100"/>
             </a:lvl7pPr>
-            <a:lvl8pPr indent="-317500" lvl="7" marL="3657600">
+            <a:lvl8pPr marL="3657600" lvl="7" indent="-317500">
               <a:spcBef>
                 <a:spcPts val="0"/>
               </a:spcBef>
@@ -437,7 +455,7 @@
               <a:buChar char="○"/>
               <a:defRPr sz="1100"/>
             </a:lvl8pPr>
-            <a:lvl9pPr indent="-317500" lvl="8" marL="4114800">
+            <a:lvl9pPr marL="4114800" lvl="8" indent="-317500">
               <a:spcBef>
                 <a:spcPts val="0"/>
               </a:spcBef>
@@ -449,14 +467,16 @@
               <a:defRPr sz="1100"/>
             </a:lvl9pPr>
           </a:lstStyle>
-          <a:p/>
+          <a:p>
+            <a:endParaRPr/>
+          </a:p>
         </p:txBody>
       </p:sp>
     </p:spTree>
   </p:cSld>
-  <p:clrMap accent1="accent1" accent2="accent2" accent3="accent3" accent4="accent4" accent5="accent5" accent6="accent6" bg1="lt1" bg2="dk2" tx1="dk1" tx2="lt2" folHlink="folHlink" hlink="hlink"/>
+  <p:clrMap bg1="lt1" tx1="dk1" bg2="dk2" tx2="lt2" accent1="accent1" accent2="accent2" accent3="accent3" accent4="accent4" accent5="accent5" accent6="accent6" hlink="hlink" folHlink="folHlink"/>
   <p:notesStyle>
-    <a:defPPr lvl="0" marR="0" rtl="0" algn="l">
+    <a:defPPr marR="0" lvl="0" algn="l" rtl="0">
       <a:lnSpc>
         <a:spcPct val="100000"/>
       </a:lnSpc>
@@ -467,7 +487,7 @@
         <a:spcPts val="0"/>
       </a:spcAft>
     </a:defPPr>
-    <a:lvl1pPr lvl="0" marR="0" rtl="0" algn="l">
+    <a:lvl1pPr marR="0" lvl="0" algn="l" rtl="0">
       <a:lnSpc>
         <a:spcPct val="100000"/>
       </a:lnSpc>
@@ -481,7 +501,7 @@
         <a:srgbClr val="000000"/>
       </a:buClr>
       <a:buFont typeface="Arial"/>
-      <a:defRPr b="0" i="0" sz="1400" u="none" cap="none" strike="noStrike">
+      <a:defRPr sz="1400" b="0" i="0" u="none" strike="noStrike" cap="none">
         <a:solidFill>
           <a:srgbClr val="000000"/>
         </a:solidFill>
@@ -491,7 +511,7 @@
         <a:sym typeface="Arial"/>
       </a:defRPr>
     </a:lvl1pPr>
-    <a:lvl2pPr lvl="1" marR="0" rtl="0" algn="l">
+    <a:lvl2pPr marR="0" lvl="1" algn="l" rtl="0">
       <a:lnSpc>
         <a:spcPct val="100000"/>
       </a:lnSpc>
@@ -505,7 +525,7 @@
         <a:srgbClr val="000000"/>
       </a:buClr>
       <a:buFont typeface="Arial"/>
-      <a:defRPr b="0" i="0" sz="1400" u="none" cap="none" strike="noStrike">
+      <a:defRPr sz="1400" b="0" i="0" u="none" strike="noStrike" cap="none">
         <a:solidFill>
           <a:srgbClr val="000000"/>
         </a:solidFill>
@@ -515,7 +535,7 @@
         <a:sym typeface="Arial"/>
       </a:defRPr>
     </a:lvl2pPr>
-    <a:lvl3pPr lvl="2" marR="0" rtl="0" algn="l">
+    <a:lvl3pPr marR="0" lvl="2" algn="l" rtl="0">
       <a:lnSpc>
         <a:spcPct val="100000"/>
       </a:lnSpc>
@@ -529,7 +549,7 @@
         <a:srgbClr val="000000"/>
       </a:buClr>
       <a:buFont typeface="Arial"/>
-      <a:defRPr b="0" i="0" sz="1400" u="none" cap="none" strike="noStrike">
+      <a:defRPr sz="1400" b="0" i="0" u="none" strike="noStrike" cap="none">
         <a:solidFill>
           <a:srgbClr val="000000"/>
         </a:solidFill>
@@ -539,7 +559,7 @@
         <a:sym typeface="Arial"/>
       </a:defRPr>
     </a:lvl3pPr>
-    <a:lvl4pPr lvl="3" marR="0" rtl="0" algn="l">
+    <a:lvl4pPr marR="0" lvl="3" algn="l" rtl="0">
       <a:lnSpc>
         <a:spcPct val="100000"/>
       </a:lnSpc>
@@ -553,7 +573,7 @@
         <a:srgbClr val="000000"/>
       </a:buClr>
       <a:buFont typeface="Arial"/>
-      <a:defRPr b="0" i="0" sz="1400" u="none" cap="none" strike="noStrike">
+      <a:defRPr sz="1400" b="0" i="0" u="none" strike="noStrike" cap="none">
         <a:solidFill>
           <a:srgbClr val="000000"/>
         </a:solidFill>
@@ -563,7 +583,7 @@
         <a:sym typeface="Arial"/>
       </a:defRPr>
     </a:lvl4pPr>
-    <a:lvl5pPr lvl="4" marR="0" rtl="0" algn="l">
+    <a:lvl5pPr marR="0" lvl="4" algn="l" rtl="0">
       <a:lnSpc>
         <a:spcPct val="100000"/>
       </a:lnSpc>
@@ -577,7 +597,7 @@
         <a:srgbClr val="000000"/>
       </a:buClr>
       <a:buFont typeface="Arial"/>
-      <a:defRPr b="0" i="0" sz="1400" u="none" cap="none" strike="noStrike">
+      <a:defRPr sz="1400" b="0" i="0" u="none" strike="noStrike" cap="none">
         <a:solidFill>
           <a:srgbClr val="000000"/>
         </a:solidFill>
@@ -587,7 +607,7 @@
         <a:sym typeface="Arial"/>
       </a:defRPr>
     </a:lvl5pPr>
-    <a:lvl6pPr lvl="5" marR="0" rtl="0" algn="l">
+    <a:lvl6pPr marR="0" lvl="5" algn="l" rtl="0">
       <a:lnSpc>
         <a:spcPct val="100000"/>
       </a:lnSpc>
@@ -601,7 +621,7 @@
         <a:srgbClr val="000000"/>
       </a:buClr>
       <a:buFont typeface="Arial"/>
-      <a:defRPr b="0" i="0" sz="1400" u="none" cap="none" strike="noStrike">
+      <a:defRPr sz="1400" b="0" i="0" u="none" strike="noStrike" cap="none">
         <a:solidFill>
           <a:srgbClr val="000000"/>
         </a:solidFill>
@@ -611,7 +631,7 @@
         <a:sym typeface="Arial"/>
       </a:defRPr>
     </a:lvl6pPr>
-    <a:lvl7pPr lvl="6" marR="0" rtl="0" algn="l">
+    <a:lvl7pPr marR="0" lvl="6" algn="l" rtl="0">
       <a:lnSpc>
         <a:spcPct val="100000"/>
       </a:lnSpc>
@@ -625,7 +645,7 @@
         <a:srgbClr val="000000"/>
       </a:buClr>
       <a:buFont typeface="Arial"/>
-      <a:defRPr b="0" i="0" sz="1400" u="none" cap="none" strike="noStrike">
+      <a:defRPr sz="1400" b="0" i="0" u="none" strike="noStrike" cap="none">
         <a:solidFill>
           <a:srgbClr val="000000"/>
         </a:solidFill>
@@ -635,7 +655,7 @@
         <a:sym typeface="Arial"/>
       </a:defRPr>
     </a:lvl7pPr>
-    <a:lvl8pPr lvl="7" marR="0" rtl="0" algn="l">
+    <a:lvl8pPr marR="0" lvl="7" algn="l" rtl="0">
       <a:lnSpc>
         <a:spcPct val="100000"/>
       </a:lnSpc>
@@ -649,7 +669,7 @@
         <a:srgbClr val="000000"/>
       </a:buClr>
       <a:buFont typeface="Arial"/>
-      <a:defRPr b="0" i="0" sz="1400" u="none" cap="none" strike="noStrike">
+      <a:defRPr sz="1400" b="0" i="0" u="none" strike="noStrike" cap="none">
         <a:solidFill>
           <a:srgbClr val="000000"/>
         </a:solidFill>
@@ -659,7 +679,7 @@
         <a:sym typeface="Arial"/>
       </a:defRPr>
     </a:lvl8pPr>
-    <a:lvl9pPr lvl="8" marR="0" rtl="0" algn="l">
+    <a:lvl9pPr marR="0" lvl="8" algn="l" rtl="0">
       <a:lnSpc>
         <a:spcPct val="100000"/>
       </a:lnSpc>
@@ -673,7 +693,7 @@
         <a:srgbClr val="000000"/>
       </a:buClr>
       <a:buFont typeface="Arial"/>
-      <a:defRPr b="0" i="0" sz="1400" u="none" cap="none" strike="noStrike">
+      <a:defRPr sz="1400" b="0" i="0" u="none" strike="noStrike" cap="none">
         <a:solidFill>
           <a:srgbClr val="000000"/>
         </a:solidFill>
@@ -688,11 +708,11 @@
 </file>
 
 <file path=ppt/notesSlides/notesSlide1.xml><?xml version="1.0" encoding="utf-8"?>
-<p:notes xmlns:a="http://schemas.openxmlformats.org/drawingml/2006/main" xmlns:r="http://schemas.openxmlformats.org/officeDocument/2006/relationships" xmlns:mc="http://schemas.openxmlformats.org/markup-compatibility/2006" xmlns:mv="urn:schemas-microsoft-com:mac:vml" xmlns:p="http://schemas.openxmlformats.org/presentationml/2006/main" xmlns:c="http://schemas.openxmlformats.org/drawingml/2006/chart" xmlns:dgm="http://schemas.openxmlformats.org/drawingml/2006/diagram" xmlns:o="urn:schemas-microsoft-com:office:office" xmlns:v="urn:schemas-microsoft-com:vml" xmlns:pvml="urn:schemas-microsoft-com:office:powerpoint" xmlns:com="http://schemas.openxmlformats.org/drawingml/2006/compatibility" xmlns:p14="http://schemas.microsoft.com/office/powerpoint/2010/main" xmlns:p15="http://schemas.microsoft.com/office/powerpoint/2012/main" showMasterPhAnim="0" showMasterSp="0">
+<p:notes xmlns:a="http://schemas.openxmlformats.org/drawingml/2006/main" xmlns:r="http://schemas.openxmlformats.org/officeDocument/2006/relationships" xmlns:p="http://schemas.openxmlformats.org/presentationml/2006/main" showMasterSp="0" showMasterPhAnim="0">
   <p:cSld>
     <p:spTree>
       <p:nvGrpSpPr>
-        <p:cNvPr id="68" name="Shape 68"/>
+        <p:cNvPr id="1" name="Shape 68"/>
         <p:cNvGrpSpPr/>
         <p:nvPr/>
       </p:nvGrpSpPr>
@@ -707,19 +727,26 @@
       <p:sp>
         <p:nvSpPr>
           <p:cNvPr id="69" name="Shape 69"/>
-          <p:cNvSpPr/>
+          <p:cNvSpPr>
+            <a:spLocks noGrp="1" noRot="1" noChangeAspect="1"/>
+          </p:cNvSpPr>
           <p:nvPr>
-            <p:ph idx="2" type="sldImg"/>
+            <p:ph type="sldImg" idx="2"/>
           </p:nvPr>
         </p:nvSpPr>
         <p:spPr>
           <a:xfrm>
-            <a:off x="381300" y="685800"/>
+            <a:off x="381000" y="685800"/>
             <a:ext cx="6096000" cy="3429000"/>
           </a:xfrm>
           <a:custGeom>
+            <a:avLst/>
+            <a:gdLst/>
+            <a:ahLst/>
+            <a:cxnLst/>
+            <a:rect l="0" t="0" r="0" b="0"/>
             <a:pathLst>
-              <a:path extrusionOk="0" h="120000" w="120000">
+              <a:path w="120000" h="120000" extrusionOk="0">
                 <a:moveTo>
                   <a:pt x="0" y="0"/>
                 </a:moveTo>
@@ -741,9 +768,11 @@
       <p:sp>
         <p:nvSpPr>
           <p:cNvPr id="70" name="Shape 70"/>
-          <p:cNvSpPr txBox="1"/>
+          <p:cNvSpPr txBox="1">
+            <a:spLocks noGrp="1"/>
+          </p:cNvSpPr>
           <p:nvPr>
-            <p:ph idx="1" type="body"/>
+            <p:ph type="body" idx="1"/>
           </p:nvPr>
         </p:nvSpPr>
         <p:spPr>
@@ -756,12 +785,12 @@
           </a:prstGeom>
         </p:spPr>
         <p:txBody>
-          <a:bodyPr anchorCtr="0" anchor="t" bIns="91425" lIns="91425" spcFirstLastPara="1" rIns="91425" wrap="square" tIns="91425">
+          <a:bodyPr spcFirstLastPara="1" wrap="square" lIns="91425" tIns="91425" rIns="91425" bIns="91425" anchor="t" anchorCtr="0">
             <a:noAutofit/>
           </a:bodyPr>
           <a:lstStyle/>
           <a:p>
-            <a:pPr indent="0" lvl="0" marL="0" rtl="0">
+            <a:pPr marL="0" lvl="0" indent="0" rtl="0">
               <a:spcBef>
                 <a:spcPts val="0"/>
               </a:spcBef>
@@ -770,9 +799,6 @@
               </a:spcAft>
               <a:buNone/>
             </a:pPr>
-            <a:r>
-              <a:t/>
-            </a:r>
             <a:endParaRPr/>
           </a:p>
         </p:txBody>
@@ -786,11 +812,11 @@
 </file>
 
 <file path=ppt/notesSlides/notesSlide2.xml><?xml version="1.0" encoding="utf-8"?>
-<p:notes xmlns:a="http://schemas.openxmlformats.org/drawingml/2006/main" xmlns:r="http://schemas.openxmlformats.org/officeDocument/2006/relationships" xmlns:mc="http://schemas.openxmlformats.org/markup-compatibility/2006" xmlns:mv="urn:schemas-microsoft-com:mac:vml" xmlns:p="http://schemas.openxmlformats.org/presentationml/2006/main" xmlns:c="http://schemas.openxmlformats.org/drawingml/2006/chart" xmlns:dgm="http://schemas.openxmlformats.org/drawingml/2006/diagram" xmlns:o="urn:schemas-microsoft-com:office:office" xmlns:v="urn:schemas-microsoft-com:vml" xmlns:pvml="urn:schemas-microsoft-com:office:powerpoint" xmlns:com="http://schemas.openxmlformats.org/drawingml/2006/compatibility" xmlns:p14="http://schemas.microsoft.com/office/powerpoint/2010/main" xmlns:p15="http://schemas.microsoft.com/office/powerpoint/2012/main" showMasterPhAnim="0" showMasterSp="0">
+<p:notes xmlns:a="http://schemas.openxmlformats.org/drawingml/2006/main" xmlns:r="http://schemas.openxmlformats.org/officeDocument/2006/relationships" xmlns:p="http://schemas.openxmlformats.org/presentationml/2006/main" showMasterSp="0" showMasterPhAnim="0">
   <p:cSld>
     <p:spTree>
       <p:nvGrpSpPr>
-        <p:cNvPr id="76" name="Shape 76"/>
+        <p:cNvPr id="1" name="Shape 76"/>
         <p:cNvGrpSpPr/>
         <p:nvPr/>
       </p:nvGrpSpPr>
@@ -805,19 +831,26 @@
       <p:sp>
         <p:nvSpPr>
           <p:cNvPr id="77" name="Shape 77"/>
-          <p:cNvSpPr/>
+          <p:cNvSpPr>
+            <a:spLocks noGrp="1" noRot="1" noChangeAspect="1"/>
+          </p:cNvSpPr>
           <p:nvPr>
-            <p:ph idx="2" type="sldImg"/>
+            <p:ph type="sldImg" idx="2"/>
           </p:nvPr>
         </p:nvSpPr>
         <p:spPr>
           <a:xfrm>
-            <a:off x="381300" y="685800"/>
+            <a:off x="381000" y="685800"/>
             <a:ext cx="6096000" cy="3429000"/>
           </a:xfrm>
           <a:custGeom>
+            <a:avLst/>
+            <a:gdLst/>
+            <a:ahLst/>
+            <a:cxnLst/>
+            <a:rect l="0" t="0" r="0" b="0"/>
             <a:pathLst>
-              <a:path extrusionOk="0" h="120000" w="120000">
+              <a:path w="120000" h="120000" extrusionOk="0">
                 <a:moveTo>
                   <a:pt x="0" y="0"/>
                 </a:moveTo>
@@ -839,9 +872,11 @@
       <p:sp>
         <p:nvSpPr>
           <p:cNvPr id="78" name="Shape 78"/>
-          <p:cNvSpPr txBox="1"/>
+          <p:cNvSpPr txBox="1">
+            <a:spLocks noGrp="1"/>
+          </p:cNvSpPr>
           <p:nvPr>
-            <p:ph idx="1" type="body"/>
+            <p:ph type="body" idx="1"/>
           </p:nvPr>
         </p:nvSpPr>
         <p:spPr>
@@ -854,12 +889,12 @@
           </a:prstGeom>
         </p:spPr>
         <p:txBody>
-          <a:bodyPr anchorCtr="0" anchor="t" bIns="91425" lIns="91425" spcFirstLastPara="1" rIns="91425" wrap="square" tIns="91425">
+          <a:bodyPr spcFirstLastPara="1" wrap="square" lIns="91425" tIns="91425" rIns="91425" bIns="91425" anchor="t" anchorCtr="0">
             <a:noAutofit/>
           </a:bodyPr>
           <a:lstStyle/>
           <a:p>
-            <a:pPr indent="0" lvl="0" marL="0" rtl="0">
+            <a:pPr marL="0" lvl="0" indent="0" rtl="0">
               <a:spcBef>
                 <a:spcPts val="0"/>
               </a:spcBef>
@@ -868,9 +903,6 @@
               </a:spcAft>
               <a:buNone/>
             </a:pPr>
-            <a:r>
-              <a:t/>
-            </a:r>
             <a:endParaRPr/>
           </a:p>
         </p:txBody>
@@ -884,11 +916,11 @@
 </file>
 
 <file path=ppt/notesSlides/notesSlide3.xml><?xml version="1.0" encoding="utf-8"?>
-<p:notes xmlns:a="http://schemas.openxmlformats.org/drawingml/2006/main" xmlns:r="http://schemas.openxmlformats.org/officeDocument/2006/relationships" xmlns:mc="http://schemas.openxmlformats.org/markup-compatibility/2006" xmlns:mv="urn:schemas-microsoft-com:mac:vml" xmlns:p="http://schemas.openxmlformats.org/presentationml/2006/main" xmlns:c="http://schemas.openxmlformats.org/drawingml/2006/chart" xmlns:dgm="http://schemas.openxmlformats.org/drawingml/2006/diagram" xmlns:o="urn:schemas-microsoft-com:office:office" xmlns:v="urn:schemas-microsoft-com:vml" xmlns:pvml="urn:schemas-microsoft-com:office:powerpoint" xmlns:com="http://schemas.openxmlformats.org/drawingml/2006/compatibility" xmlns:p14="http://schemas.microsoft.com/office/powerpoint/2010/main" xmlns:p15="http://schemas.microsoft.com/office/powerpoint/2012/main" showMasterPhAnim="0" showMasterSp="0">
+<p:notes xmlns:a="http://schemas.openxmlformats.org/drawingml/2006/main" xmlns:r="http://schemas.openxmlformats.org/officeDocument/2006/relationships" xmlns:p="http://schemas.openxmlformats.org/presentationml/2006/main" showMasterSp="0" showMasterPhAnim="0">
   <p:cSld>
     <p:spTree>
       <p:nvGrpSpPr>
-        <p:cNvPr id="82" name="Shape 82"/>
+        <p:cNvPr id="1" name="Shape 82"/>
         <p:cNvGrpSpPr/>
         <p:nvPr/>
       </p:nvGrpSpPr>
@@ -903,19 +935,26 @@
       <p:sp>
         <p:nvSpPr>
           <p:cNvPr id="83" name="Shape 83"/>
-          <p:cNvSpPr/>
+          <p:cNvSpPr>
+            <a:spLocks noGrp="1" noRot="1" noChangeAspect="1"/>
+          </p:cNvSpPr>
           <p:nvPr>
-            <p:ph idx="2" type="sldImg"/>
+            <p:ph type="sldImg" idx="2"/>
           </p:nvPr>
         </p:nvSpPr>
         <p:spPr>
           <a:xfrm>
-            <a:off x="381300" y="685800"/>
+            <a:off x="381000" y="685800"/>
             <a:ext cx="6096000" cy="3429000"/>
           </a:xfrm>
           <a:custGeom>
+            <a:avLst/>
+            <a:gdLst/>
+            <a:ahLst/>
+            <a:cxnLst/>
+            <a:rect l="0" t="0" r="0" b="0"/>
             <a:pathLst>
-              <a:path extrusionOk="0" h="120000" w="120000">
+              <a:path w="120000" h="120000" extrusionOk="0">
                 <a:moveTo>
                   <a:pt x="0" y="0"/>
                 </a:moveTo>
@@ -937,9 +976,11 @@
       <p:sp>
         <p:nvSpPr>
           <p:cNvPr id="84" name="Shape 84"/>
-          <p:cNvSpPr txBox="1"/>
+          <p:cNvSpPr txBox="1">
+            <a:spLocks noGrp="1"/>
+          </p:cNvSpPr>
           <p:nvPr>
-            <p:ph idx="1" type="body"/>
+            <p:ph type="body" idx="1"/>
           </p:nvPr>
         </p:nvSpPr>
         <p:spPr>
@@ -952,12 +993,12 @@
           </a:prstGeom>
         </p:spPr>
         <p:txBody>
-          <a:bodyPr anchorCtr="0" anchor="t" bIns="91425" lIns="91425" spcFirstLastPara="1" rIns="91425" wrap="square" tIns="91425">
+          <a:bodyPr spcFirstLastPara="1" wrap="square" lIns="91425" tIns="91425" rIns="91425" bIns="91425" anchor="t" anchorCtr="0">
             <a:noAutofit/>
           </a:bodyPr>
           <a:lstStyle/>
           <a:p>
-            <a:pPr indent="0" lvl="0" marL="0" rtl="0">
+            <a:pPr marL="0" lvl="0" indent="0" rtl="0">
               <a:spcBef>
                 <a:spcPts val="0"/>
               </a:spcBef>
@@ -966,9 +1007,6 @@
               </a:spcAft>
               <a:buNone/>
             </a:pPr>
-            <a:r>
-              <a:t/>
-            </a:r>
             <a:endParaRPr/>
           </a:p>
         </p:txBody>
@@ -982,11 +1020,11 @@
 </file>
 
 <file path=ppt/notesSlides/notesSlide4.xml><?xml version="1.0" encoding="utf-8"?>
-<p:notes xmlns:a="http://schemas.openxmlformats.org/drawingml/2006/main" xmlns:r="http://schemas.openxmlformats.org/officeDocument/2006/relationships" xmlns:mc="http://schemas.openxmlformats.org/markup-compatibility/2006" xmlns:mv="urn:schemas-microsoft-com:mac:vml" xmlns:p="http://schemas.openxmlformats.org/presentationml/2006/main" xmlns:c="http://schemas.openxmlformats.org/drawingml/2006/chart" xmlns:dgm="http://schemas.openxmlformats.org/drawingml/2006/diagram" xmlns:o="urn:schemas-microsoft-com:office:office" xmlns:v="urn:schemas-microsoft-com:vml" xmlns:pvml="urn:schemas-microsoft-com:office:powerpoint" xmlns:com="http://schemas.openxmlformats.org/drawingml/2006/compatibility" xmlns:p14="http://schemas.microsoft.com/office/powerpoint/2010/main" xmlns:p15="http://schemas.microsoft.com/office/powerpoint/2012/main" showMasterPhAnim="0" showMasterSp="0">
+<p:notes xmlns:a="http://schemas.openxmlformats.org/drawingml/2006/main" xmlns:r="http://schemas.openxmlformats.org/officeDocument/2006/relationships" xmlns:p="http://schemas.openxmlformats.org/presentationml/2006/main" showMasterSp="0" showMasterPhAnim="0">
   <p:cSld>
     <p:spTree>
       <p:nvGrpSpPr>
-        <p:cNvPr id="89" name="Shape 89"/>
+        <p:cNvPr id="1" name="Shape 89"/>
         <p:cNvGrpSpPr/>
         <p:nvPr/>
       </p:nvGrpSpPr>
@@ -1001,19 +1039,26 @@
       <p:sp>
         <p:nvSpPr>
           <p:cNvPr id="90" name="Shape 90"/>
-          <p:cNvSpPr/>
+          <p:cNvSpPr>
+            <a:spLocks noGrp="1" noRot="1" noChangeAspect="1"/>
+          </p:cNvSpPr>
           <p:nvPr>
-            <p:ph idx="2" type="sldImg"/>
+            <p:ph type="sldImg" idx="2"/>
           </p:nvPr>
         </p:nvSpPr>
         <p:spPr>
           <a:xfrm>
-            <a:off x="381300" y="685800"/>
+            <a:off x="381000" y="685800"/>
             <a:ext cx="6096000" cy="3429000"/>
           </a:xfrm>
           <a:custGeom>
+            <a:avLst/>
+            <a:gdLst/>
+            <a:ahLst/>
+            <a:cxnLst/>
+            <a:rect l="0" t="0" r="0" b="0"/>
             <a:pathLst>
-              <a:path extrusionOk="0" h="120000" w="120000">
+              <a:path w="120000" h="120000" extrusionOk="0">
                 <a:moveTo>
                   <a:pt x="0" y="0"/>
                 </a:moveTo>
@@ -1035,9 +1080,11 @@
       <p:sp>
         <p:nvSpPr>
           <p:cNvPr id="91" name="Shape 91"/>
-          <p:cNvSpPr txBox="1"/>
+          <p:cNvSpPr txBox="1">
+            <a:spLocks noGrp="1"/>
+          </p:cNvSpPr>
           <p:nvPr>
-            <p:ph idx="1" type="body"/>
+            <p:ph type="body" idx="1"/>
           </p:nvPr>
         </p:nvSpPr>
         <p:spPr>
@@ -1050,12 +1097,12 @@
           </a:prstGeom>
         </p:spPr>
         <p:txBody>
-          <a:bodyPr anchorCtr="0" anchor="t" bIns="91425" lIns="91425" spcFirstLastPara="1" rIns="91425" wrap="square" tIns="91425">
+          <a:bodyPr spcFirstLastPara="1" wrap="square" lIns="91425" tIns="91425" rIns="91425" bIns="91425" anchor="t" anchorCtr="0">
             <a:noAutofit/>
           </a:bodyPr>
           <a:lstStyle/>
           <a:p>
-            <a:pPr indent="0" lvl="0" marL="0" rtl="0">
+            <a:pPr marL="0" lvl="0" indent="0" rtl="0">
               <a:spcBef>
                 <a:spcPts val="0"/>
               </a:spcBef>
@@ -1064,9 +1111,6 @@
               </a:spcAft>
               <a:buNone/>
             </a:pPr>
-            <a:r>
-              <a:t/>
-            </a:r>
             <a:endParaRPr/>
           </a:p>
         </p:txBody>
@@ -1080,11 +1124,11 @@
 </file>
 
 <file path=ppt/notesSlides/notesSlide5.xml><?xml version="1.0" encoding="utf-8"?>
-<p:notes xmlns:a="http://schemas.openxmlformats.org/drawingml/2006/main" xmlns:r="http://schemas.openxmlformats.org/officeDocument/2006/relationships" xmlns:mc="http://schemas.openxmlformats.org/markup-compatibility/2006" xmlns:mv="urn:schemas-microsoft-com:mac:vml" xmlns:p="http://schemas.openxmlformats.org/presentationml/2006/main" xmlns:c="http://schemas.openxmlformats.org/drawingml/2006/chart" xmlns:dgm="http://schemas.openxmlformats.org/drawingml/2006/diagram" xmlns:o="urn:schemas-microsoft-com:office:office" xmlns:v="urn:schemas-microsoft-com:vml" xmlns:pvml="urn:schemas-microsoft-com:office:powerpoint" xmlns:com="http://schemas.openxmlformats.org/drawingml/2006/compatibility" xmlns:p14="http://schemas.microsoft.com/office/powerpoint/2010/main" xmlns:p15="http://schemas.microsoft.com/office/powerpoint/2012/main" showMasterPhAnim="0" showMasterSp="0">
+<p:notes xmlns:a="http://schemas.openxmlformats.org/drawingml/2006/main" xmlns:r="http://schemas.openxmlformats.org/officeDocument/2006/relationships" xmlns:p="http://schemas.openxmlformats.org/presentationml/2006/main" showMasterSp="0" showMasterPhAnim="0">
   <p:cSld>
     <p:spTree>
       <p:nvGrpSpPr>
-        <p:cNvPr id="94" name="Shape 94"/>
+        <p:cNvPr id="1" name="Shape 94"/>
         <p:cNvGrpSpPr/>
         <p:nvPr/>
       </p:nvGrpSpPr>
@@ -1099,19 +1143,26 @@
       <p:sp>
         <p:nvSpPr>
           <p:cNvPr id="95" name="Shape 95"/>
-          <p:cNvSpPr/>
+          <p:cNvSpPr>
+            <a:spLocks noGrp="1" noRot="1" noChangeAspect="1"/>
+          </p:cNvSpPr>
           <p:nvPr>
-            <p:ph idx="2" type="sldImg"/>
+            <p:ph type="sldImg" idx="2"/>
           </p:nvPr>
         </p:nvSpPr>
         <p:spPr>
           <a:xfrm>
-            <a:off x="381300" y="685800"/>
+            <a:off x="381000" y="685800"/>
             <a:ext cx="6096000" cy="3429000"/>
           </a:xfrm>
           <a:custGeom>
+            <a:avLst/>
+            <a:gdLst/>
+            <a:ahLst/>
+            <a:cxnLst/>
+            <a:rect l="0" t="0" r="0" b="0"/>
             <a:pathLst>
-              <a:path extrusionOk="0" h="120000" w="120000">
+              <a:path w="120000" h="120000" extrusionOk="0">
                 <a:moveTo>
                   <a:pt x="0" y="0"/>
                 </a:moveTo>
@@ -1133,9 +1184,11 @@
       <p:sp>
         <p:nvSpPr>
           <p:cNvPr id="96" name="Shape 96"/>
-          <p:cNvSpPr txBox="1"/>
+          <p:cNvSpPr txBox="1">
+            <a:spLocks noGrp="1"/>
+          </p:cNvSpPr>
           <p:nvPr>
-            <p:ph idx="1" type="body"/>
+            <p:ph type="body" idx="1"/>
           </p:nvPr>
         </p:nvSpPr>
         <p:spPr>
@@ -1148,12 +1201,12 @@
           </a:prstGeom>
         </p:spPr>
         <p:txBody>
-          <a:bodyPr anchorCtr="0" anchor="t" bIns="91425" lIns="91425" spcFirstLastPara="1" rIns="91425" wrap="square" tIns="91425">
+          <a:bodyPr spcFirstLastPara="1" wrap="square" lIns="91425" tIns="91425" rIns="91425" bIns="91425" anchor="t" anchorCtr="0">
             <a:noAutofit/>
           </a:bodyPr>
           <a:lstStyle/>
           <a:p>
-            <a:pPr indent="0" lvl="0" marL="0" rtl="0">
+            <a:pPr marL="0" lvl="0" indent="0" rtl="0">
               <a:spcBef>
                 <a:spcPts val="0"/>
               </a:spcBef>
@@ -1162,9 +1215,6 @@
               </a:spcAft>
               <a:buNone/>
             </a:pPr>
-            <a:r>
-              <a:t/>
-            </a:r>
             <a:endParaRPr/>
           </a:p>
         </p:txBody>
@@ -1178,18 +1228,19 @@
 </file>
 
 <file path=ppt/slideLayouts/slideLayout1.xml><?xml version="1.0" encoding="utf-8"?>
-<p:sldLayout xmlns:a="http://schemas.openxmlformats.org/drawingml/2006/main" xmlns:r="http://schemas.openxmlformats.org/officeDocument/2006/relationships" xmlns:mc="http://schemas.openxmlformats.org/markup-compatibility/2006" xmlns:mv="urn:schemas-microsoft-com:mac:vml" xmlns:p="http://schemas.openxmlformats.org/presentationml/2006/main" xmlns:c="http://schemas.openxmlformats.org/drawingml/2006/chart" xmlns:dgm="http://schemas.openxmlformats.org/drawingml/2006/diagram" xmlns:o="urn:schemas-microsoft-com:office:office" xmlns:v="urn:schemas-microsoft-com:vml" xmlns:pvml="urn:schemas-microsoft-com:office:powerpoint" xmlns:com="http://schemas.openxmlformats.org/drawingml/2006/compatibility" xmlns:p14="http://schemas.microsoft.com/office/powerpoint/2010/main" xmlns:p15="http://schemas.microsoft.com/office/powerpoint/2012/main" matchingName="Title slide" type="title">
+<p:sldLayout xmlns:a="http://schemas.openxmlformats.org/drawingml/2006/main" xmlns:r="http://schemas.openxmlformats.org/officeDocument/2006/relationships" xmlns:p="http://schemas.openxmlformats.org/presentationml/2006/main" matchingName="Title slide" type="title">
   <p:cSld name="TITLE">
     <p:bg>
       <p:bgPr>
         <a:solidFill>
           <a:schemeClr val="dk1"/>
         </a:solidFill>
+        <a:effectLst/>
       </p:bgPr>
     </p:bg>
     <p:spTree>
       <p:nvGrpSpPr>
-        <p:cNvPr id="9" name="Shape 9"/>
+        <p:cNvPr id="1" name="Shape 9"/>
         <p:cNvGrpSpPr/>
         <p:nvPr/>
       </p:nvGrpSpPr>
@@ -1216,14 +1267,14 @@
             <a:avLst/>
           </a:prstGeom>
           <a:noFill/>
-          <a:ln cap="flat" cmpd="sng" w="38100">
+          <a:ln w="38100" cap="flat" cmpd="sng">
             <a:solidFill>
               <a:schemeClr val="lt1"/>
             </a:solidFill>
             <a:prstDash val="solid"/>
             <a:round/>
-            <a:headEnd len="sm" w="sm" type="none"/>
-            <a:tailEnd len="sm" w="sm" type="none"/>
+            <a:headEnd type="none" w="sm" len="sm"/>
+            <a:tailEnd type="none" w="sm" len="sm"/>
           </a:ln>
         </p:spPr>
       </p:cxnSp>
@@ -1242,14 +1293,14 @@
             <a:avLst/>
           </a:prstGeom>
           <a:noFill/>
-          <a:ln cap="flat" cmpd="sng" w="19050">
+          <a:ln w="19050" cap="flat" cmpd="sng">
             <a:solidFill>
               <a:schemeClr val="lt1"/>
             </a:solidFill>
             <a:prstDash val="solid"/>
             <a:round/>
-            <a:headEnd len="sm" w="sm" type="none"/>
-            <a:tailEnd len="sm" w="sm" type="none"/>
+            <a:headEnd type="none" w="sm" len="sm"/>
+            <a:tailEnd type="none" w="sm" len="sm"/>
           </a:ln>
         </p:spPr>
       </p:cxnSp>
@@ -1268,21 +1319,23 @@
             <a:avLst/>
           </a:prstGeom>
           <a:noFill/>
-          <a:ln cap="flat" cmpd="sng" w="19050">
+          <a:ln w="19050" cap="flat" cmpd="sng">
             <a:solidFill>
               <a:schemeClr val="lt1"/>
             </a:solidFill>
             <a:prstDash val="solid"/>
             <a:round/>
-            <a:headEnd len="sm" w="sm" type="none"/>
-            <a:tailEnd len="sm" w="sm" type="none"/>
+            <a:headEnd type="none" w="sm" len="sm"/>
+            <a:tailEnd type="none" w="sm" len="sm"/>
           </a:ln>
         </p:spPr>
       </p:cxnSp>
       <p:sp>
         <p:nvSpPr>
           <p:cNvPr id="13" name="Shape 13"/>
-          <p:cNvSpPr txBox="1"/>
+          <p:cNvSpPr txBox="1">
+            <a:spLocks noGrp="1"/>
+          </p:cNvSpPr>
           <p:nvPr>
             <p:ph type="ctrTitle"/>
           </p:nvPr>
@@ -1297,7 +1350,7 @@
           </a:prstGeom>
         </p:spPr>
         <p:txBody>
-          <a:bodyPr anchorCtr="0" anchor="t" bIns="91425" lIns="91425" spcFirstLastPara="1" rIns="91425" wrap="square" tIns="91425"/>
+          <a:bodyPr spcFirstLastPara="1" wrap="square" lIns="91425" tIns="91425" rIns="91425" bIns="91425" anchor="t" anchorCtr="0"/>
           <a:lstStyle>
             <a:lvl1pPr lvl="0" rtl="0">
               <a:spcBef>
@@ -1462,15 +1515,19 @@
               </a:defRPr>
             </a:lvl9pPr>
           </a:lstStyle>
-          <a:p/>
+          <a:p>
+            <a:endParaRPr/>
+          </a:p>
         </p:txBody>
       </p:sp>
       <p:sp>
         <p:nvSpPr>
           <p:cNvPr id="14" name="Shape 14"/>
-          <p:cNvSpPr txBox="1"/>
+          <p:cNvSpPr txBox="1">
+            <a:spLocks noGrp="1"/>
+          </p:cNvSpPr>
           <p:nvPr>
-            <p:ph idx="1" type="subTitle"/>
+            <p:ph type="subTitle" idx="1"/>
           </p:nvPr>
         </p:nvSpPr>
         <p:spPr>
@@ -1483,7 +1540,7 @@
           </a:prstGeom>
         </p:spPr>
         <p:txBody>
-          <a:bodyPr anchorCtr="0" anchor="b" bIns="91425" lIns="91425" spcFirstLastPara="1" rIns="91425" wrap="square" tIns="91425"/>
+          <a:bodyPr spcFirstLastPara="1" wrap="square" lIns="91425" tIns="91425" rIns="91425" bIns="91425" anchor="b" anchorCtr="0"/>
           <a:lstStyle>
             <a:lvl1pPr lvl="0" rtl="0">
               <a:lnSpc>
@@ -1675,15 +1732,19 @@
               </a:defRPr>
             </a:lvl9pPr>
           </a:lstStyle>
-          <a:p/>
+          <a:p>
+            <a:endParaRPr/>
+          </a:p>
         </p:txBody>
       </p:sp>
       <p:sp>
         <p:nvSpPr>
           <p:cNvPr id="15" name="Shape 15"/>
-          <p:cNvSpPr txBox="1"/>
+          <p:cNvSpPr txBox="1">
+            <a:spLocks noGrp="1"/>
+          </p:cNvSpPr>
           <p:nvPr>
-            <p:ph idx="12" type="sldNum"/>
+            <p:ph type="sldNum" idx="12"/>
           </p:nvPr>
         </p:nvSpPr>
         <p:spPr>
@@ -1696,7 +1757,7 @@
           </a:prstGeom>
         </p:spPr>
         <p:txBody>
-          <a:bodyPr anchorCtr="0" anchor="ctr" bIns="91425" lIns="91425" spcFirstLastPara="1" rIns="91425" wrap="square" tIns="91425">
+          <a:bodyPr spcFirstLastPara="1" wrap="square" lIns="91425" tIns="91425" rIns="91425" bIns="91425" anchor="ctr" anchorCtr="0">
             <a:noAutofit/>
           </a:bodyPr>
           <a:lstStyle>
@@ -1774,7 +1835,7 @@
             </a:lvl9pPr>
           </a:lstStyle>
           <a:p>
-            <a:pPr indent="0" lvl="0" marL="0">
+            <a:pPr marL="0" lvl="0" indent="0">
               <a:spcBef>
                 <a:spcPts val="0"/>
               </a:spcBef>
@@ -1800,11 +1861,11 @@
 </file>
 
 <file path=ppt/slideLayouts/slideLayout10.xml><?xml version="1.0" encoding="utf-8"?>
-<p:sldLayout xmlns:a="http://schemas.openxmlformats.org/drawingml/2006/main" xmlns:r="http://schemas.openxmlformats.org/officeDocument/2006/relationships" xmlns:mc="http://schemas.openxmlformats.org/markup-compatibility/2006" xmlns:mv="urn:schemas-microsoft-com:mac:vml" xmlns:p="http://schemas.openxmlformats.org/presentationml/2006/main" xmlns:c="http://schemas.openxmlformats.org/drawingml/2006/chart" xmlns:dgm="http://schemas.openxmlformats.org/drawingml/2006/diagram" xmlns:o="urn:schemas-microsoft-com:office:office" xmlns:v="urn:schemas-microsoft-com:vml" xmlns:pvml="urn:schemas-microsoft-com:office:powerpoint" xmlns:com="http://schemas.openxmlformats.org/drawingml/2006/compatibility" xmlns:p14="http://schemas.microsoft.com/office/powerpoint/2010/main" xmlns:p15="http://schemas.microsoft.com/office/powerpoint/2012/main" matchingName="Big number">
+<p:sldLayout xmlns:a="http://schemas.openxmlformats.org/drawingml/2006/main" xmlns:r="http://schemas.openxmlformats.org/officeDocument/2006/relationships" xmlns:p="http://schemas.openxmlformats.org/presentationml/2006/main" matchingName="Big number">
   <p:cSld name="BIG_NUMBER">
     <p:spTree>
       <p:nvGrpSpPr>
-        <p:cNvPr id="60" name="Shape 60"/>
+        <p:cNvPr id="1" name="Shape 60"/>
         <p:cNvGrpSpPr/>
         <p:nvPr/>
       </p:nvGrpSpPr>
@@ -1831,14 +1892,14 @@
             <a:avLst/>
           </a:prstGeom>
           <a:noFill/>
-          <a:ln cap="flat" cmpd="sng" w="19050">
+          <a:ln w="19050" cap="flat" cmpd="sng">
             <a:solidFill>
               <a:schemeClr val="dk2"/>
             </a:solidFill>
             <a:prstDash val="solid"/>
             <a:round/>
-            <a:headEnd len="sm" w="sm" type="none"/>
-            <a:tailEnd len="sm" w="sm" type="none"/>
+            <a:headEnd type="none" w="sm" len="sm"/>
+            <a:tailEnd type="none" w="sm" len="sm"/>
           </a:ln>
         </p:spPr>
       </p:cxnSp>
@@ -1857,21 +1918,23 @@
             <a:avLst/>
           </a:prstGeom>
           <a:noFill/>
-          <a:ln cap="flat" cmpd="sng" w="38100">
+          <a:ln w="38100" cap="flat" cmpd="sng">
             <a:solidFill>
               <a:schemeClr val="dk2"/>
             </a:solidFill>
             <a:prstDash val="solid"/>
             <a:round/>
-            <a:headEnd len="sm" w="sm" type="none"/>
-            <a:tailEnd len="sm" w="sm" type="none"/>
+            <a:headEnd type="none" w="sm" len="sm"/>
+            <a:tailEnd type="none" w="sm" len="sm"/>
           </a:ln>
         </p:spPr>
       </p:cxnSp>
       <p:sp>
         <p:nvSpPr>
           <p:cNvPr id="63" name="Shape 63"/>
-          <p:cNvSpPr txBox="1"/>
+          <p:cNvSpPr txBox="1">
+            <a:spLocks noGrp="1"/>
+          </p:cNvSpPr>
           <p:nvPr>
             <p:ph type="title"/>
           </p:nvPr>
@@ -1886,9 +1949,9 @@
           </a:prstGeom>
         </p:spPr>
         <p:txBody>
-          <a:bodyPr anchorCtr="0" anchor="ctr" bIns="91425" lIns="91425" spcFirstLastPara="1" rIns="91425" wrap="square" tIns="91425"/>
+          <a:bodyPr spcFirstLastPara="1" wrap="square" lIns="91425" tIns="91425" rIns="91425" bIns="91425" anchor="ctr" anchorCtr="0"/>
           <a:lstStyle>
-            <a:lvl1pPr lvl="0" rtl="0" algn="ctr">
+            <a:lvl1pPr lvl="0" algn="ctr" rtl="0">
               <a:spcBef>
                 <a:spcPts val="0"/>
               </a:spcBef>
@@ -1911,7 +1974,7 @@
                 <a:sym typeface="Lato"/>
               </a:defRPr>
             </a:lvl1pPr>
-            <a:lvl2pPr lvl="1" rtl="0" algn="ctr">
+            <a:lvl2pPr lvl="1" algn="ctr" rtl="0">
               <a:spcBef>
                 <a:spcPts val="0"/>
               </a:spcBef>
@@ -1934,7 +1997,7 @@
                 <a:sym typeface="Lato"/>
               </a:defRPr>
             </a:lvl2pPr>
-            <a:lvl3pPr lvl="2" rtl="0" algn="ctr">
+            <a:lvl3pPr lvl="2" algn="ctr" rtl="0">
               <a:spcBef>
                 <a:spcPts val="0"/>
               </a:spcBef>
@@ -1957,7 +2020,7 @@
                 <a:sym typeface="Lato"/>
               </a:defRPr>
             </a:lvl3pPr>
-            <a:lvl4pPr lvl="3" rtl="0" algn="ctr">
+            <a:lvl4pPr lvl="3" algn="ctr" rtl="0">
               <a:spcBef>
                 <a:spcPts val="0"/>
               </a:spcBef>
@@ -1980,7 +2043,7 @@
                 <a:sym typeface="Lato"/>
               </a:defRPr>
             </a:lvl4pPr>
-            <a:lvl5pPr lvl="4" rtl="0" algn="ctr">
+            <a:lvl5pPr lvl="4" algn="ctr" rtl="0">
               <a:spcBef>
                 <a:spcPts val="0"/>
               </a:spcBef>
@@ -2003,7 +2066,7 @@
                 <a:sym typeface="Lato"/>
               </a:defRPr>
             </a:lvl5pPr>
-            <a:lvl6pPr lvl="5" rtl="0" algn="ctr">
+            <a:lvl6pPr lvl="5" algn="ctr" rtl="0">
               <a:spcBef>
                 <a:spcPts val="0"/>
               </a:spcBef>
@@ -2026,7 +2089,7 @@
                 <a:sym typeface="Lato"/>
               </a:defRPr>
             </a:lvl6pPr>
-            <a:lvl7pPr lvl="6" rtl="0" algn="ctr">
+            <a:lvl7pPr lvl="6" algn="ctr" rtl="0">
               <a:spcBef>
                 <a:spcPts val="0"/>
               </a:spcBef>
@@ -2049,7 +2112,7 @@
                 <a:sym typeface="Lato"/>
               </a:defRPr>
             </a:lvl7pPr>
-            <a:lvl8pPr lvl="7" rtl="0" algn="ctr">
+            <a:lvl8pPr lvl="7" algn="ctr" rtl="0">
               <a:spcBef>
                 <a:spcPts val="0"/>
               </a:spcBef>
@@ -2072,7 +2135,7 @@
                 <a:sym typeface="Lato"/>
               </a:defRPr>
             </a:lvl8pPr>
-            <a:lvl9pPr lvl="8" rtl="0" algn="ctr">
+            <a:lvl9pPr lvl="8" algn="ctr" rtl="0">
               <a:spcBef>
                 <a:spcPts val="0"/>
               </a:spcBef>
@@ -2096,15 +2159,19 @@
               </a:defRPr>
             </a:lvl9pPr>
           </a:lstStyle>
-          <a:p/>
+          <a:p>
+            <a:endParaRPr/>
+          </a:p>
         </p:txBody>
       </p:sp>
       <p:sp>
         <p:nvSpPr>
           <p:cNvPr id="64" name="Shape 64"/>
-          <p:cNvSpPr txBox="1"/>
+          <p:cNvSpPr txBox="1">
+            <a:spLocks noGrp="1"/>
+          </p:cNvSpPr>
           <p:nvPr>
-            <p:ph idx="1" type="body"/>
+            <p:ph type="body" idx="1"/>
           </p:nvPr>
         </p:nvSpPr>
         <p:spPr>
@@ -2117,9 +2184,9 @@
           </a:prstGeom>
         </p:spPr>
         <p:txBody>
-          <a:bodyPr anchorCtr="0" anchor="t" bIns="91425" lIns="91425" spcFirstLastPara="1" rIns="91425" wrap="square" tIns="91425"/>
+          <a:bodyPr spcFirstLastPara="1" wrap="square" lIns="91425" tIns="91425" rIns="91425" bIns="91425" anchor="t" anchorCtr="0"/>
           <a:lstStyle>
-            <a:lvl1pPr indent="-342900" lvl="0" marL="457200" rtl="0" algn="ctr">
+            <a:lvl1pPr marL="457200" lvl="0" indent="-342900" algn="ctr" rtl="0">
               <a:spcBef>
                 <a:spcPts val="0"/>
               </a:spcBef>
@@ -2130,7 +2197,7 @@
               <a:buChar char="●"/>
               <a:defRPr/>
             </a:lvl1pPr>
-            <a:lvl2pPr indent="-317500" lvl="1" marL="914400" rtl="0" algn="ctr">
+            <a:lvl2pPr marL="914400" lvl="1" indent="-317500" algn="ctr" rtl="0">
               <a:spcBef>
                 <a:spcPts val="1600"/>
               </a:spcBef>
@@ -2141,7 +2208,7 @@
               <a:buChar char="○"/>
               <a:defRPr/>
             </a:lvl2pPr>
-            <a:lvl3pPr indent="-317500" lvl="2" marL="1371600" rtl="0" algn="ctr">
+            <a:lvl3pPr marL="1371600" lvl="2" indent="-317500" algn="ctr" rtl="0">
               <a:spcBef>
                 <a:spcPts val="1600"/>
               </a:spcBef>
@@ -2152,7 +2219,7 @@
               <a:buChar char="■"/>
               <a:defRPr/>
             </a:lvl3pPr>
-            <a:lvl4pPr indent="-317500" lvl="3" marL="1828800" rtl="0" algn="ctr">
+            <a:lvl4pPr marL="1828800" lvl="3" indent="-317500" algn="ctr" rtl="0">
               <a:spcBef>
                 <a:spcPts val="1600"/>
               </a:spcBef>
@@ -2163,7 +2230,7 @@
               <a:buChar char="●"/>
               <a:defRPr/>
             </a:lvl4pPr>
-            <a:lvl5pPr indent="-317500" lvl="4" marL="2286000" rtl="0" algn="ctr">
+            <a:lvl5pPr marL="2286000" lvl="4" indent="-317500" algn="ctr" rtl="0">
               <a:spcBef>
                 <a:spcPts val="1600"/>
               </a:spcBef>
@@ -2174,7 +2241,7 @@
               <a:buChar char="○"/>
               <a:defRPr/>
             </a:lvl5pPr>
-            <a:lvl6pPr indent="-317500" lvl="5" marL="2743200" rtl="0" algn="ctr">
+            <a:lvl6pPr marL="2743200" lvl="5" indent="-317500" algn="ctr" rtl="0">
               <a:spcBef>
                 <a:spcPts val="1600"/>
               </a:spcBef>
@@ -2185,7 +2252,7 @@
               <a:buChar char="■"/>
               <a:defRPr/>
             </a:lvl6pPr>
-            <a:lvl7pPr indent="-317500" lvl="6" marL="3200400" rtl="0" algn="ctr">
+            <a:lvl7pPr marL="3200400" lvl="6" indent="-317500" algn="ctr" rtl="0">
               <a:spcBef>
                 <a:spcPts val="1600"/>
               </a:spcBef>
@@ -2196,7 +2263,7 @@
               <a:buChar char="●"/>
               <a:defRPr/>
             </a:lvl7pPr>
-            <a:lvl8pPr indent="-317500" lvl="7" marL="3657600" rtl="0" algn="ctr">
+            <a:lvl8pPr marL="3657600" lvl="7" indent="-317500" algn="ctr" rtl="0">
               <a:spcBef>
                 <a:spcPts val="1600"/>
               </a:spcBef>
@@ -2207,7 +2274,7 @@
               <a:buChar char="○"/>
               <a:defRPr/>
             </a:lvl8pPr>
-            <a:lvl9pPr indent="-317500" lvl="8" marL="4114800" rtl="0" algn="ctr">
+            <a:lvl9pPr marL="4114800" lvl="8" indent="-317500" algn="ctr" rtl="0">
               <a:spcBef>
                 <a:spcPts val="1600"/>
               </a:spcBef>
@@ -2219,15 +2286,19 @@
               <a:defRPr/>
             </a:lvl9pPr>
           </a:lstStyle>
-          <a:p/>
+          <a:p>
+            <a:endParaRPr/>
+          </a:p>
         </p:txBody>
       </p:sp>
       <p:sp>
         <p:nvSpPr>
           <p:cNvPr id="65" name="Shape 65"/>
-          <p:cNvSpPr txBox="1"/>
+          <p:cNvSpPr txBox="1">
+            <a:spLocks noGrp="1"/>
+          </p:cNvSpPr>
           <p:nvPr>
-            <p:ph idx="12" type="sldNum"/>
+            <p:ph type="sldNum" idx="12"/>
           </p:nvPr>
         </p:nvSpPr>
         <p:spPr>
@@ -2240,7 +2311,7 @@
           </a:prstGeom>
         </p:spPr>
         <p:txBody>
-          <a:bodyPr anchorCtr="0" anchor="ctr" bIns="91425" lIns="91425" spcFirstLastPara="1" rIns="91425" wrap="square" tIns="91425">
+          <a:bodyPr spcFirstLastPara="1" wrap="square" lIns="91425" tIns="91425" rIns="91425" bIns="91425" anchor="ctr" anchorCtr="0">
             <a:noAutofit/>
           </a:bodyPr>
           <a:lstStyle>
@@ -2282,7 +2353,7 @@
             </a:lvl9pPr>
           </a:lstStyle>
           <a:p>
-            <a:pPr indent="0" lvl="0" marL="0">
+            <a:pPr marL="0" lvl="0" indent="0">
               <a:spcBef>
                 <a:spcPts val="0"/>
               </a:spcBef>
@@ -2308,11 +2379,11 @@
 </file>
 
 <file path=ppt/slideLayouts/slideLayout11.xml><?xml version="1.0" encoding="utf-8"?>
-<p:sldLayout xmlns:a="http://schemas.openxmlformats.org/drawingml/2006/main" xmlns:r="http://schemas.openxmlformats.org/officeDocument/2006/relationships" xmlns:mc="http://schemas.openxmlformats.org/markup-compatibility/2006" xmlns:mv="urn:schemas-microsoft-com:mac:vml" xmlns:p="http://schemas.openxmlformats.org/presentationml/2006/main" xmlns:c="http://schemas.openxmlformats.org/drawingml/2006/chart" xmlns:dgm="http://schemas.openxmlformats.org/drawingml/2006/diagram" xmlns:o="urn:schemas-microsoft-com:office:office" xmlns:v="urn:schemas-microsoft-com:vml" xmlns:pvml="urn:schemas-microsoft-com:office:powerpoint" xmlns:com="http://schemas.openxmlformats.org/drawingml/2006/compatibility" xmlns:p14="http://schemas.microsoft.com/office/powerpoint/2010/main" xmlns:p15="http://schemas.microsoft.com/office/powerpoint/2012/main" matchingName="Blank" type="blank">
+<p:sldLayout xmlns:a="http://schemas.openxmlformats.org/drawingml/2006/main" xmlns:r="http://schemas.openxmlformats.org/officeDocument/2006/relationships" xmlns:p="http://schemas.openxmlformats.org/presentationml/2006/main" matchingName="Blank" type="blank">
   <p:cSld name="BLANK">
     <p:spTree>
       <p:nvGrpSpPr>
-        <p:cNvPr id="66" name="Shape 66"/>
+        <p:cNvPr id="1" name="Shape 66"/>
         <p:cNvGrpSpPr/>
         <p:nvPr/>
       </p:nvGrpSpPr>
@@ -2327,9 +2398,11 @@
       <p:sp>
         <p:nvSpPr>
           <p:cNvPr id="67" name="Shape 67"/>
-          <p:cNvSpPr txBox="1"/>
+          <p:cNvSpPr txBox="1">
+            <a:spLocks noGrp="1"/>
+          </p:cNvSpPr>
           <p:nvPr>
-            <p:ph idx="12" type="sldNum"/>
+            <p:ph type="sldNum" idx="12"/>
           </p:nvPr>
         </p:nvSpPr>
         <p:spPr>
@@ -2342,7 +2415,7 @@
           </a:prstGeom>
         </p:spPr>
         <p:txBody>
-          <a:bodyPr anchorCtr="0" anchor="ctr" bIns="91425" lIns="91425" spcFirstLastPara="1" rIns="91425" wrap="square" tIns="91425">
+          <a:bodyPr spcFirstLastPara="1" wrap="square" lIns="91425" tIns="91425" rIns="91425" bIns="91425" anchor="ctr" anchorCtr="0">
             <a:noAutofit/>
           </a:bodyPr>
           <a:lstStyle>
@@ -2384,7 +2457,7 @@
             </a:lvl9pPr>
           </a:lstStyle>
           <a:p>
-            <a:pPr indent="0" lvl="0" marL="0">
+            <a:pPr marL="0" lvl="0" indent="0">
               <a:spcBef>
                 <a:spcPts val="0"/>
               </a:spcBef>
@@ -2410,18 +2483,19 @@
 </file>
 
 <file path=ppt/slideLayouts/slideLayout2.xml><?xml version="1.0" encoding="utf-8"?>
-<p:sldLayout xmlns:a="http://schemas.openxmlformats.org/drawingml/2006/main" xmlns:r="http://schemas.openxmlformats.org/officeDocument/2006/relationships" xmlns:mc="http://schemas.openxmlformats.org/markup-compatibility/2006" xmlns:mv="urn:schemas-microsoft-com:mac:vml" xmlns:p="http://schemas.openxmlformats.org/presentationml/2006/main" xmlns:c="http://schemas.openxmlformats.org/drawingml/2006/chart" xmlns:dgm="http://schemas.openxmlformats.org/drawingml/2006/diagram" xmlns:o="urn:schemas-microsoft-com:office:office" xmlns:v="urn:schemas-microsoft-com:vml" xmlns:pvml="urn:schemas-microsoft-com:office:powerpoint" xmlns:com="http://schemas.openxmlformats.org/drawingml/2006/compatibility" xmlns:p14="http://schemas.microsoft.com/office/powerpoint/2010/main" xmlns:p15="http://schemas.microsoft.com/office/powerpoint/2012/main" matchingName="Section header" type="secHead">
+<p:sldLayout xmlns:a="http://schemas.openxmlformats.org/drawingml/2006/main" xmlns:r="http://schemas.openxmlformats.org/officeDocument/2006/relationships" xmlns:p="http://schemas.openxmlformats.org/presentationml/2006/main" matchingName="Section header" type="secHead">
   <p:cSld name="SECTION_HEADER">
     <p:bg>
       <p:bgPr>
         <a:solidFill>
           <a:schemeClr val="dk1"/>
         </a:solidFill>
+        <a:effectLst/>
       </p:bgPr>
     </p:bg>
     <p:spTree>
       <p:nvGrpSpPr>
-        <p:cNvPr id="16" name="Shape 16"/>
+        <p:cNvPr id="1" name="Shape 16"/>
         <p:cNvGrpSpPr/>
         <p:nvPr/>
       </p:nvGrpSpPr>
@@ -2448,14 +2522,14 @@
             <a:avLst/>
           </a:prstGeom>
           <a:noFill/>
-          <a:ln cap="flat" cmpd="sng" w="38100">
+          <a:ln w="38100" cap="flat" cmpd="sng">
             <a:solidFill>
               <a:schemeClr val="lt1"/>
             </a:solidFill>
             <a:prstDash val="solid"/>
             <a:round/>
-            <a:headEnd len="sm" w="sm" type="none"/>
-            <a:tailEnd len="sm" w="sm" type="none"/>
+            <a:headEnd type="none" w="sm" len="sm"/>
+            <a:tailEnd type="none" w="sm" len="sm"/>
           </a:ln>
         </p:spPr>
       </p:cxnSp>
@@ -2474,21 +2548,23 @@
             <a:avLst/>
           </a:prstGeom>
           <a:noFill/>
-          <a:ln cap="flat" cmpd="sng" w="19050">
+          <a:ln w="19050" cap="flat" cmpd="sng">
             <a:solidFill>
               <a:schemeClr val="lt1"/>
             </a:solidFill>
             <a:prstDash val="solid"/>
             <a:round/>
-            <a:headEnd len="sm" w="sm" type="none"/>
-            <a:tailEnd len="sm" w="sm" type="none"/>
+            <a:headEnd type="none" w="sm" len="sm"/>
+            <a:tailEnd type="none" w="sm" len="sm"/>
           </a:ln>
         </p:spPr>
       </p:cxnSp>
       <p:sp>
         <p:nvSpPr>
           <p:cNvPr id="19" name="Shape 19"/>
-          <p:cNvSpPr txBox="1"/>
+          <p:cNvSpPr txBox="1">
+            <a:spLocks noGrp="1"/>
+          </p:cNvSpPr>
           <p:nvPr>
             <p:ph type="title"/>
           </p:nvPr>
@@ -2503,9 +2579,9 @@
           </a:prstGeom>
         </p:spPr>
         <p:txBody>
-          <a:bodyPr anchorCtr="0" anchor="ctr" bIns="91425" lIns="91425" spcFirstLastPara="1" rIns="91425" wrap="square" tIns="91425"/>
+          <a:bodyPr spcFirstLastPara="1" wrap="square" lIns="91425" tIns="91425" rIns="91425" bIns="91425" anchor="ctr" anchorCtr="0"/>
           <a:lstStyle>
-            <a:lvl1pPr lvl="0" rtl="0" algn="ctr">
+            <a:lvl1pPr lvl="0" algn="ctr" rtl="0">
               <a:spcBef>
                 <a:spcPts val="0"/>
               </a:spcBef>
@@ -2523,7 +2599,7 @@
                 </a:solidFill>
               </a:defRPr>
             </a:lvl1pPr>
-            <a:lvl2pPr lvl="1" rtl="0" algn="ctr">
+            <a:lvl2pPr lvl="1" algn="ctr" rtl="0">
               <a:spcBef>
                 <a:spcPts val="0"/>
               </a:spcBef>
@@ -2541,7 +2617,7 @@
                 </a:solidFill>
               </a:defRPr>
             </a:lvl2pPr>
-            <a:lvl3pPr lvl="2" rtl="0" algn="ctr">
+            <a:lvl3pPr lvl="2" algn="ctr" rtl="0">
               <a:spcBef>
                 <a:spcPts val="0"/>
               </a:spcBef>
@@ -2559,7 +2635,7 @@
                 </a:solidFill>
               </a:defRPr>
             </a:lvl3pPr>
-            <a:lvl4pPr lvl="3" rtl="0" algn="ctr">
+            <a:lvl4pPr lvl="3" algn="ctr" rtl="0">
               <a:spcBef>
                 <a:spcPts val="0"/>
               </a:spcBef>
@@ -2577,7 +2653,7 @@
                 </a:solidFill>
               </a:defRPr>
             </a:lvl4pPr>
-            <a:lvl5pPr lvl="4" rtl="0" algn="ctr">
+            <a:lvl5pPr lvl="4" algn="ctr" rtl="0">
               <a:spcBef>
                 <a:spcPts val="0"/>
               </a:spcBef>
@@ -2595,7 +2671,7 @@
                 </a:solidFill>
               </a:defRPr>
             </a:lvl5pPr>
-            <a:lvl6pPr lvl="5" rtl="0" algn="ctr">
+            <a:lvl6pPr lvl="5" algn="ctr" rtl="0">
               <a:spcBef>
                 <a:spcPts val="0"/>
               </a:spcBef>
@@ -2613,7 +2689,7 @@
                 </a:solidFill>
               </a:defRPr>
             </a:lvl6pPr>
-            <a:lvl7pPr lvl="6" rtl="0" algn="ctr">
+            <a:lvl7pPr lvl="6" algn="ctr" rtl="0">
               <a:spcBef>
                 <a:spcPts val="0"/>
               </a:spcBef>
@@ -2631,7 +2707,7 @@
                 </a:solidFill>
               </a:defRPr>
             </a:lvl7pPr>
-            <a:lvl8pPr lvl="7" rtl="0" algn="ctr">
+            <a:lvl8pPr lvl="7" algn="ctr" rtl="0">
               <a:spcBef>
                 <a:spcPts val="0"/>
               </a:spcBef>
@@ -2649,7 +2725,7 @@
                 </a:solidFill>
               </a:defRPr>
             </a:lvl8pPr>
-            <a:lvl9pPr lvl="8" rtl="0" algn="ctr">
+            <a:lvl9pPr lvl="8" algn="ctr" rtl="0">
               <a:spcBef>
                 <a:spcPts val="0"/>
               </a:spcBef>
@@ -2668,15 +2744,19 @@
               </a:defRPr>
             </a:lvl9pPr>
           </a:lstStyle>
-          <a:p/>
+          <a:p>
+            <a:endParaRPr/>
+          </a:p>
         </p:txBody>
       </p:sp>
       <p:sp>
         <p:nvSpPr>
           <p:cNvPr id="20" name="Shape 20"/>
-          <p:cNvSpPr txBox="1"/>
+          <p:cNvSpPr txBox="1">
+            <a:spLocks noGrp="1"/>
+          </p:cNvSpPr>
           <p:nvPr>
-            <p:ph idx="12" type="sldNum"/>
+            <p:ph type="sldNum" idx="12"/>
           </p:nvPr>
         </p:nvSpPr>
         <p:spPr>
@@ -2689,7 +2769,7 @@
           </a:prstGeom>
         </p:spPr>
         <p:txBody>
-          <a:bodyPr anchorCtr="0" anchor="ctr" bIns="91425" lIns="91425" spcFirstLastPara="1" rIns="91425" wrap="square" tIns="91425">
+          <a:bodyPr spcFirstLastPara="1" wrap="square" lIns="91425" tIns="91425" rIns="91425" bIns="91425" anchor="ctr" anchorCtr="0">
             <a:noAutofit/>
           </a:bodyPr>
           <a:lstStyle>
@@ -2767,7 +2847,7 @@
             </a:lvl9pPr>
           </a:lstStyle>
           <a:p>
-            <a:pPr indent="0" lvl="0" marL="0">
+            <a:pPr marL="0" lvl="0" indent="0">
               <a:spcBef>
                 <a:spcPts val="0"/>
               </a:spcBef>
@@ -2793,11 +2873,11 @@
 </file>
 
 <file path=ppt/slideLayouts/slideLayout3.xml><?xml version="1.0" encoding="utf-8"?>
-<p:sldLayout xmlns:a="http://schemas.openxmlformats.org/drawingml/2006/main" xmlns:r="http://schemas.openxmlformats.org/officeDocument/2006/relationships" xmlns:mc="http://schemas.openxmlformats.org/markup-compatibility/2006" xmlns:mv="urn:schemas-microsoft-com:mac:vml" xmlns:p="http://schemas.openxmlformats.org/presentationml/2006/main" xmlns:c="http://schemas.openxmlformats.org/drawingml/2006/chart" xmlns:dgm="http://schemas.openxmlformats.org/drawingml/2006/diagram" xmlns:o="urn:schemas-microsoft-com:office:office" xmlns:v="urn:schemas-microsoft-com:vml" xmlns:pvml="urn:schemas-microsoft-com:office:powerpoint" xmlns:com="http://schemas.openxmlformats.org/drawingml/2006/compatibility" xmlns:p14="http://schemas.microsoft.com/office/powerpoint/2010/main" xmlns:p15="http://schemas.microsoft.com/office/powerpoint/2012/main" matchingName="Title and body" type="tx">
+<p:sldLayout xmlns:a="http://schemas.openxmlformats.org/drawingml/2006/main" xmlns:r="http://schemas.openxmlformats.org/officeDocument/2006/relationships" xmlns:p="http://schemas.openxmlformats.org/presentationml/2006/main" matchingName="Title and body" type="tx">
   <p:cSld name="TITLE_AND_BODY">
     <p:spTree>
       <p:nvGrpSpPr>
-        <p:cNvPr id="21" name="Shape 21"/>
+        <p:cNvPr id="1" name="Shape 21"/>
         <p:cNvGrpSpPr/>
         <p:nvPr/>
       </p:nvGrpSpPr>
@@ -2824,14 +2904,14 @@
             <a:avLst/>
           </a:prstGeom>
           <a:noFill/>
-          <a:ln cap="flat" cmpd="sng" w="38100">
+          <a:ln w="38100" cap="flat" cmpd="sng">
             <a:solidFill>
               <a:schemeClr val="dk2"/>
             </a:solidFill>
             <a:prstDash val="solid"/>
             <a:round/>
-            <a:headEnd len="sm" w="sm" type="none"/>
-            <a:tailEnd len="sm" w="sm" type="none"/>
+            <a:headEnd type="none" w="sm" len="sm"/>
+            <a:tailEnd type="none" w="sm" len="sm"/>
           </a:ln>
         </p:spPr>
       </p:cxnSp>
@@ -2850,14 +2930,14 @@
             <a:avLst/>
           </a:prstGeom>
           <a:noFill/>
-          <a:ln cap="flat" cmpd="sng" w="19050">
+          <a:ln w="19050" cap="flat" cmpd="sng">
             <a:solidFill>
               <a:schemeClr val="dk2"/>
             </a:solidFill>
             <a:prstDash val="solid"/>
             <a:round/>
-            <a:headEnd len="sm" w="sm" type="none"/>
-            <a:tailEnd len="sm" w="sm" type="none"/>
+            <a:headEnd type="none" w="sm" len="sm"/>
+            <a:tailEnd type="none" w="sm" len="sm"/>
           </a:ln>
         </p:spPr>
       </p:cxnSp>
@@ -2876,21 +2956,23 @@
             <a:avLst/>
           </a:prstGeom>
           <a:noFill/>
-          <a:ln cap="flat" cmpd="sng" w="19050">
+          <a:ln w="19050" cap="flat" cmpd="sng">
             <a:solidFill>
               <a:schemeClr val="dk2"/>
             </a:solidFill>
             <a:prstDash val="solid"/>
             <a:round/>
-            <a:headEnd len="sm" w="sm" type="none"/>
-            <a:tailEnd len="sm" w="sm" type="none"/>
+            <a:headEnd type="none" w="sm" len="sm"/>
+            <a:tailEnd type="none" w="sm" len="sm"/>
           </a:ln>
         </p:spPr>
       </p:cxnSp>
       <p:sp>
         <p:nvSpPr>
           <p:cNvPr id="25" name="Shape 25"/>
-          <p:cNvSpPr txBox="1"/>
+          <p:cNvSpPr txBox="1">
+            <a:spLocks noGrp="1"/>
+          </p:cNvSpPr>
           <p:nvPr>
             <p:ph type="title"/>
           </p:nvPr>
@@ -2905,7 +2987,7 @@
           </a:prstGeom>
         </p:spPr>
         <p:txBody>
-          <a:bodyPr anchorCtr="0" anchor="t" bIns="91425" lIns="91425" spcFirstLastPara="1" rIns="91425" wrap="square" tIns="91425"/>
+          <a:bodyPr spcFirstLastPara="1" wrap="square" lIns="91425" tIns="91425" rIns="91425" bIns="91425" anchor="t" anchorCtr="0"/>
           <a:lstStyle>
             <a:lvl1pPr lvl="0" rtl="0">
               <a:spcBef>
@@ -3007,15 +3089,19 @@
               <a:defRPr/>
             </a:lvl9pPr>
           </a:lstStyle>
-          <a:p/>
+          <a:p>
+            <a:endParaRPr/>
+          </a:p>
         </p:txBody>
       </p:sp>
       <p:sp>
         <p:nvSpPr>
           <p:cNvPr id="26" name="Shape 26"/>
-          <p:cNvSpPr txBox="1"/>
+          <p:cNvSpPr txBox="1">
+            <a:spLocks noGrp="1"/>
+          </p:cNvSpPr>
           <p:nvPr>
-            <p:ph idx="1" type="body"/>
+            <p:ph type="body" idx="1"/>
           </p:nvPr>
         </p:nvSpPr>
         <p:spPr>
@@ -3028,9 +3114,9 @@
           </a:prstGeom>
         </p:spPr>
         <p:txBody>
-          <a:bodyPr anchorCtr="0" anchor="t" bIns="91425" lIns="91425" spcFirstLastPara="1" rIns="91425" wrap="square" tIns="91425"/>
+          <a:bodyPr spcFirstLastPara="1" wrap="square" lIns="91425" tIns="91425" rIns="91425" bIns="91425" anchor="t" anchorCtr="0"/>
           <a:lstStyle>
-            <a:lvl1pPr indent="-342900" lvl="0" marL="457200" rtl="0">
+            <a:lvl1pPr marL="457200" lvl="0" indent="-342900" rtl="0">
               <a:spcBef>
                 <a:spcPts val="0"/>
               </a:spcBef>
@@ -3041,7 +3127,7 @@
               <a:buChar char="●"/>
               <a:defRPr/>
             </a:lvl1pPr>
-            <a:lvl2pPr indent="-317500" lvl="1" marL="914400" rtl="0">
+            <a:lvl2pPr marL="914400" lvl="1" indent="-317500" rtl="0">
               <a:spcBef>
                 <a:spcPts val="1600"/>
               </a:spcBef>
@@ -3052,7 +3138,7 @@
               <a:buChar char="○"/>
               <a:defRPr/>
             </a:lvl2pPr>
-            <a:lvl3pPr indent="-317500" lvl="2" marL="1371600" rtl="0">
+            <a:lvl3pPr marL="1371600" lvl="2" indent="-317500" rtl="0">
               <a:spcBef>
                 <a:spcPts val="1600"/>
               </a:spcBef>
@@ -3063,7 +3149,7 @@
               <a:buChar char="■"/>
               <a:defRPr/>
             </a:lvl3pPr>
-            <a:lvl4pPr indent="-317500" lvl="3" marL="1828800" rtl="0">
+            <a:lvl4pPr marL="1828800" lvl="3" indent="-317500" rtl="0">
               <a:spcBef>
                 <a:spcPts val="1600"/>
               </a:spcBef>
@@ -3074,7 +3160,7 @@
               <a:buChar char="●"/>
               <a:defRPr/>
             </a:lvl4pPr>
-            <a:lvl5pPr indent="-317500" lvl="4" marL="2286000" rtl="0">
+            <a:lvl5pPr marL="2286000" lvl="4" indent="-317500" rtl="0">
               <a:spcBef>
                 <a:spcPts val="1600"/>
               </a:spcBef>
@@ -3085,7 +3171,7 @@
               <a:buChar char="○"/>
               <a:defRPr/>
             </a:lvl5pPr>
-            <a:lvl6pPr indent="-317500" lvl="5" marL="2743200" rtl="0">
+            <a:lvl6pPr marL="2743200" lvl="5" indent="-317500" rtl="0">
               <a:spcBef>
                 <a:spcPts val="1600"/>
               </a:spcBef>
@@ -3096,7 +3182,7 @@
               <a:buChar char="■"/>
               <a:defRPr/>
             </a:lvl6pPr>
-            <a:lvl7pPr indent="-317500" lvl="6" marL="3200400" rtl="0">
+            <a:lvl7pPr marL="3200400" lvl="6" indent="-317500" rtl="0">
               <a:spcBef>
                 <a:spcPts val="1600"/>
               </a:spcBef>
@@ -3107,7 +3193,7 @@
               <a:buChar char="●"/>
               <a:defRPr/>
             </a:lvl7pPr>
-            <a:lvl8pPr indent="-317500" lvl="7" marL="3657600" rtl="0">
+            <a:lvl8pPr marL="3657600" lvl="7" indent="-317500" rtl="0">
               <a:spcBef>
                 <a:spcPts val="1600"/>
               </a:spcBef>
@@ -3118,7 +3204,7 @@
               <a:buChar char="○"/>
               <a:defRPr/>
             </a:lvl8pPr>
-            <a:lvl9pPr indent="-317500" lvl="8" marL="4114800" rtl="0">
+            <a:lvl9pPr marL="4114800" lvl="8" indent="-317500" rtl="0">
               <a:spcBef>
                 <a:spcPts val="1600"/>
               </a:spcBef>
@@ -3130,15 +3216,19 @@
               <a:defRPr/>
             </a:lvl9pPr>
           </a:lstStyle>
-          <a:p/>
+          <a:p>
+            <a:endParaRPr/>
+          </a:p>
         </p:txBody>
       </p:sp>
       <p:sp>
         <p:nvSpPr>
           <p:cNvPr id="27" name="Shape 27"/>
-          <p:cNvSpPr txBox="1"/>
+          <p:cNvSpPr txBox="1">
+            <a:spLocks noGrp="1"/>
+          </p:cNvSpPr>
           <p:nvPr>
-            <p:ph idx="12" type="sldNum"/>
+            <p:ph type="sldNum" idx="12"/>
           </p:nvPr>
         </p:nvSpPr>
         <p:spPr>
@@ -3151,7 +3241,7 @@
           </a:prstGeom>
         </p:spPr>
         <p:txBody>
-          <a:bodyPr anchorCtr="0" anchor="ctr" bIns="91425" lIns="91425" spcFirstLastPara="1" rIns="91425" wrap="square" tIns="91425">
+          <a:bodyPr spcFirstLastPara="1" wrap="square" lIns="91425" tIns="91425" rIns="91425" bIns="91425" anchor="ctr" anchorCtr="0">
             <a:noAutofit/>
           </a:bodyPr>
           <a:lstStyle>
@@ -3193,7 +3283,7 @@
             </a:lvl9pPr>
           </a:lstStyle>
           <a:p>
-            <a:pPr indent="0" lvl="0" marL="0">
+            <a:pPr marL="0" lvl="0" indent="0">
               <a:spcBef>
                 <a:spcPts val="0"/>
               </a:spcBef>
@@ -3219,11 +3309,11 @@
 </file>
 
 <file path=ppt/slideLayouts/slideLayout4.xml><?xml version="1.0" encoding="utf-8"?>
-<p:sldLayout xmlns:a="http://schemas.openxmlformats.org/drawingml/2006/main" xmlns:r="http://schemas.openxmlformats.org/officeDocument/2006/relationships" xmlns:mc="http://schemas.openxmlformats.org/markup-compatibility/2006" xmlns:mv="urn:schemas-microsoft-com:mac:vml" xmlns:p="http://schemas.openxmlformats.org/presentationml/2006/main" xmlns:c="http://schemas.openxmlformats.org/drawingml/2006/chart" xmlns:dgm="http://schemas.openxmlformats.org/drawingml/2006/diagram" xmlns:o="urn:schemas-microsoft-com:office:office" xmlns:v="urn:schemas-microsoft-com:vml" xmlns:pvml="urn:schemas-microsoft-com:office:powerpoint" xmlns:com="http://schemas.openxmlformats.org/drawingml/2006/compatibility" xmlns:p14="http://schemas.microsoft.com/office/powerpoint/2010/main" xmlns:p15="http://schemas.microsoft.com/office/powerpoint/2012/main" matchingName="Title and two columns" type="twoColTx">
+<p:sldLayout xmlns:a="http://schemas.openxmlformats.org/drawingml/2006/main" xmlns:r="http://schemas.openxmlformats.org/officeDocument/2006/relationships" xmlns:p="http://schemas.openxmlformats.org/presentationml/2006/main" matchingName="Title and two columns" type="twoColTx">
   <p:cSld name="TITLE_AND_TWO_COLUMNS">
     <p:spTree>
       <p:nvGrpSpPr>
-        <p:cNvPr id="28" name="Shape 28"/>
+        <p:cNvPr id="1" name="Shape 28"/>
         <p:cNvGrpSpPr/>
         <p:nvPr/>
       </p:nvGrpSpPr>
@@ -3250,14 +3340,14 @@
             <a:avLst/>
           </a:prstGeom>
           <a:noFill/>
-          <a:ln cap="flat" cmpd="sng" w="38100">
+          <a:ln w="38100" cap="flat" cmpd="sng">
             <a:solidFill>
               <a:schemeClr val="dk2"/>
             </a:solidFill>
             <a:prstDash val="solid"/>
             <a:round/>
-            <a:headEnd len="sm" w="sm" type="none"/>
-            <a:tailEnd len="sm" w="sm" type="none"/>
+            <a:headEnd type="none" w="sm" len="sm"/>
+            <a:tailEnd type="none" w="sm" len="sm"/>
           </a:ln>
         </p:spPr>
       </p:cxnSp>
@@ -3276,14 +3366,14 @@
             <a:avLst/>
           </a:prstGeom>
           <a:noFill/>
-          <a:ln cap="flat" cmpd="sng" w="19050">
+          <a:ln w="19050" cap="flat" cmpd="sng">
             <a:solidFill>
               <a:schemeClr val="dk2"/>
             </a:solidFill>
             <a:prstDash val="solid"/>
             <a:round/>
-            <a:headEnd len="sm" w="sm" type="none"/>
-            <a:tailEnd len="sm" w="sm" type="none"/>
+            <a:headEnd type="none" w="sm" len="sm"/>
+            <a:tailEnd type="none" w="sm" len="sm"/>
           </a:ln>
         </p:spPr>
       </p:cxnSp>
@@ -3302,21 +3392,23 @@
             <a:avLst/>
           </a:prstGeom>
           <a:noFill/>
-          <a:ln cap="flat" cmpd="sng" w="19050">
+          <a:ln w="19050" cap="flat" cmpd="sng">
             <a:solidFill>
               <a:schemeClr val="dk2"/>
             </a:solidFill>
             <a:prstDash val="solid"/>
             <a:round/>
-            <a:headEnd len="sm" w="sm" type="none"/>
-            <a:tailEnd len="sm" w="sm" type="none"/>
+            <a:headEnd type="none" w="sm" len="sm"/>
+            <a:tailEnd type="none" w="sm" len="sm"/>
           </a:ln>
         </p:spPr>
       </p:cxnSp>
       <p:sp>
         <p:nvSpPr>
           <p:cNvPr id="32" name="Shape 32"/>
-          <p:cNvSpPr txBox="1"/>
+          <p:cNvSpPr txBox="1">
+            <a:spLocks noGrp="1"/>
+          </p:cNvSpPr>
           <p:nvPr>
             <p:ph type="title"/>
           </p:nvPr>
@@ -3331,7 +3423,7 @@
           </a:prstGeom>
         </p:spPr>
         <p:txBody>
-          <a:bodyPr anchorCtr="0" anchor="t" bIns="91425" lIns="91425" spcFirstLastPara="1" rIns="91425" wrap="square" tIns="91425"/>
+          <a:bodyPr spcFirstLastPara="1" wrap="square" lIns="91425" tIns="91425" rIns="91425" bIns="91425" anchor="t" anchorCtr="0"/>
           <a:lstStyle>
             <a:lvl1pPr lvl="0" rtl="0">
               <a:spcBef>
@@ -3433,15 +3525,19 @@
               <a:defRPr/>
             </a:lvl9pPr>
           </a:lstStyle>
-          <a:p/>
+          <a:p>
+            <a:endParaRPr/>
+          </a:p>
         </p:txBody>
       </p:sp>
       <p:sp>
         <p:nvSpPr>
           <p:cNvPr id="33" name="Shape 33"/>
-          <p:cNvSpPr txBox="1"/>
+          <p:cNvSpPr txBox="1">
+            <a:spLocks noGrp="1"/>
+          </p:cNvSpPr>
           <p:nvPr>
-            <p:ph idx="1" type="body"/>
+            <p:ph type="body" idx="1"/>
           </p:nvPr>
         </p:nvSpPr>
         <p:spPr>
@@ -3454,9 +3550,9 @@
           </a:prstGeom>
         </p:spPr>
         <p:txBody>
-          <a:bodyPr anchorCtr="0" anchor="t" bIns="91425" lIns="91425" spcFirstLastPara="1" rIns="91425" wrap="square" tIns="91425"/>
+          <a:bodyPr spcFirstLastPara="1" wrap="square" lIns="91425" tIns="91425" rIns="91425" bIns="91425" anchor="t" anchorCtr="0"/>
           <a:lstStyle>
-            <a:lvl1pPr indent="-317500" lvl="0" marL="457200" rtl="0">
+            <a:lvl1pPr marL="457200" lvl="0" indent="-317500" rtl="0">
               <a:spcBef>
                 <a:spcPts val="0"/>
               </a:spcBef>
@@ -3467,7 +3563,7 @@
               <a:buChar char="●"/>
               <a:defRPr sz="1400"/>
             </a:lvl1pPr>
-            <a:lvl2pPr indent="-304800" lvl="1" marL="914400" rtl="0">
+            <a:lvl2pPr marL="914400" lvl="1" indent="-304800" rtl="0">
               <a:spcBef>
                 <a:spcPts val="1600"/>
               </a:spcBef>
@@ -3478,7 +3574,7 @@
               <a:buChar char="○"/>
               <a:defRPr sz="1200"/>
             </a:lvl2pPr>
-            <a:lvl3pPr indent="-304800" lvl="2" marL="1371600" rtl="0">
+            <a:lvl3pPr marL="1371600" lvl="2" indent="-304800" rtl="0">
               <a:spcBef>
                 <a:spcPts val="1600"/>
               </a:spcBef>
@@ -3489,7 +3585,7 @@
               <a:buChar char="■"/>
               <a:defRPr sz="1200"/>
             </a:lvl3pPr>
-            <a:lvl4pPr indent="-304800" lvl="3" marL="1828800" rtl="0">
+            <a:lvl4pPr marL="1828800" lvl="3" indent="-304800" rtl="0">
               <a:spcBef>
                 <a:spcPts val="1600"/>
               </a:spcBef>
@@ -3500,7 +3596,7 @@
               <a:buChar char="●"/>
               <a:defRPr sz="1200"/>
             </a:lvl4pPr>
-            <a:lvl5pPr indent="-304800" lvl="4" marL="2286000" rtl="0">
+            <a:lvl5pPr marL="2286000" lvl="4" indent="-304800" rtl="0">
               <a:spcBef>
                 <a:spcPts val="1600"/>
               </a:spcBef>
@@ -3511,7 +3607,7 @@
               <a:buChar char="○"/>
               <a:defRPr sz="1200"/>
             </a:lvl5pPr>
-            <a:lvl6pPr indent="-304800" lvl="5" marL="2743200" rtl="0">
+            <a:lvl6pPr marL="2743200" lvl="5" indent="-304800" rtl="0">
               <a:spcBef>
                 <a:spcPts val="1600"/>
               </a:spcBef>
@@ -3522,7 +3618,7 @@
               <a:buChar char="■"/>
               <a:defRPr sz="1200"/>
             </a:lvl6pPr>
-            <a:lvl7pPr indent="-304800" lvl="6" marL="3200400" rtl="0">
+            <a:lvl7pPr marL="3200400" lvl="6" indent="-304800" rtl="0">
               <a:spcBef>
                 <a:spcPts val="1600"/>
               </a:spcBef>
@@ -3533,7 +3629,7 @@
               <a:buChar char="●"/>
               <a:defRPr sz="1200"/>
             </a:lvl7pPr>
-            <a:lvl8pPr indent="-304800" lvl="7" marL="3657600" rtl="0">
+            <a:lvl8pPr marL="3657600" lvl="7" indent="-304800" rtl="0">
               <a:spcBef>
                 <a:spcPts val="1600"/>
               </a:spcBef>
@@ -3544,7 +3640,7 @@
               <a:buChar char="○"/>
               <a:defRPr sz="1200"/>
             </a:lvl8pPr>
-            <a:lvl9pPr indent="-304800" lvl="8" marL="4114800" rtl="0">
+            <a:lvl9pPr marL="4114800" lvl="8" indent="-304800" rtl="0">
               <a:spcBef>
                 <a:spcPts val="1600"/>
               </a:spcBef>
@@ -3556,15 +3652,19 @@
               <a:defRPr sz="1200"/>
             </a:lvl9pPr>
           </a:lstStyle>
-          <a:p/>
+          <a:p>
+            <a:endParaRPr/>
+          </a:p>
         </p:txBody>
       </p:sp>
       <p:sp>
         <p:nvSpPr>
           <p:cNvPr id="34" name="Shape 34"/>
-          <p:cNvSpPr txBox="1"/>
+          <p:cNvSpPr txBox="1">
+            <a:spLocks noGrp="1"/>
+          </p:cNvSpPr>
           <p:nvPr>
-            <p:ph idx="2" type="body"/>
+            <p:ph type="body" idx="2"/>
           </p:nvPr>
         </p:nvSpPr>
         <p:spPr>
@@ -3577,9 +3677,9 @@
           </a:prstGeom>
         </p:spPr>
         <p:txBody>
-          <a:bodyPr anchorCtr="0" anchor="t" bIns="91425" lIns="91425" spcFirstLastPara="1" rIns="91425" wrap="square" tIns="91425"/>
+          <a:bodyPr spcFirstLastPara="1" wrap="square" lIns="91425" tIns="91425" rIns="91425" bIns="91425" anchor="t" anchorCtr="0"/>
           <a:lstStyle>
-            <a:lvl1pPr indent="-317500" lvl="0" marL="457200" rtl="0">
+            <a:lvl1pPr marL="457200" lvl="0" indent="-317500" rtl="0">
               <a:spcBef>
                 <a:spcPts val="0"/>
               </a:spcBef>
@@ -3590,7 +3690,7 @@
               <a:buChar char="●"/>
               <a:defRPr sz="1400"/>
             </a:lvl1pPr>
-            <a:lvl2pPr indent="-304800" lvl="1" marL="914400" rtl="0">
+            <a:lvl2pPr marL="914400" lvl="1" indent="-304800" rtl="0">
               <a:spcBef>
                 <a:spcPts val="1600"/>
               </a:spcBef>
@@ -3601,7 +3701,7 @@
               <a:buChar char="○"/>
               <a:defRPr sz="1200"/>
             </a:lvl2pPr>
-            <a:lvl3pPr indent="-304800" lvl="2" marL="1371600" rtl="0">
+            <a:lvl3pPr marL="1371600" lvl="2" indent="-304800" rtl="0">
               <a:spcBef>
                 <a:spcPts val="1600"/>
               </a:spcBef>
@@ -3612,7 +3712,7 @@
               <a:buChar char="■"/>
               <a:defRPr sz="1200"/>
             </a:lvl3pPr>
-            <a:lvl4pPr indent="-304800" lvl="3" marL="1828800" rtl="0">
+            <a:lvl4pPr marL="1828800" lvl="3" indent="-304800" rtl="0">
               <a:spcBef>
                 <a:spcPts val="1600"/>
               </a:spcBef>
@@ -3623,7 +3723,7 @@
               <a:buChar char="●"/>
               <a:defRPr sz="1200"/>
             </a:lvl4pPr>
-            <a:lvl5pPr indent="-304800" lvl="4" marL="2286000" rtl="0">
+            <a:lvl5pPr marL="2286000" lvl="4" indent="-304800" rtl="0">
               <a:spcBef>
                 <a:spcPts val="1600"/>
               </a:spcBef>
@@ -3634,7 +3734,7 @@
               <a:buChar char="○"/>
               <a:defRPr sz="1200"/>
             </a:lvl5pPr>
-            <a:lvl6pPr indent="-304800" lvl="5" marL="2743200" rtl="0">
+            <a:lvl6pPr marL="2743200" lvl="5" indent="-304800" rtl="0">
               <a:spcBef>
                 <a:spcPts val="1600"/>
               </a:spcBef>
@@ -3645,7 +3745,7 @@
               <a:buChar char="■"/>
               <a:defRPr sz="1200"/>
             </a:lvl6pPr>
-            <a:lvl7pPr indent="-304800" lvl="6" marL="3200400" rtl="0">
+            <a:lvl7pPr marL="3200400" lvl="6" indent="-304800" rtl="0">
               <a:spcBef>
                 <a:spcPts val="1600"/>
               </a:spcBef>
@@ -3656,7 +3756,7 @@
               <a:buChar char="●"/>
               <a:defRPr sz="1200"/>
             </a:lvl7pPr>
-            <a:lvl8pPr indent="-304800" lvl="7" marL="3657600" rtl="0">
+            <a:lvl8pPr marL="3657600" lvl="7" indent="-304800" rtl="0">
               <a:spcBef>
                 <a:spcPts val="1600"/>
               </a:spcBef>
@@ -3667,7 +3767,7 @@
               <a:buChar char="○"/>
               <a:defRPr sz="1200"/>
             </a:lvl8pPr>
-            <a:lvl9pPr indent="-304800" lvl="8" marL="4114800" rtl="0">
+            <a:lvl9pPr marL="4114800" lvl="8" indent="-304800" rtl="0">
               <a:spcBef>
                 <a:spcPts val="1600"/>
               </a:spcBef>
@@ -3679,15 +3779,19 @@
               <a:defRPr sz="1200"/>
             </a:lvl9pPr>
           </a:lstStyle>
-          <a:p/>
+          <a:p>
+            <a:endParaRPr/>
+          </a:p>
         </p:txBody>
       </p:sp>
       <p:sp>
         <p:nvSpPr>
           <p:cNvPr id="35" name="Shape 35"/>
-          <p:cNvSpPr txBox="1"/>
+          <p:cNvSpPr txBox="1">
+            <a:spLocks noGrp="1"/>
+          </p:cNvSpPr>
           <p:nvPr>
-            <p:ph idx="12" type="sldNum"/>
+            <p:ph type="sldNum" idx="12"/>
           </p:nvPr>
         </p:nvSpPr>
         <p:spPr>
@@ -3700,7 +3804,7 @@
           </a:prstGeom>
         </p:spPr>
         <p:txBody>
-          <a:bodyPr anchorCtr="0" anchor="ctr" bIns="91425" lIns="91425" spcFirstLastPara="1" rIns="91425" wrap="square" tIns="91425">
+          <a:bodyPr spcFirstLastPara="1" wrap="square" lIns="91425" tIns="91425" rIns="91425" bIns="91425" anchor="ctr" anchorCtr="0">
             <a:noAutofit/>
           </a:bodyPr>
           <a:lstStyle>
@@ -3742,7 +3846,7 @@
             </a:lvl9pPr>
           </a:lstStyle>
           <a:p>
-            <a:pPr indent="0" lvl="0" marL="0">
+            <a:pPr marL="0" lvl="0" indent="0">
               <a:spcBef>
                 <a:spcPts val="0"/>
               </a:spcBef>
@@ -3768,11 +3872,11 @@
 </file>
 
 <file path=ppt/slideLayouts/slideLayout5.xml><?xml version="1.0" encoding="utf-8"?>
-<p:sldLayout xmlns:a="http://schemas.openxmlformats.org/drawingml/2006/main" xmlns:r="http://schemas.openxmlformats.org/officeDocument/2006/relationships" xmlns:mc="http://schemas.openxmlformats.org/markup-compatibility/2006" xmlns:mv="urn:schemas-microsoft-com:mac:vml" xmlns:p="http://schemas.openxmlformats.org/presentationml/2006/main" xmlns:c="http://schemas.openxmlformats.org/drawingml/2006/chart" xmlns:dgm="http://schemas.openxmlformats.org/drawingml/2006/diagram" xmlns:o="urn:schemas-microsoft-com:office:office" xmlns:v="urn:schemas-microsoft-com:vml" xmlns:pvml="urn:schemas-microsoft-com:office:powerpoint" xmlns:com="http://schemas.openxmlformats.org/drawingml/2006/compatibility" xmlns:p14="http://schemas.microsoft.com/office/powerpoint/2010/main" xmlns:p15="http://schemas.microsoft.com/office/powerpoint/2012/main" matchingName="Title only" type="titleOnly">
+<p:sldLayout xmlns:a="http://schemas.openxmlformats.org/drawingml/2006/main" xmlns:r="http://schemas.openxmlformats.org/officeDocument/2006/relationships" xmlns:p="http://schemas.openxmlformats.org/presentationml/2006/main" matchingName="Title only" type="titleOnly">
   <p:cSld name="TITLE_ONLY">
     <p:spTree>
       <p:nvGrpSpPr>
-        <p:cNvPr id="36" name="Shape 36"/>
+        <p:cNvPr id="1" name="Shape 36"/>
         <p:cNvGrpSpPr/>
         <p:nvPr/>
       </p:nvGrpSpPr>
@@ -3787,7 +3891,9 @@
       <p:sp>
         <p:nvSpPr>
           <p:cNvPr id="37" name="Shape 37"/>
-          <p:cNvSpPr txBox="1"/>
+          <p:cNvSpPr txBox="1">
+            <a:spLocks noGrp="1"/>
+          </p:cNvSpPr>
           <p:nvPr>
             <p:ph type="title"/>
           </p:nvPr>
@@ -3802,7 +3908,7 @@
           </a:prstGeom>
         </p:spPr>
         <p:txBody>
-          <a:bodyPr anchorCtr="0" anchor="t" bIns="91425" lIns="91425" spcFirstLastPara="1" rIns="91425" wrap="square" tIns="91425"/>
+          <a:bodyPr spcFirstLastPara="1" wrap="square" lIns="91425" tIns="91425" rIns="91425" bIns="91425" anchor="t" anchorCtr="0"/>
           <a:lstStyle>
             <a:lvl1pPr lvl="0" rtl="0">
               <a:spcBef>
@@ -3904,15 +4010,19 @@
               <a:defRPr/>
             </a:lvl9pPr>
           </a:lstStyle>
-          <a:p/>
+          <a:p>
+            <a:endParaRPr/>
+          </a:p>
         </p:txBody>
       </p:sp>
       <p:sp>
         <p:nvSpPr>
           <p:cNvPr id="38" name="Shape 38"/>
-          <p:cNvSpPr txBox="1"/>
+          <p:cNvSpPr txBox="1">
+            <a:spLocks noGrp="1"/>
+          </p:cNvSpPr>
           <p:nvPr>
-            <p:ph idx="12" type="sldNum"/>
+            <p:ph type="sldNum" idx="12"/>
           </p:nvPr>
         </p:nvSpPr>
         <p:spPr>
@@ -3925,7 +4035,7 @@
           </a:prstGeom>
         </p:spPr>
         <p:txBody>
-          <a:bodyPr anchorCtr="0" anchor="ctr" bIns="91425" lIns="91425" spcFirstLastPara="1" rIns="91425" wrap="square" tIns="91425">
+          <a:bodyPr spcFirstLastPara="1" wrap="square" lIns="91425" tIns="91425" rIns="91425" bIns="91425" anchor="ctr" anchorCtr="0">
             <a:noAutofit/>
           </a:bodyPr>
           <a:lstStyle>
@@ -3967,7 +4077,7 @@
             </a:lvl9pPr>
           </a:lstStyle>
           <a:p>
-            <a:pPr indent="0" lvl="0" marL="0">
+            <a:pPr marL="0" lvl="0" indent="0">
               <a:spcBef>
                 <a:spcPts val="0"/>
               </a:spcBef>
@@ -3993,11 +4103,11 @@
 </file>
 
 <file path=ppt/slideLayouts/slideLayout6.xml><?xml version="1.0" encoding="utf-8"?>
-<p:sldLayout xmlns:a="http://schemas.openxmlformats.org/drawingml/2006/main" xmlns:r="http://schemas.openxmlformats.org/officeDocument/2006/relationships" xmlns:mc="http://schemas.openxmlformats.org/markup-compatibility/2006" xmlns:mv="urn:schemas-microsoft-com:mac:vml" xmlns:p="http://schemas.openxmlformats.org/presentationml/2006/main" xmlns:c="http://schemas.openxmlformats.org/drawingml/2006/chart" xmlns:dgm="http://schemas.openxmlformats.org/drawingml/2006/diagram" xmlns:o="urn:schemas-microsoft-com:office:office" xmlns:v="urn:schemas-microsoft-com:vml" xmlns:pvml="urn:schemas-microsoft-com:office:powerpoint" xmlns:com="http://schemas.openxmlformats.org/drawingml/2006/compatibility" xmlns:p14="http://schemas.microsoft.com/office/powerpoint/2010/main" xmlns:p15="http://schemas.microsoft.com/office/powerpoint/2012/main" matchingName="One column text">
+<p:sldLayout xmlns:a="http://schemas.openxmlformats.org/drawingml/2006/main" xmlns:r="http://schemas.openxmlformats.org/officeDocument/2006/relationships" xmlns:p="http://schemas.openxmlformats.org/presentationml/2006/main" matchingName="One column text">
   <p:cSld name="ONE_COLUMN_TEXT">
     <p:spTree>
       <p:nvGrpSpPr>
-        <p:cNvPr id="39" name="Shape 39"/>
+        <p:cNvPr id="1" name="Shape 39"/>
         <p:cNvGrpSpPr/>
         <p:nvPr/>
       </p:nvGrpSpPr>
@@ -4024,21 +4134,23 @@
             <a:avLst/>
           </a:prstGeom>
           <a:noFill/>
-          <a:ln cap="flat" cmpd="sng" w="19050">
+          <a:ln w="19050" cap="flat" cmpd="sng">
             <a:solidFill>
               <a:schemeClr val="dk2"/>
             </a:solidFill>
             <a:prstDash val="solid"/>
             <a:round/>
-            <a:headEnd len="sm" w="sm" type="none"/>
-            <a:tailEnd len="sm" w="sm" type="none"/>
+            <a:headEnd type="none" w="sm" len="sm"/>
+            <a:tailEnd type="none" w="sm" len="sm"/>
           </a:ln>
         </p:spPr>
       </p:cxnSp>
       <p:sp>
         <p:nvSpPr>
           <p:cNvPr id="41" name="Shape 41"/>
-          <p:cNvSpPr txBox="1"/>
+          <p:cNvSpPr txBox="1">
+            <a:spLocks noGrp="1"/>
+          </p:cNvSpPr>
           <p:nvPr>
             <p:ph type="title"/>
           </p:nvPr>
@@ -4053,7 +4165,7 @@
           </a:prstGeom>
         </p:spPr>
         <p:txBody>
-          <a:bodyPr anchorCtr="0" anchor="b" bIns="91425" lIns="91425" spcFirstLastPara="1" rIns="91425" wrap="square" tIns="91425"/>
+          <a:bodyPr spcFirstLastPara="1" wrap="square" lIns="91425" tIns="91425" rIns="91425" bIns="91425" anchor="b" anchorCtr="0"/>
           <a:lstStyle>
             <a:lvl1pPr lvl="0" rtl="0">
               <a:spcBef>
@@ -4155,15 +4267,19 @@
               <a:defRPr sz="2400"/>
             </a:lvl9pPr>
           </a:lstStyle>
-          <a:p/>
+          <a:p>
+            <a:endParaRPr/>
+          </a:p>
         </p:txBody>
       </p:sp>
       <p:sp>
         <p:nvSpPr>
           <p:cNvPr id="42" name="Shape 42"/>
-          <p:cNvSpPr txBox="1"/>
+          <p:cNvSpPr txBox="1">
+            <a:spLocks noGrp="1"/>
+          </p:cNvSpPr>
           <p:nvPr>
-            <p:ph idx="1" type="body"/>
+            <p:ph type="body" idx="1"/>
           </p:nvPr>
         </p:nvSpPr>
         <p:spPr>
@@ -4176,9 +4292,9 @@
           </a:prstGeom>
         </p:spPr>
         <p:txBody>
-          <a:bodyPr anchorCtr="0" anchor="t" bIns="91425" lIns="91425" spcFirstLastPara="1" rIns="91425" wrap="square" tIns="91425"/>
+          <a:bodyPr spcFirstLastPara="1" wrap="square" lIns="91425" tIns="91425" rIns="91425" bIns="91425" anchor="t" anchorCtr="0"/>
           <a:lstStyle>
-            <a:lvl1pPr indent="-304800" lvl="0" marL="457200" rtl="0">
+            <a:lvl1pPr marL="457200" lvl="0" indent="-304800" rtl="0">
               <a:spcBef>
                 <a:spcPts val="0"/>
               </a:spcBef>
@@ -4189,7 +4305,7 @@
               <a:buChar char="●"/>
               <a:defRPr sz="1200"/>
             </a:lvl1pPr>
-            <a:lvl2pPr indent="-304800" lvl="1" marL="914400" rtl="0">
+            <a:lvl2pPr marL="914400" lvl="1" indent="-304800" rtl="0">
               <a:spcBef>
                 <a:spcPts val="1600"/>
               </a:spcBef>
@@ -4200,7 +4316,7 @@
               <a:buChar char="○"/>
               <a:defRPr sz="1200"/>
             </a:lvl2pPr>
-            <a:lvl3pPr indent="-304800" lvl="2" marL="1371600" rtl="0">
+            <a:lvl3pPr marL="1371600" lvl="2" indent="-304800" rtl="0">
               <a:spcBef>
                 <a:spcPts val="1600"/>
               </a:spcBef>
@@ -4211,7 +4327,7 @@
               <a:buChar char="■"/>
               <a:defRPr sz="1200"/>
             </a:lvl3pPr>
-            <a:lvl4pPr indent="-304800" lvl="3" marL="1828800" rtl="0">
+            <a:lvl4pPr marL="1828800" lvl="3" indent="-304800" rtl="0">
               <a:spcBef>
                 <a:spcPts val="1600"/>
               </a:spcBef>
@@ -4222,7 +4338,7 @@
               <a:buChar char="●"/>
               <a:defRPr sz="1200"/>
             </a:lvl4pPr>
-            <a:lvl5pPr indent="-304800" lvl="4" marL="2286000" rtl="0">
+            <a:lvl5pPr marL="2286000" lvl="4" indent="-304800" rtl="0">
               <a:spcBef>
                 <a:spcPts val="1600"/>
               </a:spcBef>
@@ -4233,7 +4349,7 @@
               <a:buChar char="○"/>
               <a:defRPr sz="1200"/>
             </a:lvl5pPr>
-            <a:lvl6pPr indent="-304800" lvl="5" marL="2743200" rtl="0">
+            <a:lvl6pPr marL="2743200" lvl="5" indent="-304800" rtl="0">
               <a:spcBef>
                 <a:spcPts val="1600"/>
               </a:spcBef>
@@ -4244,7 +4360,7 @@
               <a:buChar char="■"/>
               <a:defRPr sz="1200"/>
             </a:lvl6pPr>
-            <a:lvl7pPr indent="-304800" lvl="6" marL="3200400" rtl="0">
+            <a:lvl7pPr marL="3200400" lvl="6" indent="-304800" rtl="0">
               <a:spcBef>
                 <a:spcPts val="1600"/>
               </a:spcBef>
@@ -4255,7 +4371,7 @@
               <a:buChar char="●"/>
               <a:defRPr sz="1200"/>
             </a:lvl7pPr>
-            <a:lvl8pPr indent="-304800" lvl="7" marL="3657600" rtl="0">
+            <a:lvl8pPr marL="3657600" lvl="7" indent="-304800" rtl="0">
               <a:spcBef>
                 <a:spcPts val="1600"/>
               </a:spcBef>
@@ -4266,7 +4382,7 @@
               <a:buChar char="○"/>
               <a:defRPr sz="1200"/>
             </a:lvl8pPr>
-            <a:lvl9pPr indent="-304800" lvl="8" marL="4114800" rtl="0">
+            <a:lvl9pPr marL="4114800" lvl="8" indent="-304800" rtl="0">
               <a:spcBef>
                 <a:spcPts val="1600"/>
               </a:spcBef>
@@ -4278,15 +4394,19 @@
               <a:defRPr sz="1200"/>
             </a:lvl9pPr>
           </a:lstStyle>
-          <a:p/>
+          <a:p>
+            <a:endParaRPr/>
+          </a:p>
         </p:txBody>
       </p:sp>
       <p:sp>
         <p:nvSpPr>
           <p:cNvPr id="43" name="Shape 43"/>
-          <p:cNvSpPr txBox="1"/>
+          <p:cNvSpPr txBox="1">
+            <a:spLocks noGrp="1"/>
+          </p:cNvSpPr>
           <p:nvPr>
-            <p:ph idx="12" type="sldNum"/>
+            <p:ph type="sldNum" idx="12"/>
           </p:nvPr>
         </p:nvSpPr>
         <p:spPr>
@@ -4299,7 +4419,7 @@
           </a:prstGeom>
         </p:spPr>
         <p:txBody>
-          <a:bodyPr anchorCtr="0" anchor="ctr" bIns="91425" lIns="91425" spcFirstLastPara="1" rIns="91425" wrap="square" tIns="91425">
+          <a:bodyPr spcFirstLastPara="1" wrap="square" lIns="91425" tIns="91425" rIns="91425" bIns="91425" anchor="ctr" anchorCtr="0">
             <a:noAutofit/>
           </a:bodyPr>
           <a:lstStyle>
@@ -4341,7 +4461,7 @@
             </a:lvl9pPr>
           </a:lstStyle>
           <a:p>
-            <a:pPr indent="0" lvl="0" marL="0">
+            <a:pPr marL="0" lvl="0" indent="0">
               <a:spcBef>
                 <a:spcPts val="0"/>
               </a:spcBef>
@@ -4367,18 +4487,19 @@
 </file>
 
 <file path=ppt/slideLayouts/slideLayout7.xml><?xml version="1.0" encoding="utf-8"?>
-<p:sldLayout xmlns:a="http://schemas.openxmlformats.org/drawingml/2006/main" xmlns:r="http://schemas.openxmlformats.org/officeDocument/2006/relationships" xmlns:mc="http://schemas.openxmlformats.org/markup-compatibility/2006" xmlns:mv="urn:schemas-microsoft-com:mac:vml" xmlns:p="http://schemas.openxmlformats.org/presentationml/2006/main" xmlns:c="http://schemas.openxmlformats.org/drawingml/2006/chart" xmlns:dgm="http://schemas.openxmlformats.org/drawingml/2006/diagram" xmlns:o="urn:schemas-microsoft-com:office:office" xmlns:v="urn:schemas-microsoft-com:vml" xmlns:pvml="urn:schemas-microsoft-com:office:powerpoint" xmlns:com="http://schemas.openxmlformats.org/drawingml/2006/compatibility" xmlns:p14="http://schemas.microsoft.com/office/powerpoint/2010/main" xmlns:p15="http://schemas.microsoft.com/office/powerpoint/2012/main" matchingName="Main point">
+<p:sldLayout xmlns:a="http://schemas.openxmlformats.org/drawingml/2006/main" xmlns:r="http://schemas.openxmlformats.org/officeDocument/2006/relationships" xmlns:p="http://schemas.openxmlformats.org/presentationml/2006/main" matchingName="Main point">
   <p:cSld name="MAIN_POINT">
     <p:bg>
       <p:bgPr>
         <a:solidFill>
           <a:srgbClr val="353535"/>
         </a:solidFill>
+        <a:effectLst/>
       </p:bgPr>
     </p:bg>
     <p:spTree>
       <p:nvGrpSpPr>
-        <p:cNvPr id="44" name="Shape 44"/>
+        <p:cNvPr id="1" name="Shape 44"/>
         <p:cNvGrpSpPr/>
         <p:nvPr/>
       </p:nvGrpSpPr>
@@ -4405,21 +4526,23 @@
             <a:avLst/>
           </a:prstGeom>
           <a:noFill/>
-          <a:ln cap="flat" cmpd="sng" w="19050">
+          <a:ln w="19050" cap="flat" cmpd="sng">
             <a:solidFill>
               <a:schemeClr val="lt1"/>
             </a:solidFill>
             <a:prstDash val="solid"/>
             <a:round/>
-            <a:headEnd len="sm" w="sm" type="none"/>
-            <a:tailEnd len="sm" w="sm" type="none"/>
+            <a:headEnd type="none" w="sm" len="sm"/>
+            <a:tailEnd type="none" w="sm" len="sm"/>
           </a:ln>
         </p:spPr>
       </p:cxnSp>
       <p:sp>
         <p:nvSpPr>
           <p:cNvPr id="46" name="Shape 46"/>
-          <p:cNvSpPr txBox="1"/>
+          <p:cNvSpPr txBox="1">
+            <a:spLocks noGrp="1"/>
+          </p:cNvSpPr>
           <p:nvPr>
             <p:ph type="title"/>
           </p:nvPr>
@@ -4434,7 +4557,7 @@
           </a:prstGeom>
         </p:spPr>
         <p:txBody>
-          <a:bodyPr anchorCtr="0" anchor="ctr" bIns="91425" lIns="91425" spcFirstLastPara="1" rIns="91425" wrap="square" tIns="91425"/>
+          <a:bodyPr spcFirstLastPara="1" wrap="square" lIns="91425" tIns="91425" rIns="91425" bIns="91425" anchor="ctr" anchorCtr="0"/>
           <a:lstStyle>
             <a:lvl1pPr lvl="0" rtl="0">
               <a:spcBef>
@@ -4599,15 +4722,19 @@
               </a:defRPr>
             </a:lvl9pPr>
           </a:lstStyle>
-          <a:p/>
+          <a:p>
+            <a:endParaRPr/>
+          </a:p>
         </p:txBody>
       </p:sp>
       <p:sp>
         <p:nvSpPr>
           <p:cNvPr id="47" name="Shape 47"/>
-          <p:cNvSpPr txBox="1"/>
+          <p:cNvSpPr txBox="1">
+            <a:spLocks noGrp="1"/>
+          </p:cNvSpPr>
           <p:nvPr>
-            <p:ph idx="12" type="sldNum"/>
+            <p:ph type="sldNum" idx="12"/>
           </p:nvPr>
         </p:nvSpPr>
         <p:spPr>
@@ -4620,7 +4747,7 @@
           </a:prstGeom>
         </p:spPr>
         <p:txBody>
-          <a:bodyPr anchorCtr="0" anchor="ctr" bIns="91425" lIns="91425" spcFirstLastPara="1" rIns="91425" wrap="square" tIns="91425">
+          <a:bodyPr spcFirstLastPara="1" wrap="square" lIns="91425" tIns="91425" rIns="91425" bIns="91425" anchor="ctr" anchorCtr="0">
             <a:noAutofit/>
           </a:bodyPr>
           <a:lstStyle>
@@ -4698,7 +4825,7 @@
             </a:lvl9pPr>
           </a:lstStyle>
           <a:p>
-            <a:pPr indent="0" lvl="0" marL="0">
+            <a:pPr marL="0" lvl="0" indent="0">
               <a:spcBef>
                 <a:spcPts val="0"/>
               </a:spcBef>
@@ -4724,11 +4851,11 @@
 </file>
 
 <file path=ppt/slideLayouts/slideLayout8.xml><?xml version="1.0" encoding="utf-8"?>
-<p:sldLayout xmlns:a="http://schemas.openxmlformats.org/drawingml/2006/main" xmlns:r="http://schemas.openxmlformats.org/officeDocument/2006/relationships" xmlns:mc="http://schemas.openxmlformats.org/markup-compatibility/2006" xmlns:mv="urn:schemas-microsoft-com:mac:vml" xmlns:p="http://schemas.openxmlformats.org/presentationml/2006/main" xmlns:c="http://schemas.openxmlformats.org/drawingml/2006/chart" xmlns:dgm="http://schemas.openxmlformats.org/drawingml/2006/diagram" xmlns:o="urn:schemas-microsoft-com:office:office" xmlns:v="urn:schemas-microsoft-com:vml" xmlns:pvml="urn:schemas-microsoft-com:office:powerpoint" xmlns:com="http://schemas.openxmlformats.org/drawingml/2006/compatibility" xmlns:p14="http://schemas.microsoft.com/office/powerpoint/2010/main" xmlns:p15="http://schemas.microsoft.com/office/powerpoint/2012/main" matchingName="Section title and description">
+<p:sldLayout xmlns:a="http://schemas.openxmlformats.org/drawingml/2006/main" xmlns:r="http://schemas.openxmlformats.org/officeDocument/2006/relationships" xmlns:p="http://schemas.openxmlformats.org/presentationml/2006/main" matchingName="Section title and description">
   <p:cSld name="SECTION_TITLE_AND_DESCRIPTION">
     <p:spTree>
       <p:nvGrpSpPr>
-        <p:cNvPr id="48" name="Shape 48"/>
+        <p:cNvPr id="1" name="Shape 48"/>
         <p:cNvGrpSpPr/>
         <p:nvPr/>
       </p:nvGrpSpPr>
@@ -4762,12 +4889,12 @@
           </a:ln>
         </p:spPr>
         <p:txBody>
-          <a:bodyPr anchorCtr="0" anchor="ctr" bIns="91425" lIns="91425" spcFirstLastPara="1" rIns="91425" wrap="square" tIns="91425">
+          <a:bodyPr spcFirstLastPara="1" wrap="square" lIns="91425" tIns="91425" rIns="91425" bIns="91425" anchor="ctr" anchorCtr="0">
             <a:noAutofit/>
           </a:bodyPr>
           <a:lstStyle/>
           <a:p>
-            <a:pPr indent="0" lvl="0" marL="0">
+            <a:pPr marL="0" lvl="0" indent="0">
               <a:spcBef>
                 <a:spcPts val="0"/>
               </a:spcBef>
@@ -4776,9 +4903,6 @@
               </a:spcAft>
               <a:buNone/>
             </a:pPr>
-            <a:r>
-              <a:t/>
-            </a:r>
             <a:endParaRPr/>
           </a:p>
         </p:txBody>
@@ -4798,21 +4922,23 @@
             <a:avLst/>
           </a:prstGeom>
           <a:noFill/>
-          <a:ln cap="flat" cmpd="sng" w="19050">
+          <a:ln w="19050" cap="flat" cmpd="sng">
             <a:solidFill>
               <a:schemeClr val="lt1"/>
             </a:solidFill>
             <a:prstDash val="solid"/>
             <a:round/>
-            <a:headEnd len="sm" w="sm" type="none"/>
-            <a:tailEnd len="sm" w="sm" type="none"/>
+            <a:headEnd type="none" w="sm" len="sm"/>
+            <a:tailEnd type="none" w="sm" len="sm"/>
           </a:ln>
         </p:spPr>
       </p:cxnSp>
       <p:sp>
         <p:nvSpPr>
           <p:cNvPr id="51" name="Shape 51"/>
-          <p:cNvSpPr txBox="1"/>
+          <p:cNvSpPr txBox="1">
+            <a:spLocks noGrp="1"/>
+          </p:cNvSpPr>
           <p:nvPr>
             <p:ph type="title"/>
           </p:nvPr>
@@ -4827,9 +4953,9 @@
           </a:prstGeom>
         </p:spPr>
         <p:txBody>
-          <a:bodyPr anchorCtr="0" anchor="b" bIns="91425" lIns="91425" spcFirstLastPara="1" rIns="91425" wrap="square" tIns="91425"/>
+          <a:bodyPr spcFirstLastPara="1" wrap="square" lIns="91425" tIns="91425" rIns="91425" bIns="91425" anchor="b" anchorCtr="0"/>
           <a:lstStyle>
-            <a:lvl1pPr lvl="0" rtl="0" algn="ctr">
+            <a:lvl1pPr lvl="0" algn="ctr" rtl="0">
               <a:spcBef>
                 <a:spcPts val="0"/>
               </a:spcBef>
@@ -4847,7 +4973,7 @@
                 </a:solidFill>
               </a:defRPr>
             </a:lvl1pPr>
-            <a:lvl2pPr lvl="1" rtl="0" algn="ctr">
+            <a:lvl2pPr lvl="1" algn="ctr" rtl="0">
               <a:spcBef>
                 <a:spcPts val="0"/>
               </a:spcBef>
@@ -4865,7 +4991,7 @@
                 </a:solidFill>
               </a:defRPr>
             </a:lvl2pPr>
-            <a:lvl3pPr lvl="2" rtl="0" algn="ctr">
+            <a:lvl3pPr lvl="2" algn="ctr" rtl="0">
               <a:spcBef>
                 <a:spcPts val="0"/>
               </a:spcBef>
@@ -4883,7 +5009,7 @@
                 </a:solidFill>
               </a:defRPr>
             </a:lvl3pPr>
-            <a:lvl4pPr lvl="3" rtl="0" algn="ctr">
+            <a:lvl4pPr lvl="3" algn="ctr" rtl="0">
               <a:spcBef>
                 <a:spcPts val="0"/>
               </a:spcBef>
@@ -4901,7 +5027,7 @@
                 </a:solidFill>
               </a:defRPr>
             </a:lvl4pPr>
-            <a:lvl5pPr lvl="4" rtl="0" algn="ctr">
+            <a:lvl5pPr lvl="4" algn="ctr" rtl="0">
               <a:spcBef>
                 <a:spcPts val="0"/>
               </a:spcBef>
@@ -4919,7 +5045,7 @@
                 </a:solidFill>
               </a:defRPr>
             </a:lvl5pPr>
-            <a:lvl6pPr lvl="5" rtl="0" algn="ctr">
+            <a:lvl6pPr lvl="5" algn="ctr" rtl="0">
               <a:spcBef>
                 <a:spcPts val="0"/>
               </a:spcBef>
@@ -4937,7 +5063,7 @@
                 </a:solidFill>
               </a:defRPr>
             </a:lvl6pPr>
-            <a:lvl7pPr lvl="6" rtl="0" algn="ctr">
+            <a:lvl7pPr lvl="6" algn="ctr" rtl="0">
               <a:spcBef>
                 <a:spcPts val="0"/>
               </a:spcBef>
@@ -4955,7 +5081,7 @@
                 </a:solidFill>
               </a:defRPr>
             </a:lvl7pPr>
-            <a:lvl8pPr lvl="7" rtl="0" algn="ctr">
+            <a:lvl8pPr lvl="7" algn="ctr" rtl="0">
               <a:spcBef>
                 <a:spcPts val="0"/>
               </a:spcBef>
@@ -4973,7 +5099,7 @@
                 </a:solidFill>
               </a:defRPr>
             </a:lvl8pPr>
-            <a:lvl9pPr lvl="8" rtl="0" algn="ctr">
+            <a:lvl9pPr lvl="8" algn="ctr" rtl="0">
               <a:spcBef>
                 <a:spcPts val="0"/>
               </a:spcBef>
@@ -4992,15 +5118,19 @@
               </a:defRPr>
             </a:lvl9pPr>
           </a:lstStyle>
-          <a:p/>
+          <a:p>
+            <a:endParaRPr/>
+          </a:p>
         </p:txBody>
       </p:sp>
       <p:sp>
         <p:nvSpPr>
           <p:cNvPr id="52" name="Shape 52"/>
-          <p:cNvSpPr txBox="1"/>
+          <p:cNvSpPr txBox="1">
+            <a:spLocks noGrp="1"/>
+          </p:cNvSpPr>
           <p:nvPr>
-            <p:ph idx="1" type="subTitle"/>
+            <p:ph type="subTitle" idx="1"/>
           </p:nvPr>
         </p:nvSpPr>
         <p:spPr>
@@ -5013,9 +5143,9 @@
           </a:prstGeom>
         </p:spPr>
         <p:txBody>
-          <a:bodyPr anchorCtr="0" anchor="t" bIns="91425" lIns="91425" spcFirstLastPara="1" rIns="91425" wrap="square" tIns="91425"/>
+          <a:bodyPr spcFirstLastPara="1" wrap="square" lIns="91425" tIns="91425" rIns="91425" bIns="91425" anchor="t" anchorCtr="0"/>
           <a:lstStyle>
-            <a:lvl1pPr lvl="0" rtl="0" algn="ctr">
+            <a:lvl1pPr lvl="0" algn="ctr" rtl="0">
               <a:lnSpc>
                 <a:spcPct val="100000"/>
               </a:lnSpc>
@@ -5029,7 +5159,7 @@
               <a:buNone/>
               <a:defRPr sz="2100"/>
             </a:lvl1pPr>
-            <a:lvl2pPr lvl="1" rtl="0" algn="ctr">
+            <a:lvl2pPr lvl="1" algn="ctr" rtl="0">
               <a:lnSpc>
                 <a:spcPct val="100000"/>
               </a:lnSpc>
@@ -5043,7 +5173,7 @@
               <a:buNone/>
               <a:defRPr sz="2100"/>
             </a:lvl2pPr>
-            <a:lvl3pPr lvl="2" rtl="0" algn="ctr">
+            <a:lvl3pPr lvl="2" algn="ctr" rtl="0">
               <a:lnSpc>
                 <a:spcPct val="100000"/>
               </a:lnSpc>
@@ -5057,7 +5187,7 @@
               <a:buNone/>
               <a:defRPr sz="2100"/>
             </a:lvl3pPr>
-            <a:lvl4pPr lvl="3" rtl="0" algn="ctr">
+            <a:lvl4pPr lvl="3" algn="ctr" rtl="0">
               <a:lnSpc>
                 <a:spcPct val="100000"/>
               </a:lnSpc>
@@ -5071,7 +5201,7 @@
               <a:buNone/>
               <a:defRPr sz="2100"/>
             </a:lvl4pPr>
-            <a:lvl5pPr lvl="4" rtl="0" algn="ctr">
+            <a:lvl5pPr lvl="4" algn="ctr" rtl="0">
               <a:lnSpc>
                 <a:spcPct val="100000"/>
               </a:lnSpc>
@@ -5085,7 +5215,7 @@
               <a:buNone/>
               <a:defRPr sz="2100"/>
             </a:lvl5pPr>
-            <a:lvl6pPr lvl="5" rtl="0" algn="ctr">
+            <a:lvl6pPr lvl="5" algn="ctr" rtl="0">
               <a:lnSpc>
                 <a:spcPct val="100000"/>
               </a:lnSpc>
@@ -5099,7 +5229,7 @@
               <a:buNone/>
               <a:defRPr sz="2100"/>
             </a:lvl6pPr>
-            <a:lvl7pPr lvl="6" rtl="0" algn="ctr">
+            <a:lvl7pPr lvl="6" algn="ctr" rtl="0">
               <a:lnSpc>
                 <a:spcPct val="100000"/>
               </a:lnSpc>
@@ -5113,7 +5243,7 @@
               <a:buNone/>
               <a:defRPr sz="2100"/>
             </a:lvl7pPr>
-            <a:lvl8pPr lvl="7" rtl="0" algn="ctr">
+            <a:lvl8pPr lvl="7" algn="ctr" rtl="0">
               <a:lnSpc>
                 <a:spcPct val="100000"/>
               </a:lnSpc>
@@ -5127,7 +5257,7 @@
               <a:buNone/>
               <a:defRPr sz="2100"/>
             </a:lvl8pPr>
-            <a:lvl9pPr lvl="8" rtl="0" algn="ctr">
+            <a:lvl9pPr lvl="8" algn="ctr" rtl="0">
               <a:lnSpc>
                 <a:spcPct val="100000"/>
               </a:lnSpc>
@@ -5142,15 +5272,19 @@
               <a:defRPr sz="2100"/>
             </a:lvl9pPr>
           </a:lstStyle>
-          <a:p/>
+          <a:p>
+            <a:endParaRPr/>
+          </a:p>
         </p:txBody>
       </p:sp>
       <p:sp>
         <p:nvSpPr>
           <p:cNvPr id="53" name="Shape 53"/>
-          <p:cNvSpPr txBox="1"/>
+          <p:cNvSpPr txBox="1">
+            <a:spLocks noGrp="1"/>
+          </p:cNvSpPr>
           <p:nvPr>
-            <p:ph idx="2" type="body"/>
+            <p:ph type="body" idx="2"/>
           </p:nvPr>
         </p:nvSpPr>
         <p:spPr>
@@ -5163,9 +5297,9 @@
           </a:prstGeom>
         </p:spPr>
         <p:txBody>
-          <a:bodyPr anchorCtr="0" anchor="ctr" bIns="91425" lIns="91425" spcFirstLastPara="1" rIns="91425" wrap="square" tIns="91425"/>
+          <a:bodyPr spcFirstLastPara="1" wrap="square" lIns="91425" tIns="91425" rIns="91425" bIns="91425" anchor="ctr" anchorCtr="0"/>
           <a:lstStyle>
-            <a:lvl1pPr indent="-342900" lvl="0" marL="457200" rtl="0">
+            <a:lvl1pPr marL="457200" lvl="0" indent="-342900" rtl="0">
               <a:spcBef>
                 <a:spcPts val="0"/>
               </a:spcBef>
@@ -5183,7 +5317,7 @@
                 </a:solidFill>
               </a:defRPr>
             </a:lvl1pPr>
-            <a:lvl2pPr indent="-317500" lvl="1" marL="914400" rtl="0">
+            <a:lvl2pPr marL="914400" lvl="1" indent="-317500" rtl="0">
               <a:spcBef>
                 <a:spcPts val="1600"/>
               </a:spcBef>
@@ -5201,7 +5335,7 @@
                 </a:solidFill>
               </a:defRPr>
             </a:lvl2pPr>
-            <a:lvl3pPr indent="-317500" lvl="2" marL="1371600" rtl="0">
+            <a:lvl3pPr marL="1371600" lvl="2" indent="-317500" rtl="0">
               <a:spcBef>
                 <a:spcPts val="1600"/>
               </a:spcBef>
@@ -5219,7 +5353,7 @@
                 </a:solidFill>
               </a:defRPr>
             </a:lvl3pPr>
-            <a:lvl4pPr indent="-317500" lvl="3" marL="1828800" rtl="0">
+            <a:lvl4pPr marL="1828800" lvl="3" indent="-317500" rtl="0">
               <a:spcBef>
                 <a:spcPts val="1600"/>
               </a:spcBef>
@@ -5237,7 +5371,7 @@
                 </a:solidFill>
               </a:defRPr>
             </a:lvl4pPr>
-            <a:lvl5pPr indent="-317500" lvl="4" marL="2286000" rtl="0">
+            <a:lvl5pPr marL="2286000" lvl="4" indent="-317500" rtl="0">
               <a:spcBef>
                 <a:spcPts val="1600"/>
               </a:spcBef>
@@ -5255,7 +5389,7 @@
                 </a:solidFill>
               </a:defRPr>
             </a:lvl5pPr>
-            <a:lvl6pPr indent="-317500" lvl="5" marL="2743200" rtl="0">
+            <a:lvl6pPr marL="2743200" lvl="5" indent="-317500" rtl="0">
               <a:spcBef>
                 <a:spcPts val="1600"/>
               </a:spcBef>
@@ -5273,7 +5407,7 @@
                 </a:solidFill>
               </a:defRPr>
             </a:lvl6pPr>
-            <a:lvl7pPr indent="-317500" lvl="6" marL="3200400" rtl="0">
+            <a:lvl7pPr marL="3200400" lvl="6" indent="-317500" rtl="0">
               <a:spcBef>
                 <a:spcPts val="1600"/>
               </a:spcBef>
@@ -5291,7 +5425,7 @@
                 </a:solidFill>
               </a:defRPr>
             </a:lvl7pPr>
-            <a:lvl8pPr indent="-317500" lvl="7" marL="3657600" rtl="0">
+            <a:lvl8pPr marL="3657600" lvl="7" indent="-317500" rtl="0">
               <a:spcBef>
                 <a:spcPts val="1600"/>
               </a:spcBef>
@@ -5309,7 +5443,7 @@
                 </a:solidFill>
               </a:defRPr>
             </a:lvl8pPr>
-            <a:lvl9pPr indent="-317500" lvl="8" marL="4114800" rtl="0">
+            <a:lvl9pPr marL="4114800" lvl="8" indent="-317500" rtl="0">
               <a:spcBef>
                 <a:spcPts val="1600"/>
               </a:spcBef>
@@ -5328,15 +5462,19 @@
               </a:defRPr>
             </a:lvl9pPr>
           </a:lstStyle>
-          <a:p/>
+          <a:p>
+            <a:endParaRPr/>
+          </a:p>
         </p:txBody>
       </p:sp>
       <p:sp>
         <p:nvSpPr>
           <p:cNvPr id="54" name="Shape 54"/>
-          <p:cNvSpPr txBox="1"/>
+          <p:cNvSpPr txBox="1">
+            <a:spLocks noGrp="1"/>
+          </p:cNvSpPr>
           <p:nvPr>
-            <p:ph idx="12" type="sldNum"/>
+            <p:ph type="sldNum" idx="12"/>
           </p:nvPr>
         </p:nvSpPr>
         <p:spPr>
@@ -5349,7 +5487,7 @@
           </a:prstGeom>
         </p:spPr>
         <p:txBody>
-          <a:bodyPr anchorCtr="0" anchor="ctr" bIns="91425" lIns="91425" spcFirstLastPara="1" rIns="91425" wrap="square" tIns="91425">
+          <a:bodyPr spcFirstLastPara="1" wrap="square" lIns="91425" tIns="91425" rIns="91425" bIns="91425" anchor="ctr" anchorCtr="0">
             <a:noAutofit/>
           </a:bodyPr>
           <a:lstStyle>
@@ -5427,7 +5565,7 @@
             </a:lvl9pPr>
           </a:lstStyle>
           <a:p>
-            <a:pPr indent="0" lvl="0" marL="0">
+            <a:pPr marL="0" lvl="0" indent="0">
               <a:spcBef>
                 <a:spcPts val="0"/>
               </a:spcBef>
@@ -5453,11 +5591,11 @@
 </file>
 
 <file path=ppt/slideLayouts/slideLayout9.xml><?xml version="1.0" encoding="utf-8"?>
-<p:sldLayout xmlns:a="http://schemas.openxmlformats.org/drawingml/2006/main" xmlns:r="http://schemas.openxmlformats.org/officeDocument/2006/relationships" xmlns:mc="http://schemas.openxmlformats.org/markup-compatibility/2006" xmlns:mv="urn:schemas-microsoft-com:mac:vml" xmlns:p="http://schemas.openxmlformats.org/presentationml/2006/main" xmlns:c="http://schemas.openxmlformats.org/drawingml/2006/chart" xmlns:dgm="http://schemas.openxmlformats.org/drawingml/2006/diagram" xmlns:o="urn:schemas-microsoft-com:office:office" xmlns:v="urn:schemas-microsoft-com:vml" xmlns:pvml="urn:schemas-microsoft-com:office:powerpoint" xmlns:com="http://schemas.openxmlformats.org/drawingml/2006/compatibility" xmlns:p14="http://schemas.microsoft.com/office/powerpoint/2010/main" xmlns:p15="http://schemas.microsoft.com/office/powerpoint/2012/main" matchingName="Caption">
+<p:sldLayout xmlns:a="http://schemas.openxmlformats.org/drawingml/2006/main" xmlns:r="http://schemas.openxmlformats.org/officeDocument/2006/relationships" xmlns:p="http://schemas.openxmlformats.org/presentationml/2006/main" matchingName="Caption">
   <p:cSld name="CAPTION_ONLY">
     <p:spTree>
       <p:nvGrpSpPr>
-        <p:cNvPr id="55" name="Shape 55"/>
+        <p:cNvPr id="1" name="Shape 55"/>
         <p:cNvGrpSpPr/>
         <p:nvPr/>
       </p:nvGrpSpPr>
@@ -5484,14 +5622,14 @@
             <a:avLst/>
           </a:prstGeom>
           <a:noFill/>
-          <a:ln cap="flat" cmpd="sng" w="19050">
+          <a:ln w="19050" cap="flat" cmpd="sng">
             <a:solidFill>
               <a:schemeClr val="dk2"/>
             </a:solidFill>
             <a:prstDash val="solid"/>
             <a:round/>
-            <a:headEnd len="sm" w="sm" type="none"/>
-            <a:tailEnd len="sm" w="sm" type="none"/>
+            <a:headEnd type="none" w="sm" len="sm"/>
+            <a:tailEnd type="none" w="sm" len="sm"/>
           </a:ln>
         </p:spPr>
       </p:cxnSp>
@@ -5510,23 +5648,25 @@
             <a:avLst/>
           </a:prstGeom>
           <a:noFill/>
-          <a:ln cap="flat" cmpd="sng" w="19050">
+          <a:ln w="19050" cap="flat" cmpd="sng">
             <a:solidFill>
               <a:schemeClr val="dk2"/>
             </a:solidFill>
             <a:prstDash val="solid"/>
             <a:round/>
-            <a:headEnd len="sm" w="sm" type="none"/>
-            <a:tailEnd len="sm" w="sm" type="none"/>
+            <a:headEnd type="none" w="sm" len="sm"/>
+            <a:tailEnd type="none" w="sm" len="sm"/>
           </a:ln>
         </p:spPr>
       </p:cxnSp>
       <p:sp>
         <p:nvSpPr>
           <p:cNvPr id="58" name="Shape 58"/>
-          <p:cNvSpPr txBox="1"/>
+          <p:cNvSpPr txBox="1">
+            <a:spLocks noGrp="1"/>
+          </p:cNvSpPr>
           <p:nvPr>
-            <p:ph idx="1" type="body"/>
+            <p:ph type="body" idx="1"/>
           </p:nvPr>
         </p:nvSpPr>
         <p:spPr>
@@ -5539,9 +5679,9 @@
           </a:prstGeom>
         </p:spPr>
         <p:txBody>
-          <a:bodyPr anchorCtr="0" anchor="ctr" bIns="91425" lIns="91425" spcFirstLastPara="1" rIns="91425" wrap="square" tIns="91425"/>
+          <a:bodyPr spcFirstLastPara="1" wrap="square" lIns="91425" tIns="91425" rIns="91425" bIns="91425" anchor="ctr" anchorCtr="0"/>
           <a:lstStyle>
-            <a:lvl1pPr indent="-228600" lvl="0" marL="457200" rtl="0">
+            <a:lvl1pPr marL="457200" lvl="0" indent="-228600" rtl="0">
               <a:lnSpc>
                 <a:spcPct val="100000"/>
               </a:lnSpc>
@@ -5556,15 +5696,19 @@
               <a:defRPr/>
             </a:lvl1pPr>
           </a:lstStyle>
-          <a:p/>
+          <a:p>
+            <a:endParaRPr/>
+          </a:p>
         </p:txBody>
       </p:sp>
       <p:sp>
         <p:nvSpPr>
           <p:cNvPr id="59" name="Shape 59"/>
-          <p:cNvSpPr txBox="1"/>
+          <p:cNvSpPr txBox="1">
+            <a:spLocks noGrp="1"/>
+          </p:cNvSpPr>
           <p:nvPr>
-            <p:ph idx="12" type="sldNum"/>
+            <p:ph type="sldNum" idx="12"/>
           </p:nvPr>
         </p:nvSpPr>
         <p:spPr>
@@ -5577,7 +5721,7 @@
           </a:prstGeom>
         </p:spPr>
         <p:txBody>
-          <a:bodyPr anchorCtr="0" anchor="ctr" bIns="91425" lIns="91425" spcFirstLastPara="1" rIns="91425" wrap="square" tIns="91425">
+          <a:bodyPr spcFirstLastPara="1" wrap="square" lIns="91425" tIns="91425" rIns="91425" bIns="91425" anchor="ctr" anchorCtr="0">
             <a:noAutofit/>
           </a:bodyPr>
           <a:lstStyle>
@@ -5619,7 +5763,7 @@
             </a:lvl9pPr>
           </a:lstStyle>
           <a:p>
-            <a:pPr indent="0" lvl="0" marL="0">
+            <a:pPr marL="0" lvl="0" indent="0">
               <a:spcBef>
                 <a:spcPts val="0"/>
               </a:spcBef>
@@ -5645,18 +5789,19 @@
 </file>
 
 <file path=ppt/slideMasters/slideMaster1.xml><?xml version="1.0" encoding="utf-8"?>
-<p:sldMaster xmlns:a="http://schemas.openxmlformats.org/drawingml/2006/main" xmlns:r="http://schemas.openxmlformats.org/officeDocument/2006/relationships" xmlns:mc="http://schemas.openxmlformats.org/markup-compatibility/2006" xmlns:mv="urn:schemas-microsoft-com:mac:vml" xmlns:p="http://schemas.openxmlformats.org/presentationml/2006/main" xmlns:c="http://schemas.openxmlformats.org/drawingml/2006/chart" xmlns:dgm="http://schemas.openxmlformats.org/drawingml/2006/diagram" xmlns:o="urn:schemas-microsoft-com:office:office" xmlns:v="urn:schemas-microsoft-com:vml" xmlns:pvml="urn:schemas-microsoft-com:office:powerpoint" xmlns:com="http://schemas.openxmlformats.org/drawingml/2006/compatibility" xmlns:p14="http://schemas.microsoft.com/office/powerpoint/2010/main" xmlns:p15="http://schemas.microsoft.com/office/powerpoint/2012/main">
+<p:sldMaster xmlns:a="http://schemas.openxmlformats.org/drawingml/2006/main" xmlns:r="http://schemas.openxmlformats.org/officeDocument/2006/relationships" xmlns:p="http://schemas.openxmlformats.org/presentationml/2006/main">
   <p:cSld name="swiss-2">
     <p:bg>
       <p:bgPr>
         <a:solidFill>
           <a:schemeClr val="lt1"/>
         </a:solidFill>
+        <a:effectLst/>
       </p:bgPr>
     </p:bg>
     <p:spTree>
       <p:nvGrpSpPr>
-        <p:cNvPr id="5" name="Shape 5"/>
+        <p:cNvPr id="1" name="Shape 5"/>
         <p:cNvGrpSpPr/>
         <p:nvPr/>
       </p:nvGrpSpPr>
@@ -5671,7 +5816,9 @@
       <p:sp>
         <p:nvSpPr>
           <p:cNvPr id="6" name="Shape 6"/>
-          <p:cNvSpPr txBox="1"/>
+          <p:cNvSpPr txBox="1">
+            <a:spLocks noGrp="1"/>
+          </p:cNvSpPr>
           <p:nvPr>
             <p:ph type="title"/>
           </p:nvPr>
@@ -5690,7 +5837,7 @@
           </a:ln>
         </p:spPr>
         <p:txBody>
-          <a:bodyPr anchorCtr="0" anchor="t" bIns="91425" lIns="91425" spcFirstLastPara="1" rIns="91425" wrap="square" tIns="91425"/>
+          <a:bodyPr spcFirstLastPara="1" wrap="square" lIns="91425" tIns="91425" rIns="91425" bIns="91425" anchor="t" anchorCtr="0"/>
           <a:lstStyle>
             <a:lvl1pPr lvl="0" rtl="0">
               <a:spcBef>
@@ -5705,7 +5852,7 @@
               <a:buSzPts val="3000"/>
               <a:buFont typeface="Raleway"/>
               <a:buNone/>
-              <a:defRPr b="1" sz="3000">
+              <a:defRPr sz="3000" b="1">
                 <a:solidFill>
                   <a:schemeClr val="dk2"/>
                 </a:solidFill>
@@ -5728,7 +5875,7 @@
               <a:buSzPts val="3000"/>
               <a:buFont typeface="Raleway"/>
               <a:buNone/>
-              <a:defRPr b="1" sz="3000">
+              <a:defRPr sz="3000" b="1">
                 <a:solidFill>
                   <a:schemeClr val="dk2"/>
                 </a:solidFill>
@@ -5751,7 +5898,7 @@
               <a:buSzPts val="3000"/>
               <a:buFont typeface="Raleway"/>
               <a:buNone/>
-              <a:defRPr b="1" sz="3000">
+              <a:defRPr sz="3000" b="1">
                 <a:solidFill>
                   <a:schemeClr val="dk2"/>
                 </a:solidFill>
@@ -5774,7 +5921,7 @@
               <a:buSzPts val="3000"/>
               <a:buFont typeface="Raleway"/>
               <a:buNone/>
-              <a:defRPr b="1" sz="3000">
+              <a:defRPr sz="3000" b="1">
                 <a:solidFill>
                   <a:schemeClr val="dk2"/>
                 </a:solidFill>
@@ -5797,7 +5944,7 @@
               <a:buSzPts val="3000"/>
               <a:buFont typeface="Raleway"/>
               <a:buNone/>
-              <a:defRPr b="1" sz="3000">
+              <a:defRPr sz="3000" b="1">
                 <a:solidFill>
                   <a:schemeClr val="dk2"/>
                 </a:solidFill>
@@ -5820,7 +5967,7 @@
               <a:buSzPts val="3000"/>
               <a:buFont typeface="Raleway"/>
               <a:buNone/>
-              <a:defRPr b="1" sz="3000">
+              <a:defRPr sz="3000" b="1">
                 <a:solidFill>
                   <a:schemeClr val="dk2"/>
                 </a:solidFill>
@@ -5843,7 +5990,7 @@
               <a:buSzPts val="3000"/>
               <a:buFont typeface="Raleway"/>
               <a:buNone/>
-              <a:defRPr b="1" sz="3000">
+              <a:defRPr sz="3000" b="1">
                 <a:solidFill>
                   <a:schemeClr val="dk2"/>
                 </a:solidFill>
@@ -5866,7 +6013,7 @@
               <a:buSzPts val="3000"/>
               <a:buFont typeface="Raleway"/>
               <a:buNone/>
-              <a:defRPr b="1" sz="3000">
+              <a:defRPr sz="3000" b="1">
                 <a:solidFill>
                   <a:schemeClr val="dk2"/>
                 </a:solidFill>
@@ -5889,7 +6036,7 @@
               <a:buSzPts val="3000"/>
               <a:buFont typeface="Raleway"/>
               <a:buNone/>
-              <a:defRPr b="1" sz="3000">
+              <a:defRPr sz="3000" b="1">
                 <a:solidFill>
                   <a:schemeClr val="dk2"/>
                 </a:solidFill>
@@ -5900,15 +6047,19 @@
               </a:defRPr>
             </a:lvl9pPr>
           </a:lstStyle>
-          <a:p/>
+          <a:p>
+            <a:endParaRPr/>
+          </a:p>
         </p:txBody>
       </p:sp>
       <p:sp>
         <p:nvSpPr>
           <p:cNvPr id="7" name="Shape 7"/>
-          <p:cNvSpPr txBox="1"/>
+          <p:cNvSpPr txBox="1">
+            <a:spLocks noGrp="1"/>
+          </p:cNvSpPr>
           <p:nvPr>
-            <p:ph idx="1" type="body"/>
+            <p:ph type="body" idx="1"/>
           </p:nvPr>
         </p:nvSpPr>
         <p:spPr>
@@ -5925,9 +6076,9 @@
           </a:ln>
         </p:spPr>
         <p:txBody>
-          <a:bodyPr anchorCtr="0" anchor="t" bIns="91425" lIns="91425" spcFirstLastPara="1" rIns="91425" wrap="square" tIns="91425"/>
+          <a:bodyPr spcFirstLastPara="1" wrap="square" lIns="91425" tIns="91425" rIns="91425" bIns="91425" anchor="t" anchorCtr="0"/>
           <a:lstStyle>
-            <a:lvl1pPr indent="-342900" lvl="0" marL="457200" rtl="0">
+            <a:lvl1pPr marL="457200" lvl="0" indent="-342900" rtl="0">
               <a:lnSpc>
                 <a:spcPct val="115000"/>
               </a:lnSpc>
@@ -5953,7 +6104,7 @@
                 <a:sym typeface="Lato"/>
               </a:defRPr>
             </a:lvl1pPr>
-            <a:lvl2pPr indent="-317500" lvl="1" marL="914400" rtl="0">
+            <a:lvl2pPr marL="914400" lvl="1" indent="-317500" rtl="0">
               <a:lnSpc>
                 <a:spcPct val="115000"/>
               </a:lnSpc>
@@ -5979,7 +6130,7 @@
                 <a:sym typeface="Lato"/>
               </a:defRPr>
             </a:lvl2pPr>
-            <a:lvl3pPr indent="-317500" lvl="2" marL="1371600" rtl="0">
+            <a:lvl3pPr marL="1371600" lvl="2" indent="-317500" rtl="0">
               <a:lnSpc>
                 <a:spcPct val="115000"/>
               </a:lnSpc>
@@ -6005,7 +6156,7 @@
                 <a:sym typeface="Lato"/>
               </a:defRPr>
             </a:lvl3pPr>
-            <a:lvl4pPr indent="-317500" lvl="3" marL="1828800" rtl="0">
+            <a:lvl4pPr marL="1828800" lvl="3" indent="-317500" rtl="0">
               <a:lnSpc>
                 <a:spcPct val="115000"/>
               </a:lnSpc>
@@ -6031,7 +6182,7 @@
                 <a:sym typeface="Lato"/>
               </a:defRPr>
             </a:lvl4pPr>
-            <a:lvl5pPr indent="-317500" lvl="4" marL="2286000" rtl="0">
+            <a:lvl5pPr marL="2286000" lvl="4" indent="-317500" rtl="0">
               <a:lnSpc>
                 <a:spcPct val="115000"/>
               </a:lnSpc>
@@ -6057,7 +6208,7 @@
                 <a:sym typeface="Lato"/>
               </a:defRPr>
             </a:lvl5pPr>
-            <a:lvl6pPr indent="-317500" lvl="5" marL="2743200" rtl="0">
+            <a:lvl6pPr marL="2743200" lvl="5" indent="-317500" rtl="0">
               <a:lnSpc>
                 <a:spcPct val="115000"/>
               </a:lnSpc>
@@ -6083,7 +6234,7 @@
                 <a:sym typeface="Lato"/>
               </a:defRPr>
             </a:lvl6pPr>
-            <a:lvl7pPr indent="-317500" lvl="6" marL="3200400" rtl="0">
+            <a:lvl7pPr marL="3200400" lvl="6" indent="-317500" rtl="0">
               <a:lnSpc>
                 <a:spcPct val="115000"/>
               </a:lnSpc>
@@ -6109,7 +6260,7 @@
                 <a:sym typeface="Lato"/>
               </a:defRPr>
             </a:lvl7pPr>
-            <a:lvl8pPr indent="-317500" lvl="7" marL="3657600" rtl="0">
+            <a:lvl8pPr marL="3657600" lvl="7" indent="-317500" rtl="0">
               <a:lnSpc>
                 <a:spcPct val="115000"/>
               </a:lnSpc>
@@ -6135,7 +6286,7 @@
                 <a:sym typeface="Lato"/>
               </a:defRPr>
             </a:lvl8pPr>
-            <a:lvl9pPr indent="-317500" lvl="8" marL="4114800" rtl="0">
+            <a:lvl9pPr marL="4114800" lvl="8" indent="-317500" rtl="0">
               <a:lnSpc>
                 <a:spcPct val="115000"/>
               </a:lnSpc>
@@ -6162,15 +6313,19 @@
               </a:defRPr>
             </a:lvl9pPr>
           </a:lstStyle>
-          <a:p/>
+          <a:p>
+            <a:endParaRPr/>
+          </a:p>
         </p:txBody>
       </p:sp>
       <p:sp>
         <p:nvSpPr>
           <p:cNvPr id="8" name="Shape 8"/>
-          <p:cNvSpPr txBox="1"/>
+          <p:cNvSpPr txBox="1">
+            <a:spLocks noGrp="1"/>
+          </p:cNvSpPr>
           <p:nvPr>
-            <p:ph idx="12" type="sldNum"/>
+            <p:ph type="sldNum" idx="12"/>
           </p:nvPr>
         </p:nvSpPr>
         <p:spPr>
@@ -6187,11 +6342,11 @@
           </a:ln>
         </p:spPr>
         <p:txBody>
-          <a:bodyPr anchorCtr="0" anchor="ctr" bIns="91425" lIns="91425" spcFirstLastPara="1" rIns="91425" wrap="square" tIns="91425">
+          <a:bodyPr spcFirstLastPara="1" wrap="square" lIns="91425" tIns="91425" rIns="91425" bIns="91425" anchor="ctr" anchorCtr="0">
             <a:noAutofit/>
           </a:bodyPr>
           <a:lstStyle>
-            <a:lvl1pPr lvl="0" rtl="0" algn="r">
+            <a:lvl1pPr lvl="0" algn="r" rtl="0">
               <a:buNone/>
               <a:defRPr sz="1000">
                 <a:solidFill>
@@ -6203,7 +6358,7 @@
                 <a:sym typeface="Lato"/>
               </a:defRPr>
             </a:lvl1pPr>
-            <a:lvl2pPr lvl="1" rtl="0" algn="r">
+            <a:lvl2pPr lvl="1" algn="r" rtl="0">
               <a:buNone/>
               <a:defRPr sz="1000">
                 <a:solidFill>
@@ -6215,7 +6370,7 @@
                 <a:sym typeface="Lato"/>
               </a:defRPr>
             </a:lvl2pPr>
-            <a:lvl3pPr lvl="2" rtl="0" algn="r">
+            <a:lvl3pPr lvl="2" algn="r" rtl="0">
               <a:buNone/>
               <a:defRPr sz="1000">
                 <a:solidFill>
@@ -6227,7 +6382,7 @@
                 <a:sym typeface="Lato"/>
               </a:defRPr>
             </a:lvl3pPr>
-            <a:lvl4pPr lvl="3" rtl="0" algn="r">
+            <a:lvl4pPr lvl="3" algn="r" rtl="0">
               <a:buNone/>
               <a:defRPr sz="1000">
                 <a:solidFill>
@@ -6239,7 +6394,7 @@
                 <a:sym typeface="Lato"/>
               </a:defRPr>
             </a:lvl4pPr>
-            <a:lvl5pPr lvl="4" rtl="0" algn="r">
+            <a:lvl5pPr lvl="4" algn="r" rtl="0">
               <a:buNone/>
               <a:defRPr sz="1000">
                 <a:solidFill>
@@ -6251,7 +6406,7 @@
                 <a:sym typeface="Lato"/>
               </a:defRPr>
             </a:lvl5pPr>
-            <a:lvl6pPr lvl="5" rtl="0" algn="r">
+            <a:lvl6pPr lvl="5" algn="r" rtl="0">
               <a:buNone/>
               <a:defRPr sz="1000">
                 <a:solidFill>
@@ -6263,7 +6418,7 @@
                 <a:sym typeface="Lato"/>
               </a:defRPr>
             </a:lvl6pPr>
-            <a:lvl7pPr lvl="6" rtl="0" algn="r">
+            <a:lvl7pPr lvl="6" algn="r" rtl="0">
               <a:buNone/>
               <a:defRPr sz="1000">
                 <a:solidFill>
@@ -6275,7 +6430,7 @@
                 <a:sym typeface="Lato"/>
               </a:defRPr>
             </a:lvl7pPr>
-            <a:lvl8pPr lvl="7" rtl="0" algn="r">
+            <a:lvl8pPr lvl="7" algn="r" rtl="0">
               <a:buNone/>
               <a:defRPr sz="1000">
                 <a:solidFill>
@@ -6287,7 +6442,7 @@
                 <a:sym typeface="Lato"/>
               </a:defRPr>
             </a:lvl8pPr>
-            <a:lvl9pPr lvl="8" rtl="0" algn="r">
+            <a:lvl9pPr lvl="8" algn="r" rtl="0">
               <a:buNone/>
               <a:defRPr sz="1000">
                 <a:solidFill>
@@ -6301,7 +6456,7 @@
             </a:lvl9pPr>
           </a:lstStyle>
           <a:p>
-            <a:pPr indent="0" lvl="0" marL="0">
+            <a:pPr marL="0" lvl="0" indent="0">
               <a:spcBef>
                 <a:spcPts val="0"/>
               </a:spcBef>
@@ -6320,7 +6475,7 @@
       </p:sp>
     </p:spTree>
   </p:cSld>
-  <p:clrMap accent1="accent1" accent2="accent2" accent3="accent3" accent4="accent4" accent5="accent5" accent6="accent6" bg1="lt1" bg2="dk2" tx1="dk1" tx2="lt2" folHlink="folHlink" hlink="hlink"/>
+  <p:clrMap bg1="lt1" tx1="dk1" bg2="dk2" tx2="lt2" accent1="accent1" accent2="accent2" accent3="accent3" accent4="accent4" accent5="accent5" accent6="accent6" hlink="hlink" folHlink="folHlink"/>
   <p:sldLayoutIdLst>
     <p:sldLayoutId id="2147483648" r:id="rId1"/>
     <p:sldLayoutId id="2147483649" r:id="rId2"/>
@@ -6334,10 +6489,10 @@
     <p:sldLayoutId id="2147483657" r:id="rId10"/>
     <p:sldLayoutId id="2147483658" r:id="rId11"/>
   </p:sldLayoutIdLst>
-  <p:hf dt="0" ftr="0" hdr="0" sldNum="0"/>
+  <p:hf sldNum="0" hdr="0" ftr="0" dt="0"/>
   <p:txStyles>
     <p:titleStyle>
-      <a:defPPr lvl="0" marR="0" rtl="0" algn="l">
+      <a:defPPr marR="0" lvl="0" algn="l" rtl="0">
         <a:lnSpc>
           <a:spcPct val="100000"/>
         </a:lnSpc>
@@ -6348,7 +6503,7 @@
           <a:spcPts val="0"/>
         </a:spcAft>
       </a:defPPr>
-      <a:lvl1pPr lvl="0" marR="0" rtl="0" algn="l">
+      <a:lvl1pPr marR="0" lvl="0" algn="l" rtl="0">
         <a:lnSpc>
           <a:spcPct val="100000"/>
         </a:lnSpc>
@@ -6362,7 +6517,7 @@
           <a:srgbClr val="000000"/>
         </a:buClr>
         <a:buFont typeface="Arial"/>
-        <a:defRPr b="0" i="0" sz="1400" u="none" cap="none" strike="noStrike">
+        <a:defRPr sz="1400" b="0" i="0" u="none" strike="noStrike" cap="none">
           <a:solidFill>
             <a:srgbClr val="000000"/>
           </a:solidFill>
@@ -6372,7 +6527,7 @@
           <a:sym typeface="Arial"/>
         </a:defRPr>
       </a:lvl1pPr>
-      <a:lvl2pPr lvl="1" marR="0" rtl="0" algn="l">
+      <a:lvl2pPr marR="0" lvl="1" algn="l" rtl="0">
         <a:lnSpc>
           <a:spcPct val="100000"/>
         </a:lnSpc>
@@ -6386,7 +6541,7 @@
           <a:srgbClr val="000000"/>
         </a:buClr>
         <a:buFont typeface="Arial"/>
-        <a:defRPr b="0" i="0" sz="1400" u="none" cap="none" strike="noStrike">
+        <a:defRPr sz="1400" b="0" i="0" u="none" strike="noStrike" cap="none">
           <a:solidFill>
             <a:srgbClr val="000000"/>
           </a:solidFill>
@@ -6396,7 +6551,7 @@
           <a:sym typeface="Arial"/>
         </a:defRPr>
       </a:lvl2pPr>
-      <a:lvl3pPr lvl="2" marR="0" rtl="0" algn="l">
+      <a:lvl3pPr marR="0" lvl="2" algn="l" rtl="0">
         <a:lnSpc>
           <a:spcPct val="100000"/>
         </a:lnSpc>
@@ -6410,7 +6565,7 @@
           <a:srgbClr val="000000"/>
         </a:buClr>
         <a:buFont typeface="Arial"/>
-        <a:defRPr b="0" i="0" sz="1400" u="none" cap="none" strike="noStrike">
+        <a:defRPr sz="1400" b="0" i="0" u="none" strike="noStrike" cap="none">
           <a:solidFill>
             <a:srgbClr val="000000"/>
           </a:solidFill>
@@ -6420,7 +6575,7 @@
           <a:sym typeface="Arial"/>
         </a:defRPr>
       </a:lvl3pPr>
-      <a:lvl4pPr lvl="3" marR="0" rtl="0" algn="l">
+      <a:lvl4pPr marR="0" lvl="3" algn="l" rtl="0">
         <a:lnSpc>
           <a:spcPct val="100000"/>
         </a:lnSpc>
@@ -6434,7 +6589,7 @@
           <a:srgbClr val="000000"/>
         </a:buClr>
         <a:buFont typeface="Arial"/>
-        <a:defRPr b="0" i="0" sz="1400" u="none" cap="none" strike="noStrike">
+        <a:defRPr sz="1400" b="0" i="0" u="none" strike="noStrike" cap="none">
           <a:solidFill>
             <a:srgbClr val="000000"/>
           </a:solidFill>
@@ -6444,7 +6599,7 @@
           <a:sym typeface="Arial"/>
         </a:defRPr>
       </a:lvl4pPr>
-      <a:lvl5pPr lvl="4" marR="0" rtl="0" algn="l">
+      <a:lvl5pPr marR="0" lvl="4" algn="l" rtl="0">
         <a:lnSpc>
           <a:spcPct val="100000"/>
         </a:lnSpc>
@@ -6458,7 +6613,7 @@
           <a:srgbClr val="000000"/>
         </a:buClr>
         <a:buFont typeface="Arial"/>
-        <a:defRPr b="0" i="0" sz="1400" u="none" cap="none" strike="noStrike">
+        <a:defRPr sz="1400" b="0" i="0" u="none" strike="noStrike" cap="none">
           <a:solidFill>
             <a:srgbClr val="000000"/>
           </a:solidFill>
@@ -6468,7 +6623,7 @@
           <a:sym typeface="Arial"/>
         </a:defRPr>
       </a:lvl5pPr>
-      <a:lvl6pPr lvl="5" marR="0" rtl="0" algn="l">
+      <a:lvl6pPr marR="0" lvl="5" algn="l" rtl="0">
         <a:lnSpc>
           <a:spcPct val="100000"/>
         </a:lnSpc>
@@ -6482,7 +6637,7 @@
           <a:srgbClr val="000000"/>
         </a:buClr>
         <a:buFont typeface="Arial"/>
-        <a:defRPr b="0" i="0" sz="1400" u="none" cap="none" strike="noStrike">
+        <a:defRPr sz="1400" b="0" i="0" u="none" strike="noStrike" cap="none">
           <a:solidFill>
             <a:srgbClr val="000000"/>
           </a:solidFill>
@@ -6492,7 +6647,7 @@
           <a:sym typeface="Arial"/>
         </a:defRPr>
       </a:lvl6pPr>
-      <a:lvl7pPr lvl="6" marR="0" rtl="0" algn="l">
+      <a:lvl7pPr marR="0" lvl="6" algn="l" rtl="0">
         <a:lnSpc>
           <a:spcPct val="100000"/>
         </a:lnSpc>
@@ -6506,7 +6661,7 @@
           <a:srgbClr val="000000"/>
         </a:buClr>
         <a:buFont typeface="Arial"/>
-        <a:defRPr b="0" i="0" sz="1400" u="none" cap="none" strike="noStrike">
+        <a:defRPr sz="1400" b="0" i="0" u="none" strike="noStrike" cap="none">
           <a:solidFill>
             <a:srgbClr val="000000"/>
           </a:solidFill>
@@ -6516,7 +6671,7 @@
           <a:sym typeface="Arial"/>
         </a:defRPr>
       </a:lvl7pPr>
-      <a:lvl8pPr lvl="7" marR="0" rtl="0" algn="l">
+      <a:lvl8pPr marR="0" lvl="7" algn="l" rtl="0">
         <a:lnSpc>
           <a:spcPct val="100000"/>
         </a:lnSpc>
@@ -6530,7 +6685,7 @@
           <a:srgbClr val="000000"/>
         </a:buClr>
         <a:buFont typeface="Arial"/>
-        <a:defRPr b="0" i="0" sz="1400" u="none" cap="none" strike="noStrike">
+        <a:defRPr sz="1400" b="0" i="0" u="none" strike="noStrike" cap="none">
           <a:solidFill>
             <a:srgbClr val="000000"/>
           </a:solidFill>
@@ -6540,7 +6695,7 @@
           <a:sym typeface="Arial"/>
         </a:defRPr>
       </a:lvl8pPr>
-      <a:lvl9pPr lvl="8" marR="0" rtl="0" algn="l">
+      <a:lvl9pPr marR="0" lvl="8" algn="l" rtl="0">
         <a:lnSpc>
           <a:spcPct val="100000"/>
         </a:lnSpc>
@@ -6554,7 +6709,7 @@
           <a:srgbClr val="000000"/>
         </a:buClr>
         <a:buFont typeface="Arial"/>
-        <a:defRPr b="0" i="0" sz="1400" u="none" cap="none" strike="noStrike">
+        <a:defRPr sz="1400" b="0" i="0" u="none" strike="noStrike" cap="none">
           <a:solidFill>
             <a:srgbClr val="000000"/>
           </a:solidFill>
@@ -6566,7 +6721,7 @@
       </a:lvl9pPr>
     </p:titleStyle>
     <p:bodyStyle>
-      <a:defPPr lvl="0" marR="0" rtl="0" algn="l">
+      <a:defPPr marR="0" lvl="0" algn="l" rtl="0">
         <a:lnSpc>
           <a:spcPct val="100000"/>
         </a:lnSpc>
@@ -6577,7 +6732,7 @@
           <a:spcPts val="0"/>
         </a:spcAft>
       </a:defPPr>
-      <a:lvl1pPr lvl="0" marR="0" rtl="0" algn="l">
+      <a:lvl1pPr marR="0" lvl="0" algn="l" rtl="0">
         <a:lnSpc>
           <a:spcPct val="100000"/>
         </a:lnSpc>
@@ -6591,7 +6746,7 @@
           <a:srgbClr val="000000"/>
         </a:buClr>
         <a:buFont typeface="Arial"/>
-        <a:defRPr b="0" i="0" sz="1400" u="none" cap="none" strike="noStrike">
+        <a:defRPr sz="1400" b="0" i="0" u="none" strike="noStrike" cap="none">
           <a:solidFill>
             <a:srgbClr val="000000"/>
           </a:solidFill>
@@ -6601,7 +6756,7 @@
           <a:sym typeface="Arial"/>
         </a:defRPr>
       </a:lvl1pPr>
-      <a:lvl2pPr lvl="1" marR="0" rtl="0" algn="l">
+      <a:lvl2pPr marR="0" lvl="1" algn="l" rtl="0">
         <a:lnSpc>
           <a:spcPct val="100000"/>
         </a:lnSpc>
@@ -6615,7 +6770,7 @@
           <a:srgbClr val="000000"/>
         </a:buClr>
         <a:buFont typeface="Arial"/>
-        <a:defRPr b="0" i="0" sz="1400" u="none" cap="none" strike="noStrike">
+        <a:defRPr sz="1400" b="0" i="0" u="none" strike="noStrike" cap="none">
           <a:solidFill>
             <a:srgbClr val="000000"/>
           </a:solidFill>
@@ -6625,7 +6780,7 @@
           <a:sym typeface="Arial"/>
         </a:defRPr>
       </a:lvl2pPr>
-      <a:lvl3pPr lvl="2" marR="0" rtl="0" algn="l">
+      <a:lvl3pPr marR="0" lvl="2" algn="l" rtl="0">
         <a:lnSpc>
           <a:spcPct val="100000"/>
         </a:lnSpc>
@@ -6639,7 +6794,7 @@
           <a:srgbClr val="000000"/>
         </a:buClr>
         <a:buFont typeface="Arial"/>
-        <a:defRPr b="0" i="0" sz="1400" u="none" cap="none" strike="noStrike">
+        <a:defRPr sz="1400" b="0" i="0" u="none" strike="noStrike" cap="none">
           <a:solidFill>
             <a:srgbClr val="000000"/>
           </a:solidFill>
@@ -6649,7 +6804,7 @@
           <a:sym typeface="Arial"/>
         </a:defRPr>
       </a:lvl3pPr>
-      <a:lvl4pPr lvl="3" marR="0" rtl="0" algn="l">
+      <a:lvl4pPr marR="0" lvl="3" algn="l" rtl="0">
         <a:lnSpc>
           <a:spcPct val="100000"/>
         </a:lnSpc>
@@ -6663,7 +6818,7 @@
           <a:srgbClr val="000000"/>
         </a:buClr>
         <a:buFont typeface="Arial"/>
-        <a:defRPr b="0" i="0" sz="1400" u="none" cap="none" strike="noStrike">
+        <a:defRPr sz="1400" b="0" i="0" u="none" strike="noStrike" cap="none">
           <a:solidFill>
             <a:srgbClr val="000000"/>
           </a:solidFill>
@@ -6673,7 +6828,7 @@
           <a:sym typeface="Arial"/>
         </a:defRPr>
       </a:lvl4pPr>
-      <a:lvl5pPr lvl="4" marR="0" rtl="0" algn="l">
+      <a:lvl5pPr marR="0" lvl="4" algn="l" rtl="0">
         <a:lnSpc>
           <a:spcPct val="100000"/>
         </a:lnSpc>
@@ -6687,7 +6842,7 @@
           <a:srgbClr val="000000"/>
         </a:buClr>
         <a:buFont typeface="Arial"/>
-        <a:defRPr b="0" i="0" sz="1400" u="none" cap="none" strike="noStrike">
+        <a:defRPr sz="1400" b="0" i="0" u="none" strike="noStrike" cap="none">
           <a:solidFill>
             <a:srgbClr val="000000"/>
           </a:solidFill>
@@ -6697,7 +6852,7 @@
           <a:sym typeface="Arial"/>
         </a:defRPr>
       </a:lvl5pPr>
-      <a:lvl6pPr lvl="5" marR="0" rtl="0" algn="l">
+      <a:lvl6pPr marR="0" lvl="5" algn="l" rtl="0">
         <a:lnSpc>
           <a:spcPct val="100000"/>
         </a:lnSpc>
@@ -6711,7 +6866,7 @@
           <a:srgbClr val="000000"/>
         </a:buClr>
         <a:buFont typeface="Arial"/>
-        <a:defRPr b="0" i="0" sz="1400" u="none" cap="none" strike="noStrike">
+        <a:defRPr sz="1400" b="0" i="0" u="none" strike="noStrike" cap="none">
           <a:solidFill>
             <a:srgbClr val="000000"/>
           </a:solidFill>
@@ -6721,7 +6876,7 @@
           <a:sym typeface="Arial"/>
         </a:defRPr>
       </a:lvl6pPr>
-      <a:lvl7pPr lvl="6" marR="0" rtl="0" algn="l">
+      <a:lvl7pPr marR="0" lvl="6" algn="l" rtl="0">
         <a:lnSpc>
           <a:spcPct val="100000"/>
         </a:lnSpc>
@@ -6735,7 +6890,7 @@
           <a:srgbClr val="000000"/>
         </a:buClr>
         <a:buFont typeface="Arial"/>
-        <a:defRPr b="0" i="0" sz="1400" u="none" cap="none" strike="noStrike">
+        <a:defRPr sz="1400" b="0" i="0" u="none" strike="noStrike" cap="none">
           <a:solidFill>
             <a:srgbClr val="000000"/>
           </a:solidFill>
@@ -6745,7 +6900,7 @@
           <a:sym typeface="Arial"/>
         </a:defRPr>
       </a:lvl7pPr>
-      <a:lvl8pPr lvl="7" marR="0" rtl="0" algn="l">
+      <a:lvl8pPr marR="0" lvl="7" algn="l" rtl="0">
         <a:lnSpc>
           <a:spcPct val="100000"/>
         </a:lnSpc>
@@ -6759,7 +6914,7 @@
           <a:srgbClr val="000000"/>
         </a:buClr>
         <a:buFont typeface="Arial"/>
-        <a:defRPr b="0" i="0" sz="1400" u="none" cap="none" strike="noStrike">
+        <a:defRPr sz="1400" b="0" i="0" u="none" strike="noStrike" cap="none">
           <a:solidFill>
             <a:srgbClr val="000000"/>
           </a:solidFill>
@@ -6769,7 +6924,7 @@
           <a:sym typeface="Arial"/>
         </a:defRPr>
       </a:lvl8pPr>
-      <a:lvl9pPr lvl="8" marR="0" rtl="0" algn="l">
+      <a:lvl9pPr marR="0" lvl="8" algn="l" rtl="0">
         <a:lnSpc>
           <a:spcPct val="100000"/>
         </a:lnSpc>
@@ -6783,7 +6938,7 @@
           <a:srgbClr val="000000"/>
         </a:buClr>
         <a:buFont typeface="Arial"/>
-        <a:defRPr b="0" i="0" sz="1400" u="none" cap="none" strike="noStrike">
+        <a:defRPr sz="1400" b="0" i="0" u="none" strike="noStrike" cap="none">
           <a:solidFill>
             <a:srgbClr val="000000"/>
           </a:solidFill>
@@ -6795,7 +6950,7 @@
       </a:lvl9pPr>
     </p:bodyStyle>
     <p:otherStyle>
-      <a:defPPr lvl="0" marR="0" rtl="0" algn="l">
+      <a:defPPr marR="0" lvl="0" algn="l" rtl="0">
         <a:lnSpc>
           <a:spcPct val="100000"/>
         </a:lnSpc>
@@ -6806,7 +6961,7 @@
           <a:spcPts val="0"/>
         </a:spcAft>
       </a:defPPr>
-      <a:lvl1pPr lvl="0" marR="0" rtl="0" algn="l">
+      <a:lvl1pPr marR="0" lvl="0" algn="l" rtl="0">
         <a:lnSpc>
           <a:spcPct val="100000"/>
         </a:lnSpc>
@@ -6820,7 +6975,7 @@
           <a:srgbClr val="000000"/>
         </a:buClr>
         <a:buFont typeface="Arial"/>
-        <a:defRPr b="0" i="0" sz="1400" u="none" cap="none" strike="noStrike">
+        <a:defRPr sz="1400" b="0" i="0" u="none" strike="noStrike" cap="none">
           <a:solidFill>
             <a:srgbClr val="000000"/>
           </a:solidFill>
@@ -6830,7 +6985,7 @@
           <a:sym typeface="Arial"/>
         </a:defRPr>
       </a:lvl1pPr>
-      <a:lvl2pPr lvl="1" marR="0" rtl="0" algn="l">
+      <a:lvl2pPr marR="0" lvl="1" algn="l" rtl="0">
         <a:lnSpc>
           <a:spcPct val="100000"/>
         </a:lnSpc>
@@ -6844,7 +6999,7 @@
           <a:srgbClr val="000000"/>
         </a:buClr>
         <a:buFont typeface="Arial"/>
-        <a:defRPr b="0" i="0" sz="1400" u="none" cap="none" strike="noStrike">
+        <a:defRPr sz="1400" b="0" i="0" u="none" strike="noStrike" cap="none">
           <a:solidFill>
             <a:srgbClr val="000000"/>
           </a:solidFill>
@@ -6854,7 +7009,7 @@
           <a:sym typeface="Arial"/>
         </a:defRPr>
       </a:lvl2pPr>
-      <a:lvl3pPr lvl="2" marR="0" rtl="0" algn="l">
+      <a:lvl3pPr marR="0" lvl="2" algn="l" rtl="0">
         <a:lnSpc>
           <a:spcPct val="100000"/>
         </a:lnSpc>
@@ -6868,7 +7023,7 @@
           <a:srgbClr val="000000"/>
         </a:buClr>
         <a:buFont typeface="Arial"/>
-        <a:defRPr b="0" i="0" sz="1400" u="none" cap="none" strike="noStrike">
+        <a:defRPr sz="1400" b="0" i="0" u="none" strike="noStrike" cap="none">
           <a:solidFill>
             <a:srgbClr val="000000"/>
           </a:solidFill>
@@ -6878,7 +7033,7 @@
           <a:sym typeface="Arial"/>
         </a:defRPr>
       </a:lvl3pPr>
-      <a:lvl4pPr lvl="3" marR="0" rtl="0" algn="l">
+      <a:lvl4pPr marR="0" lvl="3" algn="l" rtl="0">
         <a:lnSpc>
           <a:spcPct val="100000"/>
         </a:lnSpc>
@@ -6892,7 +7047,7 @@
           <a:srgbClr val="000000"/>
         </a:buClr>
         <a:buFont typeface="Arial"/>
-        <a:defRPr b="0" i="0" sz="1400" u="none" cap="none" strike="noStrike">
+        <a:defRPr sz="1400" b="0" i="0" u="none" strike="noStrike" cap="none">
           <a:solidFill>
             <a:srgbClr val="000000"/>
           </a:solidFill>
@@ -6902,7 +7057,7 @@
           <a:sym typeface="Arial"/>
         </a:defRPr>
       </a:lvl4pPr>
-      <a:lvl5pPr lvl="4" marR="0" rtl="0" algn="l">
+      <a:lvl5pPr marR="0" lvl="4" algn="l" rtl="0">
         <a:lnSpc>
           <a:spcPct val="100000"/>
         </a:lnSpc>
@@ -6916,7 +7071,7 @@
           <a:srgbClr val="000000"/>
         </a:buClr>
         <a:buFont typeface="Arial"/>
-        <a:defRPr b="0" i="0" sz="1400" u="none" cap="none" strike="noStrike">
+        <a:defRPr sz="1400" b="0" i="0" u="none" strike="noStrike" cap="none">
           <a:solidFill>
             <a:srgbClr val="000000"/>
           </a:solidFill>
@@ -6926,7 +7081,7 @@
           <a:sym typeface="Arial"/>
         </a:defRPr>
       </a:lvl5pPr>
-      <a:lvl6pPr lvl="5" marR="0" rtl="0" algn="l">
+      <a:lvl6pPr marR="0" lvl="5" algn="l" rtl="0">
         <a:lnSpc>
           <a:spcPct val="100000"/>
         </a:lnSpc>
@@ -6940,7 +7095,7 @@
           <a:srgbClr val="000000"/>
         </a:buClr>
         <a:buFont typeface="Arial"/>
-        <a:defRPr b="0" i="0" sz="1400" u="none" cap="none" strike="noStrike">
+        <a:defRPr sz="1400" b="0" i="0" u="none" strike="noStrike" cap="none">
           <a:solidFill>
             <a:srgbClr val="000000"/>
           </a:solidFill>
@@ -6950,7 +7105,7 @@
           <a:sym typeface="Arial"/>
         </a:defRPr>
       </a:lvl6pPr>
-      <a:lvl7pPr lvl="6" marR="0" rtl="0" algn="l">
+      <a:lvl7pPr marR="0" lvl="6" algn="l" rtl="0">
         <a:lnSpc>
           <a:spcPct val="100000"/>
         </a:lnSpc>
@@ -6964,7 +7119,7 @@
           <a:srgbClr val="000000"/>
         </a:buClr>
         <a:buFont typeface="Arial"/>
-        <a:defRPr b="0" i="0" sz="1400" u="none" cap="none" strike="noStrike">
+        <a:defRPr sz="1400" b="0" i="0" u="none" strike="noStrike" cap="none">
           <a:solidFill>
             <a:srgbClr val="000000"/>
           </a:solidFill>
@@ -6974,7 +7129,7 @@
           <a:sym typeface="Arial"/>
         </a:defRPr>
       </a:lvl7pPr>
-      <a:lvl8pPr lvl="7" marR="0" rtl="0" algn="l">
+      <a:lvl8pPr marR="0" lvl="7" algn="l" rtl="0">
         <a:lnSpc>
           <a:spcPct val="100000"/>
         </a:lnSpc>
@@ -6988,7 +7143,7 @@
           <a:srgbClr val="000000"/>
         </a:buClr>
         <a:buFont typeface="Arial"/>
-        <a:defRPr b="0" i="0" sz="1400" u="none" cap="none" strike="noStrike">
+        <a:defRPr sz="1400" b="0" i="0" u="none" strike="noStrike" cap="none">
           <a:solidFill>
             <a:srgbClr val="000000"/>
           </a:solidFill>
@@ -6998,7 +7153,7 @@
           <a:sym typeface="Arial"/>
         </a:defRPr>
       </a:lvl8pPr>
-      <a:lvl9pPr lvl="8" marR="0" rtl="0" algn="l">
+      <a:lvl9pPr marR="0" lvl="8" algn="l" rtl="0">
         <a:lnSpc>
           <a:spcPct val="100000"/>
         </a:lnSpc>
@@ -7012,7 +7167,7 @@
           <a:srgbClr val="000000"/>
         </a:buClr>
         <a:buFont typeface="Arial"/>
-        <a:defRPr b="0" i="0" sz="1400" u="none" cap="none" strike="noStrike">
+        <a:defRPr sz="1400" b="0" i="0" u="none" strike="noStrike" cap="none">
           <a:solidFill>
             <a:srgbClr val="000000"/>
           </a:solidFill>
@@ -7028,11 +7183,11 @@
 </file>
 
 <file path=ppt/slides/slide1.xml><?xml version="1.0" encoding="utf-8"?>
-<p:sld xmlns:a="http://schemas.openxmlformats.org/drawingml/2006/main" xmlns:r="http://schemas.openxmlformats.org/officeDocument/2006/relationships" xmlns:mc="http://schemas.openxmlformats.org/markup-compatibility/2006" xmlns:mv="urn:schemas-microsoft-com:mac:vml" xmlns:p="http://schemas.openxmlformats.org/presentationml/2006/main" xmlns:c="http://schemas.openxmlformats.org/drawingml/2006/chart" xmlns:dgm="http://schemas.openxmlformats.org/drawingml/2006/diagram" xmlns:o="urn:schemas-microsoft-com:office:office" xmlns:v="urn:schemas-microsoft-com:vml" xmlns:pvml="urn:schemas-microsoft-com:office:powerpoint" xmlns:com="http://schemas.openxmlformats.org/drawingml/2006/compatibility" xmlns:p14="http://schemas.microsoft.com/office/powerpoint/2010/main" xmlns:p15="http://schemas.microsoft.com/office/powerpoint/2012/main">
+<p:sld xmlns:a="http://schemas.openxmlformats.org/drawingml/2006/main" xmlns:r="http://schemas.openxmlformats.org/officeDocument/2006/relationships" xmlns:p="http://schemas.openxmlformats.org/presentationml/2006/main">
   <p:cSld>
     <p:spTree>
       <p:nvGrpSpPr>
-        <p:cNvPr id="71" name="Shape 71"/>
+        <p:cNvPr id="1" name="Shape 71"/>
         <p:cNvGrpSpPr/>
         <p:nvPr/>
       </p:nvGrpSpPr>
@@ -7047,7 +7202,9 @@
       <p:sp>
         <p:nvSpPr>
           <p:cNvPr id="72" name="Shape 72"/>
-          <p:cNvSpPr txBox="1"/>
+          <p:cNvSpPr txBox="1">
+            <a:spLocks noGrp="1"/>
+          </p:cNvSpPr>
           <p:nvPr>
             <p:ph type="ctrTitle"/>
           </p:nvPr>
@@ -7062,12 +7219,12 @@
           </a:prstGeom>
         </p:spPr>
         <p:txBody>
-          <a:bodyPr anchorCtr="0" anchor="t" bIns="91425" lIns="91425" spcFirstLastPara="1" rIns="91425" wrap="square" tIns="91425">
+          <a:bodyPr spcFirstLastPara="1" wrap="square" lIns="91425" tIns="91425" rIns="91425" bIns="91425" anchor="t" anchorCtr="0">
             <a:noAutofit/>
           </a:bodyPr>
           <a:lstStyle/>
           <a:p>
-            <a:pPr indent="0" lvl="0" marL="0" rtl="0">
+            <a:pPr marL="0" lvl="0" indent="0" rtl="0">
               <a:spcBef>
                 <a:spcPts val="0"/>
               </a:spcBef>
@@ -7087,9 +7244,11 @@
       <p:sp>
         <p:nvSpPr>
           <p:cNvPr id="73" name="Shape 73"/>
-          <p:cNvSpPr txBox="1"/>
+          <p:cNvSpPr txBox="1">
+            <a:spLocks noGrp="1"/>
+          </p:cNvSpPr>
           <p:nvPr>
-            <p:ph idx="1" type="subTitle"/>
+            <p:ph type="subTitle" idx="1"/>
           </p:nvPr>
         </p:nvSpPr>
         <p:spPr>
@@ -7102,12 +7261,12 @@
           </a:prstGeom>
         </p:spPr>
         <p:txBody>
-          <a:bodyPr anchorCtr="0" anchor="b" bIns="91425" lIns="91425" spcFirstLastPara="1" rIns="91425" wrap="square" tIns="91425">
+          <a:bodyPr spcFirstLastPara="1" wrap="square" lIns="91425" tIns="91425" rIns="91425" bIns="91425" anchor="b" anchorCtr="0">
             <a:noAutofit/>
           </a:bodyPr>
           <a:lstStyle/>
           <a:p>
-            <a:pPr indent="0" lvl="0" marL="0" rtl="0">
+            <a:pPr marL="0" lvl="0" indent="0" rtl="0">
               <a:spcBef>
                 <a:spcPts val="0"/>
               </a:spcBef>
@@ -7120,7 +7279,7 @@
               <a:rPr lang="en" sz="2400"/>
               <a:t> by Nav Singh</a:t>
             </a:r>
-            <a:endParaRPr b="1" sz="2400"/>
+            <a:endParaRPr sz="2400" b="1"/>
           </a:p>
         </p:txBody>
       </p:sp>
@@ -7189,11 +7348,11 @@
 </file>
 
 <file path=ppt/slides/slide2.xml><?xml version="1.0" encoding="utf-8"?>
-<p:sld xmlns:a="http://schemas.openxmlformats.org/drawingml/2006/main" xmlns:r="http://schemas.openxmlformats.org/officeDocument/2006/relationships" xmlns:mc="http://schemas.openxmlformats.org/markup-compatibility/2006" xmlns:mv="urn:schemas-microsoft-com:mac:vml" xmlns:p="http://schemas.openxmlformats.org/presentationml/2006/main" xmlns:c="http://schemas.openxmlformats.org/drawingml/2006/chart" xmlns:dgm="http://schemas.openxmlformats.org/drawingml/2006/diagram" xmlns:o="urn:schemas-microsoft-com:office:office" xmlns:v="urn:schemas-microsoft-com:vml" xmlns:pvml="urn:schemas-microsoft-com:office:powerpoint" xmlns:com="http://schemas.openxmlformats.org/drawingml/2006/compatibility" xmlns:p14="http://schemas.microsoft.com/office/powerpoint/2010/main" xmlns:p15="http://schemas.microsoft.com/office/powerpoint/2012/main">
+<p:sld xmlns:a="http://schemas.openxmlformats.org/drawingml/2006/main" xmlns:r="http://schemas.openxmlformats.org/officeDocument/2006/relationships" xmlns:p="http://schemas.openxmlformats.org/presentationml/2006/main">
   <p:cSld>
     <p:spTree>
       <p:nvGrpSpPr>
-        <p:cNvPr id="79" name="Shape 79"/>
+        <p:cNvPr id="1" name="Shape 79"/>
         <p:cNvGrpSpPr/>
         <p:nvPr/>
       </p:nvGrpSpPr>
@@ -7208,9 +7367,11 @@
       <p:sp>
         <p:nvSpPr>
           <p:cNvPr id="80" name="Shape 80"/>
-          <p:cNvSpPr txBox="1"/>
+          <p:cNvSpPr txBox="1">
+            <a:spLocks noGrp="1"/>
+          </p:cNvSpPr>
           <p:nvPr>
-            <p:ph idx="4294967295" type="title"/>
+            <p:ph type="title" idx="4294967295"/>
           </p:nvPr>
         </p:nvSpPr>
         <p:spPr>
@@ -7223,12 +7384,12 @@
           </a:prstGeom>
         </p:spPr>
         <p:txBody>
-          <a:bodyPr anchorCtr="0" anchor="t" bIns="91425" lIns="91425" spcFirstLastPara="1" rIns="91425" wrap="square" tIns="91425">
+          <a:bodyPr spcFirstLastPara="1" wrap="square" lIns="91425" tIns="91425" rIns="91425" bIns="91425" anchor="t" anchorCtr="0">
             <a:noAutofit/>
           </a:bodyPr>
           <a:lstStyle/>
           <a:p>
-            <a:pPr indent="0" lvl="0" marL="0" rtl="0">
+            <a:pPr marL="0" lvl="0" indent="0" rtl="0">
               <a:spcBef>
                 <a:spcPts val="0"/>
               </a:spcBef>
@@ -7243,9 +7404,9 @@
                   <a:schemeClr val="dk1"/>
                 </a:solidFill>
               </a:rPr>
-              <a:t>What is it about ??</a:t>
+              <a:t>What is it ??</a:t>
             </a:r>
-            <a:endParaRPr sz="2400"/>
+            <a:endParaRPr sz="2400" dirty="0"/>
           </a:p>
         </p:txBody>
       </p:sp>
@@ -7286,18 +7447,19 @@
 </file>
 
 <file path=ppt/slides/slide3.xml><?xml version="1.0" encoding="utf-8"?>
-<p:sld xmlns:a="http://schemas.openxmlformats.org/drawingml/2006/main" xmlns:r="http://schemas.openxmlformats.org/officeDocument/2006/relationships" xmlns:mc="http://schemas.openxmlformats.org/markup-compatibility/2006" xmlns:mv="urn:schemas-microsoft-com:mac:vml" xmlns:p="http://schemas.openxmlformats.org/presentationml/2006/main" xmlns:c="http://schemas.openxmlformats.org/drawingml/2006/chart" xmlns:dgm="http://schemas.openxmlformats.org/drawingml/2006/diagram" xmlns:o="urn:schemas-microsoft-com:office:office" xmlns:v="urn:schemas-microsoft-com:vml" xmlns:pvml="urn:schemas-microsoft-com:office:powerpoint" xmlns:com="http://schemas.openxmlformats.org/drawingml/2006/compatibility" xmlns:p14="http://schemas.microsoft.com/office/powerpoint/2010/main" xmlns:p15="http://schemas.microsoft.com/office/powerpoint/2012/main">
+<p:sld xmlns:a="http://schemas.openxmlformats.org/drawingml/2006/main" xmlns:r="http://schemas.openxmlformats.org/officeDocument/2006/relationships" xmlns:p="http://schemas.openxmlformats.org/presentationml/2006/main">
   <p:cSld>
     <p:bg>
       <p:bgPr>
         <a:solidFill>
           <a:schemeClr val="dk1"/>
         </a:solidFill>
+        <a:effectLst/>
       </p:bgPr>
     </p:bg>
     <p:spTree>
       <p:nvGrpSpPr>
-        <p:cNvPr id="85" name="Shape 85"/>
+        <p:cNvPr id="1" name="Shape 85"/>
         <p:cNvGrpSpPr/>
         <p:nvPr/>
       </p:nvGrpSpPr>
@@ -7357,12 +7519,12 @@
           </a:ln>
         </p:spPr>
         <p:txBody>
-          <a:bodyPr anchorCtr="0" anchor="b" bIns="91425" lIns="91425" spcFirstLastPara="1" rIns="91425" wrap="square" tIns="91425">
+          <a:bodyPr spcFirstLastPara="1" wrap="square" lIns="91425" tIns="91425" rIns="91425" bIns="91425" anchor="b" anchorCtr="0">
             <a:noAutofit/>
           </a:bodyPr>
           <a:lstStyle/>
           <a:p>
-            <a:pPr indent="0" lvl="0" marL="0" rtl="0">
+            <a:pPr marL="0" lvl="0" indent="0" rtl="0">
               <a:spcBef>
                 <a:spcPts val="0"/>
               </a:spcBef>
@@ -7372,7 +7534,7 @@
               <a:buNone/>
             </a:pPr>
             <a:r>
-              <a:rPr b="1" lang="en" sz="3000">
+              <a:rPr lang="en" sz="3000" b="1">
                 <a:solidFill>
                   <a:schemeClr val="dk1"/>
                 </a:solidFill>
@@ -7383,7 +7545,7 @@
               </a:rPr>
               <a:t>1. How it works..</a:t>
             </a:r>
-            <a:endParaRPr b="1" sz="3000">
+            <a:endParaRPr sz="3000" b="1">
               <a:solidFill>
                 <a:schemeClr val="dk1"/>
               </a:solidFill>
@@ -7432,11 +7594,11 @@
 </file>
 
 <file path=ppt/slides/slide4.xml><?xml version="1.0" encoding="utf-8"?>
-<p:sld xmlns:a="http://schemas.openxmlformats.org/drawingml/2006/main" xmlns:r="http://schemas.openxmlformats.org/officeDocument/2006/relationships" xmlns:mc="http://schemas.openxmlformats.org/markup-compatibility/2006" xmlns:mv="urn:schemas-microsoft-com:mac:vml" xmlns:p="http://schemas.openxmlformats.org/presentationml/2006/main" xmlns:c="http://schemas.openxmlformats.org/drawingml/2006/chart" xmlns:dgm="http://schemas.openxmlformats.org/drawingml/2006/diagram" xmlns:o="urn:schemas-microsoft-com:office:office" xmlns:v="urn:schemas-microsoft-com:vml" xmlns:pvml="urn:schemas-microsoft-com:office:powerpoint" xmlns:com="http://schemas.openxmlformats.org/drawingml/2006/compatibility" xmlns:p14="http://schemas.microsoft.com/office/powerpoint/2010/main" xmlns:p15="http://schemas.microsoft.com/office/powerpoint/2012/main">
+<p:sld xmlns:a="http://schemas.openxmlformats.org/drawingml/2006/main" xmlns:r="http://schemas.openxmlformats.org/officeDocument/2006/relationships" xmlns:p="http://schemas.openxmlformats.org/presentationml/2006/main">
   <p:cSld>
     <p:spTree>
       <p:nvGrpSpPr>
-        <p:cNvPr id="92" name="Shape 92"/>
+        <p:cNvPr id="1" name="Shape 92"/>
         <p:cNvGrpSpPr/>
         <p:nvPr/>
       </p:nvGrpSpPr>
@@ -7451,7 +7613,9 @@
       <p:sp>
         <p:nvSpPr>
           <p:cNvPr id="93" name="Shape 93"/>
-          <p:cNvSpPr txBox="1"/>
+          <p:cNvSpPr txBox="1">
+            <a:spLocks noGrp="1"/>
+          </p:cNvSpPr>
           <p:nvPr>
             <p:ph type="title"/>
           </p:nvPr>
@@ -7466,12 +7630,12 @@
           </a:prstGeom>
         </p:spPr>
         <p:txBody>
-          <a:bodyPr anchorCtr="0" anchor="t" bIns="91425" lIns="91425" spcFirstLastPara="1" rIns="91425" wrap="square" tIns="91425">
+          <a:bodyPr spcFirstLastPara="1" wrap="square" lIns="91425" tIns="91425" rIns="91425" bIns="91425" anchor="t" anchorCtr="0">
             <a:noAutofit/>
           </a:bodyPr>
           <a:lstStyle/>
           <a:p>
-            <a:pPr indent="0" lvl="0" marL="0">
+            <a:pPr marL="0" lvl="0" indent="0">
               <a:spcBef>
                 <a:spcPts val="0"/>
               </a:spcBef>
@@ -7503,7 +7667,7 @@
             </a:endParaRPr>
           </a:p>
           <a:p>
-            <a:pPr indent="0" lvl="0" marL="0">
+            <a:pPr marL="0" lvl="0" indent="0">
               <a:spcBef>
                 <a:spcPts val="0"/>
               </a:spcBef>
@@ -7512,9 +7676,6 @@
               </a:spcAft>
               <a:buNone/>
             </a:pPr>
-            <a:r>
-              <a:t/>
-            </a:r>
             <a:endParaRPr u="sng">
               <a:solidFill>
                 <a:schemeClr val="accent5"/>
@@ -7522,7 +7683,7 @@
             </a:endParaRPr>
           </a:p>
           <a:p>
-            <a:pPr indent="-342900" lvl="0" marL="457200" rtl="0">
+            <a:pPr marL="457200" lvl="0" indent="-342900" rtl="0">
               <a:spcBef>
                 <a:spcPts val="0"/>
               </a:spcBef>
@@ -7550,7 +7711,7 @@
             </a:endParaRPr>
           </a:p>
           <a:p>
-            <a:pPr indent="-342900" lvl="0" marL="457200" rtl="0">
+            <a:pPr marL="457200" lvl="0" indent="-342900" rtl="0">
               <a:spcBef>
                 <a:spcPts val="0"/>
               </a:spcBef>
@@ -7594,7 +7755,7 @@
             </a:endParaRPr>
           </a:p>
           <a:p>
-            <a:pPr indent="-342900" lvl="0" marL="457200" rtl="0">
+            <a:pPr marL="457200" lvl="0" indent="-342900" rtl="0">
               <a:spcBef>
                 <a:spcPts val="0"/>
               </a:spcBef>
@@ -7646,7 +7807,7 @@
             </a:endParaRPr>
           </a:p>
           <a:p>
-            <a:pPr indent="-342900" lvl="0" marL="457200" rtl="0">
+            <a:pPr marL="457200" lvl="0" indent="-342900" rtl="0">
               <a:spcBef>
                 <a:spcPts val="0"/>
               </a:spcBef>
@@ -7682,7 +7843,7 @@
             </a:endParaRPr>
           </a:p>
           <a:p>
-            <a:pPr indent="-342900" lvl="0" marL="457200" rtl="0">
+            <a:pPr marL="457200" lvl="0" indent="-342900" rtl="0">
               <a:spcBef>
                 <a:spcPts val="0"/>
               </a:spcBef>
@@ -7710,7 +7871,7 @@
             </a:endParaRPr>
           </a:p>
           <a:p>
-            <a:pPr indent="-342900" lvl="0" marL="457200" rtl="0">
+            <a:pPr marL="457200" lvl="0" indent="-342900" rtl="0">
               <a:spcBef>
                 <a:spcPts val="0"/>
               </a:spcBef>
@@ -7746,7 +7907,7 @@
             </a:endParaRPr>
           </a:p>
           <a:p>
-            <a:pPr indent="-342900" lvl="0" marL="457200" rtl="0">
+            <a:pPr marL="457200" lvl="0" indent="-342900" rtl="0">
               <a:spcBef>
                 <a:spcPts val="0"/>
               </a:spcBef>
@@ -7774,7 +7935,7 @@
             </a:endParaRPr>
           </a:p>
           <a:p>
-            <a:pPr indent="0" lvl="0" marL="0" rtl="0">
+            <a:pPr marL="0" lvl="0" indent="0" rtl="0">
               <a:spcBef>
                 <a:spcPts val="0"/>
               </a:spcBef>
@@ -7783,9 +7944,6 @@
               </a:spcAft>
               <a:buNone/>
             </a:pPr>
-            <a:r>
-              <a:t/>
-            </a:r>
             <a:endParaRPr sz="1800">
               <a:solidFill>
                 <a:schemeClr val="accent5"/>
@@ -7793,7 +7951,7 @@
             </a:endParaRPr>
           </a:p>
           <a:p>
-            <a:pPr indent="0" lvl="0" marL="0" rtl="0">
+            <a:pPr marL="0" lvl="0" indent="0" rtl="0">
               <a:spcBef>
                 <a:spcPts val="0"/>
               </a:spcBef>
@@ -7802,9 +7960,6 @@
               </a:spcAft>
               <a:buNone/>
             </a:pPr>
-            <a:r>
-              <a:t/>
-            </a:r>
             <a:endParaRPr sz="1800">
               <a:solidFill>
                 <a:schemeClr val="accent5"/>
@@ -7812,7 +7967,7 @@
             </a:endParaRPr>
           </a:p>
           <a:p>
-            <a:pPr indent="0" lvl="0" marL="0" rtl="0" algn="ctr">
+            <a:pPr marL="0" lvl="0" indent="0" algn="ctr" rtl="0">
               <a:spcBef>
                 <a:spcPts val="0"/>
               </a:spcBef>
@@ -7821,9 +7976,6 @@
               </a:spcAft>
               <a:buNone/>
             </a:pPr>
-            <a:r>
-              <a:t/>
-            </a:r>
             <a:endParaRPr sz="1800">
               <a:solidFill>
                 <a:schemeClr val="accent5"/>
@@ -7841,11 +7993,11 @@
 </file>
 
 <file path=ppt/slides/slide5.xml><?xml version="1.0" encoding="utf-8"?>
-<p:sld xmlns:a="http://schemas.openxmlformats.org/drawingml/2006/main" xmlns:r="http://schemas.openxmlformats.org/officeDocument/2006/relationships" xmlns:mc="http://schemas.openxmlformats.org/markup-compatibility/2006" xmlns:mv="urn:schemas-microsoft-com:mac:vml" xmlns:p="http://schemas.openxmlformats.org/presentationml/2006/main" xmlns:c="http://schemas.openxmlformats.org/drawingml/2006/chart" xmlns:dgm="http://schemas.openxmlformats.org/drawingml/2006/diagram" xmlns:o="urn:schemas-microsoft-com:office:office" xmlns:v="urn:schemas-microsoft-com:vml" xmlns:pvml="urn:schemas-microsoft-com:office:powerpoint" xmlns:com="http://schemas.openxmlformats.org/drawingml/2006/compatibility" xmlns:p14="http://schemas.microsoft.com/office/powerpoint/2010/main" xmlns:p15="http://schemas.microsoft.com/office/powerpoint/2012/main">
+<p:sld xmlns:a="http://schemas.openxmlformats.org/drawingml/2006/main" xmlns:r="http://schemas.openxmlformats.org/officeDocument/2006/relationships" xmlns:p="http://schemas.openxmlformats.org/presentationml/2006/main">
   <p:cSld>
     <p:spTree>
       <p:nvGrpSpPr>
-        <p:cNvPr id="97" name="Shape 97"/>
+        <p:cNvPr id="1" name="Shape 97"/>
         <p:cNvGrpSpPr/>
         <p:nvPr/>
       </p:nvGrpSpPr>
@@ -7922,7 +8074,7 @@
 </file>
 
 <file path=ppt/theme/theme1.xml><?xml version="1.0" encoding="utf-8"?>
-<a:theme xmlns:a="http://schemas.openxmlformats.org/drawingml/2006/main" xmlns:r="http://schemas.openxmlformats.org/officeDocument/2006/relationships" name="Swiss">
+<a:theme xmlns:a="http://schemas.openxmlformats.org/drawingml/2006/main" name="Swiss">
   <a:themeElements>
     <a:clrScheme name="Swiss">
       <a:dk1>
@@ -8197,11 +8349,13 @@
       </a:bgFillStyleLst>
     </a:fmtScheme>
   </a:themeElements>
+  <a:objectDefaults/>
+  <a:extraClrSchemeLst/>
 </a:theme>
 </file>
 
 <file path=ppt/theme/theme2.xml><?xml version="1.0" encoding="utf-8"?>
-<a:theme xmlns:a="http://schemas.openxmlformats.org/drawingml/2006/main" xmlns:r="http://schemas.openxmlformats.org/officeDocument/2006/relationships">
+<a:theme xmlns:a="http://schemas.openxmlformats.org/drawingml/2006/main">
   <a:themeElements>
     <a:clrScheme name="Default">
       <a:dk1>
@@ -8476,5 +8630,7 @@
       </a:bgFillStyleLst>
     </a:fmtScheme>
   </a:themeElements>
+  <a:objectDefaults/>
+  <a:extraClrSchemeLst/>
 </a:theme>
 </file>
</xml_diff>